<commit_message>
Criação da estrutura básica de arquivos para o modulo RMAP, assim como complemento da documentação;
</commit_message>
<xml_diff>
--- a/RMAP_Development/Documentation/RMAP_blocks.pptx
+++ b/RMAP_Development/Documentation/RMAP_blocks.pptx
@@ -1946,7 +1946,7 @@
       <dgm:prSet phldrT="[Texto]"/>
       <dgm:spPr>
         <a:solidFill>
-          <a:srgbClr val="92D050"/>
+          <a:srgbClr val="7C7C7C"/>
         </a:solidFill>
       </dgm:spPr>
       <dgm:t>
@@ -2386,7 +2386,7 @@
       <dgm:prSet phldrT="[Texto]"/>
       <dgm:spPr>
         <a:solidFill>
-          <a:srgbClr val="92D050"/>
+          <a:srgbClr val="7C7C7C"/>
         </a:solidFill>
       </dgm:spPr>
       <dgm:t>
@@ -7308,262 +7308,262 @@
     </dgm:pt>
   </dgm:ptLst>
   <dgm:cxnLst>
+    <dgm:cxn modelId="{562A1128-3384-45EA-B677-3D0D23735DA7}" srcId="{6F6C34EC-D04B-4D56-86A3-3E939B149C9F}" destId="{39B8B1D4-80BD-49EE-AD66-399B0CF4CBD7}" srcOrd="5" destOrd="0" parTransId="{B3F0FDA9-A0C9-4B81-91EE-E0C205BC5819}" sibTransId="{55B4F9A6-FA0E-4B1F-902E-20C9C9C1041C}"/>
+    <dgm:cxn modelId="{B60799F3-AE50-4F8D-8946-A0731C435863}" type="presOf" srcId="{91B628C4-F28F-4C57-BADA-4C525DD54D79}" destId="{9E6F4F81-FA8E-492E-990E-13AE95215917}" srcOrd="0" destOrd="0" presId="urn:microsoft.com/office/officeart/2005/8/layout/orgChart1"/>
+    <dgm:cxn modelId="{0F1C9223-4414-442B-8F33-868870849819}" type="presOf" srcId="{17146953-BB10-4775-A2C8-6BD3AF1E8307}" destId="{AC9CBE74-87D6-4955-99AE-3669B439E49D}" srcOrd="1" destOrd="0" presId="urn:microsoft.com/office/officeart/2005/8/layout/orgChart1"/>
+    <dgm:cxn modelId="{04B28D99-A4A7-48B7-91E1-9083811546BF}" type="presOf" srcId="{A019E9A3-76AF-4373-8831-B9D10BF05C12}" destId="{1B23ED6E-AED4-4C1E-BB67-6E14FF32B199}" srcOrd="0" destOrd="0" presId="urn:microsoft.com/office/officeart/2005/8/layout/orgChart1"/>
+    <dgm:cxn modelId="{72CC7D68-4EBF-471F-9904-2964D73ACC7C}" type="presOf" srcId="{5E747862-7F4F-48C2-9656-0F2A1029D161}" destId="{34881B9C-2B1C-4E9F-835C-076DDE017804}" srcOrd="1" destOrd="0" presId="urn:microsoft.com/office/officeart/2005/8/layout/orgChart1"/>
+    <dgm:cxn modelId="{558ED89F-2BE4-4B62-A725-EBC46A4324FB}" type="presOf" srcId="{D457A40A-56B9-4F4F-B5B7-A69DF2E1F522}" destId="{B4D6615C-1F7F-486C-B62C-F78858FBF129}" srcOrd="1" destOrd="0" presId="urn:microsoft.com/office/officeart/2005/8/layout/orgChart1"/>
+    <dgm:cxn modelId="{C5CCB62F-1A70-49D6-B32C-1D8955DA0298}" type="presOf" srcId="{B3CE34A7-3737-4E98-BC58-22D32761C765}" destId="{EF476796-8A6B-44D6-B3F8-F4A6F90AA3D7}" srcOrd="1" destOrd="0" presId="urn:microsoft.com/office/officeart/2005/8/layout/orgChart1"/>
+    <dgm:cxn modelId="{3A24B3C9-2C57-4AC0-B91E-E3F318F95A8E}" type="presOf" srcId="{E45D94D1-C699-49D6-8FB7-1A53EF69E9C4}" destId="{8FBFB680-793F-40C1-A7F9-0B639C4AA83E}" srcOrd="1" destOrd="0" presId="urn:microsoft.com/office/officeart/2005/8/layout/orgChart1"/>
+    <dgm:cxn modelId="{4EE70ABA-0083-4CF0-92A3-570F78E3440A}" type="presOf" srcId="{75BEB708-1BA6-4F6B-95E5-ECC20B1CCD2A}" destId="{52A4F596-44B7-4D8D-8815-678FCAF34F3C}" srcOrd="0" destOrd="0" presId="urn:microsoft.com/office/officeart/2005/8/layout/orgChart1"/>
+    <dgm:cxn modelId="{975ADECA-0D6D-4101-ACC5-036D1BC4D3C3}" type="presOf" srcId="{036F865D-B49C-497C-A28F-FACEB37BE973}" destId="{49A0AAB5-AEB3-4301-86B1-9947C47B5021}" srcOrd="1" destOrd="0" presId="urn:microsoft.com/office/officeart/2005/8/layout/orgChart1"/>
+    <dgm:cxn modelId="{DDA5250E-2FA5-42A4-B1BF-AE45368A0CF9}" type="presOf" srcId="{E621B393-E081-4074-9CF7-24B8C04658FF}" destId="{18CEB86C-5759-44C3-A95F-ADFDFEBCCC81}" srcOrd="1" destOrd="0" presId="urn:microsoft.com/office/officeart/2005/8/layout/orgChart1"/>
+    <dgm:cxn modelId="{62ED085F-42C7-4582-850F-1E8D0BB9A19D}" type="presOf" srcId="{5A2E9414-479E-446C-A2E4-726DD6DA6FCB}" destId="{1B6E9FE2-4A42-45ED-9630-331A61CD1A61}" srcOrd="0" destOrd="0" presId="urn:microsoft.com/office/officeart/2005/8/layout/orgChart1"/>
+    <dgm:cxn modelId="{1AA828A6-0447-4CDA-86B7-FE30B4BFB217}" type="presOf" srcId="{397E882A-8E4B-419F-A35B-3AFC7D7CD9AD}" destId="{D00CDF34-6BD6-4A5E-827E-6DAA92405E58}" srcOrd="0" destOrd="0" presId="urn:microsoft.com/office/officeart/2005/8/layout/orgChart1"/>
+    <dgm:cxn modelId="{B88BE953-D3FF-426C-80DA-3AE8B365A31A}" type="presOf" srcId="{DDBCFA16-FF48-4701-9B4A-F21E4666E982}" destId="{B4FC44E5-DB4F-49BB-A2F7-08D9A7617FA3}" srcOrd="1" destOrd="0" presId="urn:microsoft.com/office/officeart/2005/8/layout/orgChart1"/>
+    <dgm:cxn modelId="{E778841C-1D3E-4987-96F8-4DFC4CF910A2}" type="presOf" srcId="{29D0BC58-E48F-4187-A5B8-C49CFD41B6F2}" destId="{EDC7E00A-1797-4E09-8012-9CCC654F37F6}" srcOrd="0" destOrd="0" presId="urn:microsoft.com/office/officeart/2005/8/layout/orgChart1"/>
+    <dgm:cxn modelId="{474998B0-B91D-4B6E-BEF8-9E9EF3674121}" type="presOf" srcId="{EB43AF72-1C15-4079-BDD3-C856AD333C22}" destId="{6383E483-01F1-40CC-83D5-F4DB42FCEE17}" srcOrd="0" destOrd="0" presId="urn:microsoft.com/office/officeart/2005/8/layout/orgChart1"/>
+    <dgm:cxn modelId="{B54217EB-8A52-42A8-A605-0EE3636F70A2}" srcId="{E7F2B5B6-CF87-43D8-956B-865FA12A9832}" destId="{D39555DC-FD40-400A-8291-2B20647F4971}" srcOrd="5" destOrd="0" parTransId="{08F7D90B-DD5F-47B6-918B-EC4EAA8ACAD1}" sibTransId="{C8568792-6B40-4972-A482-C0AC52C997BA}"/>
+    <dgm:cxn modelId="{56382EE8-D5E6-446C-89A7-EBA00361F2CB}" type="presOf" srcId="{3E71C5FB-B753-47D4-9DCC-13828975B0A2}" destId="{F45BD869-2D88-4C0A-82C8-8E7C77BA288B}" srcOrd="1" destOrd="0" presId="urn:microsoft.com/office/officeart/2005/8/layout/orgChart1"/>
+    <dgm:cxn modelId="{7D23F82D-E6C0-4C11-A4EE-403746E6B956}" srcId="{A12CA174-2EA1-4254-A2E2-9C94FA356EC7}" destId="{568786E3-CB59-4DB9-A75B-F3F7C409ACBF}" srcOrd="8" destOrd="0" parTransId="{A69C286E-240E-4664-BECA-C71EDEB14C00}" sibTransId="{4F1AAD17-152A-442D-93C0-619AF0D7D67A}"/>
+    <dgm:cxn modelId="{013AF8A4-8F06-4569-9011-273BC84756C5}" type="presOf" srcId="{8DF21F59-4716-4250-BD7E-144F4D63CBC5}" destId="{322C77DB-BD76-4E86-9D6F-41EA80D6E816}" srcOrd="1" destOrd="0" presId="urn:microsoft.com/office/officeart/2005/8/layout/orgChart1"/>
+    <dgm:cxn modelId="{53586120-A1EF-4DD4-9374-D7EF900324DF}" type="presOf" srcId="{E6512187-A44F-40F0-88C3-E2E4C07824B7}" destId="{32B82704-7FA4-42CD-86C6-FF0DB3D1300D}" srcOrd="1" destOrd="0" presId="urn:microsoft.com/office/officeart/2005/8/layout/orgChart1"/>
+    <dgm:cxn modelId="{BE44060E-2F3A-41A2-9D6E-9634974900C1}" type="presOf" srcId="{5B650B58-E6B4-4F81-9E92-48805D7BAFC8}" destId="{E78E2A90-FCCD-4F5A-9160-05A457794C0D}" srcOrd="1" destOrd="0" presId="urn:microsoft.com/office/officeart/2005/8/layout/orgChart1"/>
+    <dgm:cxn modelId="{D75B7830-AF58-4626-B77C-C70D4D29BD76}" srcId="{036F865D-B49C-497C-A28F-FACEB37BE973}" destId="{D457A40A-56B9-4F4F-B5B7-A69DF2E1F522}" srcOrd="10" destOrd="0" parTransId="{8687A9BC-A114-4542-92D9-DA4890EFFA33}" sibTransId="{9B79AD43-735E-4ACD-BCB3-B2E2FB662828}"/>
+    <dgm:cxn modelId="{17E0B75D-882F-4AA2-A747-17185FD990FB}" type="presOf" srcId="{328C9D30-CD38-4F0C-A8AC-D8255B5817AB}" destId="{045A1F4E-D65D-4CED-95B7-21B2AF8EA204}" srcOrd="0" destOrd="0" presId="urn:microsoft.com/office/officeart/2005/8/layout/orgChart1"/>
+    <dgm:cxn modelId="{3015DE49-BB22-42D7-AFC6-91AEF3F2EF46}" srcId="{E7F2B5B6-CF87-43D8-956B-865FA12A9832}" destId="{42AB1B98-997E-4DD4-82CB-98CED7A92BF2}" srcOrd="2" destOrd="0" parTransId="{C57D86BF-5B9D-41B8-BC5B-A5BCCB7D5E9E}" sibTransId="{7F738E0C-CD0C-48CE-AB82-F455923C619D}"/>
+    <dgm:cxn modelId="{191CBCCD-F3FE-4209-B2CD-B3D736C1F2BB}" type="presOf" srcId="{E45D94D1-C699-49D6-8FB7-1A53EF69E9C4}" destId="{0D4D1DB7-317F-4514-9C9A-833274238A92}" srcOrd="0" destOrd="0" presId="urn:microsoft.com/office/officeart/2005/8/layout/orgChart1"/>
+    <dgm:cxn modelId="{145F3EF0-319B-44E3-A797-EBBD60DEF5A8}" type="presOf" srcId="{A1E21DB3-4238-483C-8C46-4651EF0F3427}" destId="{0D6F29F8-F194-44D9-9979-8E77AC533B39}" srcOrd="1" destOrd="0" presId="urn:microsoft.com/office/officeart/2005/8/layout/orgChart1"/>
+    <dgm:cxn modelId="{027D87CC-1B11-4722-B1E7-58A785BD41E8}" type="presOf" srcId="{5C2E33FB-B544-4FA0-A971-C25A0BDFB5F3}" destId="{6AF5C851-806B-4784-8AA7-A868812F465F}" srcOrd="0" destOrd="0" presId="urn:microsoft.com/office/officeart/2005/8/layout/orgChart1"/>
+    <dgm:cxn modelId="{07DF2F04-AA98-418F-B615-4F17660A76C5}" type="presOf" srcId="{16C2C151-7509-45B4-8172-9938019F1FE3}" destId="{1CF41F55-E010-46A3-95D4-006A58F0FD0B}" srcOrd="0" destOrd="0" presId="urn:microsoft.com/office/officeart/2005/8/layout/orgChart1"/>
+    <dgm:cxn modelId="{EB920824-E4AE-4DA2-A467-4BCA98BD6C5C}" type="presOf" srcId="{E7BBAF79-B5DF-4711-94A2-066B816722C0}" destId="{C5669012-804D-4CE6-AEB0-2408B2E26C8B}" srcOrd="1" destOrd="0" presId="urn:microsoft.com/office/officeart/2005/8/layout/orgChart1"/>
+    <dgm:cxn modelId="{21AE4FDB-488D-4971-9AAD-6FFBE44784EE}" type="presOf" srcId="{15EDC76C-57B9-43BE-BF45-2205A01BA0A3}" destId="{9E8DB942-C0D1-4FDE-98A8-0335DB18EC80}" srcOrd="0" destOrd="0" presId="urn:microsoft.com/office/officeart/2005/8/layout/orgChart1"/>
+    <dgm:cxn modelId="{B0A89856-81F0-4C9B-8785-F7A18A0DDC7A}" type="presOf" srcId="{29D0BC58-E48F-4187-A5B8-C49CFD41B6F2}" destId="{13E5D0CD-F90D-44BD-A3DB-34B6C1A2DFC6}" srcOrd="1" destOrd="0" presId="urn:microsoft.com/office/officeart/2005/8/layout/orgChart1"/>
+    <dgm:cxn modelId="{3EDA0763-1682-4F7D-B847-1F61F8F13F1D}" type="presOf" srcId="{A12CA174-2EA1-4254-A2E2-9C94FA356EC7}" destId="{0449E693-20E3-4F69-B022-9F745386C802}" srcOrd="1" destOrd="0" presId="urn:microsoft.com/office/officeart/2005/8/layout/orgChart1"/>
+    <dgm:cxn modelId="{0D367CC6-53B0-4C61-84C6-DD9B05B84865}" type="presOf" srcId="{B8AD3FDB-62B5-43CC-8C3E-4F5B3AFF587E}" destId="{B4E3BBEA-AFED-4425-8442-4F10DBF7FC80}" srcOrd="0" destOrd="0" presId="urn:microsoft.com/office/officeart/2005/8/layout/orgChart1"/>
+    <dgm:cxn modelId="{7D0A50C8-0F85-4031-ABDD-4D28BB46AC13}" type="presOf" srcId="{16E257D9-552D-418B-80F5-CF8B2A4A81F5}" destId="{77BE4884-B660-4A1A-B5BE-7F76FF5C81A0}" srcOrd="0" destOrd="0" presId="urn:microsoft.com/office/officeart/2005/8/layout/orgChart1"/>
+    <dgm:cxn modelId="{C0F4AD72-DBB5-419A-ACA4-0D400A6A1150}" srcId="{6F6C34EC-D04B-4D56-86A3-3E939B149C9F}" destId="{5215C3D3-851F-46CC-A361-F2F3BA144B72}" srcOrd="6" destOrd="0" parTransId="{9DDF8871-299D-4994-ACA0-5CEEF284B657}" sibTransId="{CCA1F8BA-A81E-41A9-AEB1-77E4DDF786D6}"/>
+    <dgm:cxn modelId="{AC827D59-11C2-4236-9F78-D70B1A43D225}" type="presOf" srcId="{592EDF8A-A7DA-43DB-849D-96EC567ADCC5}" destId="{8B8CB4FA-2E41-4565-A96D-9831294F274F}" srcOrd="0" destOrd="0" presId="urn:microsoft.com/office/officeart/2005/8/layout/orgChart1"/>
+    <dgm:cxn modelId="{5A4FDFD1-FB27-4894-9AB2-5EED1C66FE93}" srcId="{E7F2B5B6-CF87-43D8-956B-865FA12A9832}" destId="{C4A8471A-4B9E-488E-9113-5F14ED685C1C}" srcOrd="10" destOrd="0" parTransId="{D73CDCEA-89C2-455C-A3A3-230942560E3B}" sibTransId="{F51F554D-842C-4702-B230-A2683A344025}"/>
+    <dgm:cxn modelId="{4A059223-A254-4666-BCD6-F9939E506005}" type="presOf" srcId="{C4A8471A-4B9E-488E-9113-5F14ED685C1C}" destId="{A4420242-8B48-4351-9761-0D8F5016C3C5}" srcOrd="1" destOrd="0" presId="urn:microsoft.com/office/officeart/2005/8/layout/orgChart1"/>
+    <dgm:cxn modelId="{ECA60D84-24CE-45B6-B5F8-73210AFC0188}" type="presOf" srcId="{B3292FCB-66B4-4C67-8DD8-20E8071DF9AB}" destId="{F025432D-3088-4546-B34D-818E97FC84F1}" srcOrd="0" destOrd="0" presId="urn:microsoft.com/office/officeart/2005/8/layout/orgChart1"/>
+    <dgm:cxn modelId="{88775CDD-8F49-4274-ACAE-1093BFBAF2CE}" type="presOf" srcId="{A57018D7-84ED-488F-BB9E-3D81E4943144}" destId="{470ED9D4-9131-4301-BA5E-FA66C0F09D24}" srcOrd="0" destOrd="0" presId="urn:microsoft.com/office/officeart/2005/8/layout/orgChart1"/>
+    <dgm:cxn modelId="{8EFB885D-98B9-48A4-A970-BC00345B3AA8}" type="presOf" srcId="{CAC00B8C-8726-4518-996D-52DDA6373405}" destId="{0A6EE857-2D80-420A-94A3-783CFC3A9FC3}" srcOrd="0" destOrd="0" presId="urn:microsoft.com/office/officeart/2005/8/layout/orgChart1"/>
+    <dgm:cxn modelId="{79865CAF-3A2D-46BF-AA2F-6B540D2302AD}" type="presOf" srcId="{D6C569CA-D673-4E36-AF0A-BFDD06BAA18D}" destId="{FCF382F4-BF9F-405B-8C6D-097A8D248F86}" srcOrd="0" destOrd="0" presId="urn:microsoft.com/office/officeart/2005/8/layout/orgChart1"/>
+    <dgm:cxn modelId="{F287EBCE-28E0-4219-B406-FAA9C8EF6035}" srcId="{6A8B354A-8DFF-4438-9E28-0978BD25CCDE}" destId="{6F6C34EC-D04B-4D56-86A3-3E939B149C9F}" srcOrd="0" destOrd="0" parTransId="{C9A2CEE2-9518-4767-ABDA-FEC5C5734C63}" sibTransId="{E8CAF981-1249-410C-A6B4-310045525768}"/>
+    <dgm:cxn modelId="{9E273358-C5B7-4997-9729-292D8B5AA5E3}" type="presOf" srcId="{AF7CD24D-0163-4221-AE52-2FADAF1DBDE1}" destId="{60DA8595-BF29-408E-83D9-AB98DA77357C}" srcOrd="0" destOrd="0" presId="urn:microsoft.com/office/officeart/2005/8/layout/orgChart1"/>
+    <dgm:cxn modelId="{67FC6038-411D-4B59-AE1D-6AAC1685DF74}" type="presOf" srcId="{036F865D-B49C-497C-A28F-FACEB37BE973}" destId="{A5F04406-A1EA-4D8E-BAAA-8483711364C6}" srcOrd="0" destOrd="0" presId="urn:microsoft.com/office/officeart/2005/8/layout/orgChart1"/>
+    <dgm:cxn modelId="{4A489CD4-F3A6-4F6D-B63A-5B6465AD9C66}" type="presOf" srcId="{86437622-ABFF-40FC-948A-2D926A16C9C2}" destId="{7A5859E3-5729-4797-8D5C-D5FED73D0B2E}" srcOrd="0" destOrd="0" presId="urn:microsoft.com/office/officeart/2005/8/layout/orgChart1"/>
+    <dgm:cxn modelId="{D42B547A-3BA8-40F1-96E4-8EB7F5FFFB6E}" type="presOf" srcId="{003393E9-8076-4FF8-A132-BE48278ECCD0}" destId="{27B2EFD6-65D1-4FBD-AB6B-CE2AFFCD618A}" srcOrd="1" destOrd="0" presId="urn:microsoft.com/office/officeart/2005/8/layout/orgChart1"/>
+    <dgm:cxn modelId="{4C7BA36F-8B2F-4A48-B89C-E4DE33AE0047}" type="presOf" srcId="{A0DB2208-0287-4860-A3E2-FE5A64BEC9DF}" destId="{D0FCADBF-CE78-4AEB-B579-353D551E8E5C}" srcOrd="1" destOrd="0" presId="urn:microsoft.com/office/officeart/2005/8/layout/orgChart1"/>
+    <dgm:cxn modelId="{60AB53E8-3752-4692-8C07-5DFCE99B92FC}" type="presOf" srcId="{B8AD3FDB-62B5-43CC-8C3E-4F5B3AFF587E}" destId="{351EEADF-DDE7-4AB0-9115-D51015F932F4}" srcOrd="1" destOrd="0" presId="urn:microsoft.com/office/officeart/2005/8/layout/orgChart1"/>
+    <dgm:cxn modelId="{0AFB4EC0-730E-47A3-94A0-0B1D7A8CCC71}" type="presOf" srcId="{DFFEFCBB-A209-4917-9681-660DFA13E64F}" destId="{24FB80E3-61BC-43CE-96CD-B9DABA3064B0}" srcOrd="0" destOrd="0" presId="urn:microsoft.com/office/officeart/2005/8/layout/orgChart1"/>
+    <dgm:cxn modelId="{AA7380E7-B510-40BC-B1E0-2B4C6EA73ABC}" type="presOf" srcId="{40BCF024-F5C2-4C0D-BFDB-5643E2836A8D}" destId="{57A54197-CE82-4B07-82C2-7E58390A6116}" srcOrd="0" destOrd="0" presId="urn:microsoft.com/office/officeart/2005/8/layout/orgChart1"/>
+    <dgm:cxn modelId="{0E22C312-262B-423E-84AD-7363CDD69F9F}" type="presOf" srcId="{2C1582BA-1E36-44E1-AB7E-5464369BDF2C}" destId="{8F795C33-B06C-4B2C-9D53-F1B409C1F63D}" srcOrd="1" destOrd="0" presId="urn:microsoft.com/office/officeart/2005/8/layout/orgChart1"/>
+    <dgm:cxn modelId="{04905492-E17A-4369-9593-EBDFA102E7F9}" type="presOf" srcId="{D457A40A-56B9-4F4F-B5B7-A69DF2E1F522}" destId="{04644049-780B-4B76-AC98-F1618B2945C4}" srcOrd="0" destOrd="0" presId="urn:microsoft.com/office/officeart/2005/8/layout/orgChart1"/>
+    <dgm:cxn modelId="{304A997F-55DA-4D80-9628-C733375D91EB}" type="presOf" srcId="{9CAA754C-E6D9-4A46-ABA6-878655BAEF8C}" destId="{A37DF5B7-4916-4A3B-8A3D-2D2F05D43D81}" srcOrd="0" destOrd="0" presId="urn:microsoft.com/office/officeart/2005/8/layout/orgChart1"/>
+    <dgm:cxn modelId="{77BD5103-F40A-4440-BF15-EFE3DBCC5037}" type="presOf" srcId="{66BBC26C-D840-4A54-86D3-3188AE28C087}" destId="{0943457C-9117-4233-A82E-3FB56BA0FD75}" srcOrd="0" destOrd="0" presId="urn:microsoft.com/office/officeart/2005/8/layout/orgChart1"/>
+    <dgm:cxn modelId="{D456A866-0175-4256-B403-040BE216C01C}" type="presOf" srcId="{B7A998B6-3CFD-4CE5-ABF6-102C39C44168}" destId="{EA1F1C93-8A6B-44B5-8914-66DA45F81B9B}" srcOrd="0" destOrd="0" presId="urn:microsoft.com/office/officeart/2005/8/layout/orgChart1"/>
+    <dgm:cxn modelId="{5E311167-4183-429F-A356-95665FCC7EB1}" type="presOf" srcId="{003393E9-8076-4FF8-A132-BE48278ECCD0}" destId="{E95FA72E-FE12-4EE4-B5BA-A9310B1B1683}" srcOrd="0" destOrd="0" presId="urn:microsoft.com/office/officeart/2005/8/layout/orgChart1"/>
+    <dgm:cxn modelId="{0CFAC53B-E824-4D2E-B15C-F7D2C8653FB7}" type="presOf" srcId="{D3BB9439-3AF0-42C0-AB8D-88AF1C54095C}" destId="{987392C5-141E-48C7-9DEA-A405C13A54B3}" srcOrd="1" destOrd="0" presId="urn:microsoft.com/office/officeart/2005/8/layout/orgChart1"/>
+    <dgm:cxn modelId="{DACB5F75-E6B0-4B7F-B889-0893DBE4864B}" type="presOf" srcId="{779A4152-A6FD-4812-A864-B13B238109FC}" destId="{B0AEACD3-5BE0-482F-A624-72DDEF621B53}" srcOrd="1" destOrd="0" presId="urn:microsoft.com/office/officeart/2005/8/layout/orgChart1"/>
+    <dgm:cxn modelId="{02769CF7-5CFE-4187-B32A-7B88BC5D685F}" srcId="{A12CA174-2EA1-4254-A2E2-9C94FA356EC7}" destId="{E6F355BE-A692-4BCE-AFC3-B464A275299A}" srcOrd="7" destOrd="0" parTransId="{1B566B84-3B0B-436F-8189-6AC1F2BB3FC5}" sibTransId="{7936D18A-1163-4F1F-AA07-584F2502FB36}"/>
+    <dgm:cxn modelId="{D8F8E9AC-0FC8-4D1C-9BB0-03527B64F00F}" type="presOf" srcId="{CF1E7812-101D-4DF3-A7B5-DAFFB48917D2}" destId="{D4FD6694-D327-44FF-B728-6A169BA638D4}" srcOrd="1" destOrd="0" presId="urn:microsoft.com/office/officeart/2005/8/layout/orgChart1"/>
+    <dgm:cxn modelId="{DE86024A-09DC-45A8-9471-0B7B5E896AA2}" type="presOf" srcId="{779A4152-A6FD-4812-A864-B13B238109FC}" destId="{28E62C6E-0011-4AA1-9F7E-0CBB6AA68AD2}" srcOrd="0" destOrd="0" presId="urn:microsoft.com/office/officeart/2005/8/layout/orgChart1"/>
+    <dgm:cxn modelId="{F28C6A58-D0A6-408A-8D8F-9079EA53D1CE}" type="presOf" srcId="{75891BF6-2B04-4533-9FF6-C5A26B06D36E}" destId="{6D043A8B-9884-400A-B87B-506B3B902105}" srcOrd="1" destOrd="0" presId="urn:microsoft.com/office/officeart/2005/8/layout/orgChart1"/>
+    <dgm:cxn modelId="{837270FC-768F-4196-A4FF-F475D5574D73}" type="presOf" srcId="{08F7D90B-DD5F-47B6-918B-EC4EAA8ACAD1}" destId="{40B3E233-13F6-44C4-848F-703203FF2154}" srcOrd="0" destOrd="0" presId="urn:microsoft.com/office/officeart/2005/8/layout/orgChart1"/>
+    <dgm:cxn modelId="{D8BB02FA-5E30-4C22-83B6-2B9884C3AE58}" type="presOf" srcId="{925F4CF3-0DE2-4266-BB71-2D5B5E2E47B9}" destId="{88DD66CC-7DFF-4CBD-A83C-B81F872712CA}" srcOrd="0" destOrd="0" presId="urn:microsoft.com/office/officeart/2005/8/layout/orgChart1"/>
+    <dgm:cxn modelId="{DC6A451E-D1D7-4C31-A61C-7C8452589938}" type="presOf" srcId="{C4A8471A-4B9E-488E-9113-5F14ED685C1C}" destId="{23A2510C-DF51-440E-9643-FAC1D69D4554}" srcOrd="0" destOrd="0" presId="urn:microsoft.com/office/officeart/2005/8/layout/orgChart1"/>
+    <dgm:cxn modelId="{3F23CB67-4790-4A7C-8CE8-32E3639E25F8}" type="presOf" srcId="{8DF21F59-4716-4250-BD7E-144F4D63CBC5}" destId="{392A2800-04D4-4BCA-A79F-9A9EA3200717}" srcOrd="0" destOrd="0" presId="urn:microsoft.com/office/officeart/2005/8/layout/orgChart1"/>
+    <dgm:cxn modelId="{726E5D66-7D55-456B-ADEE-A74EF35B513D}" type="presOf" srcId="{DDBCFA16-FF48-4701-9B4A-F21E4666E982}" destId="{DE2187BC-0901-4F55-A5FA-4A6D618599FD}" srcOrd="0" destOrd="0" presId="urn:microsoft.com/office/officeart/2005/8/layout/orgChart1"/>
+    <dgm:cxn modelId="{723BDA4F-10FC-4EC4-843A-ED8923338FB1}" srcId="{6A8B354A-8DFF-4438-9E28-0978BD25CCDE}" destId="{B7A998B6-3CFD-4CE5-ABF6-102C39C44168}" srcOrd="1" destOrd="0" parTransId="{F74A4FB1-16A2-4B5E-A92A-76664DA97325}" sibTransId="{519321E6-724E-4B56-B75B-9A78667F62A4}"/>
+    <dgm:cxn modelId="{66BD077D-3193-487B-AC26-805A9C7F8F71}" type="presOf" srcId="{A974D924-41A7-4AEC-8F52-A64CBC1E37F4}" destId="{B37A9B3D-E534-4D0C-8A94-8B37F01BBF99}" srcOrd="0" destOrd="0" presId="urn:microsoft.com/office/officeart/2005/8/layout/orgChart1"/>
+    <dgm:cxn modelId="{E84B1A76-5B9F-44D6-AA7C-EA50B20D83CC}" type="presOf" srcId="{1E47E0C3-F305-40E4-9317-CDB2B113F3FC}" destId="{19C1B8F6-53CC-4F21-8506-CCE80C245A6D}" srcOrd="0" destOrd="0" presId="urn:microsoft.com/office/officeart/2005/8/layout/orgChart1"/>
+    <dgm:cxn modelId="{8E66EB93-7D70-4165-97DC-999CD69A3069}" srcId="{6F6C34EC-D04B-4D56-86A3-3E939B149C9F}" destId="{397E882A-8E4B-419F-A35B-3AFC7D7CD9AD}" srcOrd="8" destOrd="0" parTransId="{7F3829AB-08D4-42EE-A778-D78F829EF8B9}" sibTransId="{ECC246A9-4F4D-4422-89B9-04D751FD176C}"/>
+    <dgm:cxn modelId="{FDB5D20E-AE3A-4AAC-8063-BB90919809D3}" srcId="{66BBC26C-D840-4A54-86D3-3188AE28C087}" destId="{CF1E7812-101D-4DF3-A7B5-DAFFB48917D2}" srcOrd="1" destOrd="0" parTransId="{DFFEFCBB-A209-4917-9681-660DFA13E64F}" sibTransId="{E8EB3A16-FD54-4ADD-B18A-4C74095D1B5C}"/>
+    <dgm:cxn modelId="{5F07D8A8-4E89-42A6-811B-32CA55B3909B}" type="presOf" srcId="{BAC8ED56-9041-4B42-94A8-15F81727F6E9}" destId="{C7C00CDA-C5A1-4937-ADD6-4F115E89BE65}" srcOrd="0" destOrd="0" presId="urn:microsoft.com/office/officeart/2005/8/layout/orgChart1"/>
+    <dgm:cxn modelId="{F53EAFAF-D116-44B3-A251-6DF29017A6AB}" type="presOf" srcId="{E2983617-B5F4-4C75-81E3-8F79C5CAD3D9}" destId="{78B7BEF3-AEFB-4F51-AAD7-74FA8B80F276}" srcOrd="0" destOrd="0" presId="urn:microsoft.com/office/officeart/2005/8/layout/orgChart1"/>
+    <dgm:cxn modelId="{6F80C7E6-532F-48BC-8EF0-B735714C922D}" type="presOf" srcId="{5505AFFD-EF3C-433E-B042-B7089BA0CA6C}" destId="{72776E21-64F2-46DC-BBCB-8EF5423FEC94}" srcOrd="0" destOrd="0" presId="urn:microsoft.com/office/officeart/2005/8/layout/orgChart1"/>
+    <dgm:cxn modelId="{28D45EB9-55B6-4C6C-A355-6C1E5449EBB5}" type="presOf" srcId="{BDBE938E-0EB9-42C3-A806-B193872D144A}" destId="{6F7708FE-B68C-411C-8A8D-5EFBF18B3C58}" srcOrd="0" destOrd="0" presId="urn:microsoft.com/office/officeart/2005/8/layout/orgChart1"/>
+    <dgm:cxn modelId="{44462340-6698-445B-928D-DCDEE737FE2F}" type="presOf" srcId="{A23490DE-FFAE-4D31-8649-F7A3429DDBC1}" destId="{584F23C7-48B9-4FDA-A0C1-E191680C78A4}" srcOrd="0" destOrd="0" presId="urn:microsoft.com/office/officeart/2005/8/layout/orgChart1"/>
+    <dgm:cxn modelId="{6B43E898-3813-4F91-AAF9-8F7248A74EAC}" type="presOf" srcId="{5215C3D3-851F-46CC-A361-F2F3BA144B72}" destId="{4DDB96BE-474E-4630-931B-3AD80045574F}" srcOrd="0" destOrd="0" presId="urn:microsoft.com/office/officeart/2005/8/layout/orgChart1"/>
+    <dgm:cxn modelId="{B6A5B3D3-6692-409A-9E81-4B5F39624051}" srcId="{3E71C5FB-B753-47D4-9DCC-13828975B0A2}" destId="{E49793DC-11A4-4FE5-B412-BDD04A01C875}" srcOrd="2" destOrd="0" parTransId="{E91EF19E-5F9E-4407-BB36-B70ED62373C5}" sibTransId="{CE9F42AB-72D8-42F6-AC1D-8832FAE66018}"/>
+    <dgm:cxn modelId="{C7708B5D-E01A-4756-9638-0A2037CF94EF}" type="presOf" srcId="{E49793DC-11A4-4FE5-B412-BDD04A01C875}" destId="{E9231F57-B2A8-4B60-B3EB-7B14DA39C96F}" srcOrd="0" destOrd="0" presId="urn:microsoft.com/office/officeart/2005/8/layout/orgChart1"/>
+    <dgm:cxn modelId="{E07D3F72-1B48-4629-A095-50EF894A6391}" type="presOf" srcId="{71207E5B-E26C-41C9-8A41-12011AC99E24}" destId="{55224759-248D-4C35-9D3B-1E85F56EB2FE}" srcOrd="0" destOrd="0" presId="urn:microsoft.com/office/officeart/2005/8/layout/orgChart1"/>
+    <dgm:cxn modelId="{CA2B7D54-5CC3-4325-8493-97D560CC8B9D}" type="presOf" srcId="{5E747862-7F4F-48C2-9656-0F2A1029D161}" destId="{3F97FD23-B1D6-4209-B638-322A19C06965}" srcOrd="0" destOrd="0" presId="urn:microsoft.com/office/officeart/2005/8/layout/orgChart1"/>
+    <dgm:cxn modelId="{042AC9A2-234D-458C-ACB5-2C982B2FE9E2}" type="presOf" srcId="{E0F2B946-63C9-40A9-8DA4-823451445D94}" destId="{7AEA745E-64A3-40EE-B7B1-8567B0CD52D7}" srcOrd="0" destOrd="0" presId="urn:microsoft.com/office/officeart/2005/8/layout/orgChart1"/>
+    <dgm:cxn modelId="{E7B7964F-55B5-4E25-A54C-F31964FE317F}" srcId="{E49793DC-11A4-4FE5-B412-BDD04A01C875}" destId="{66BBC26C-D840-4A54-86D3-3188AE28C087}" srcOrd="0" destOrd="0" parTransId="{5BFC7CF1-7C30-48C9-A388-9B1D96528977}" sibTransId="{93F916F0-4522-47F0-B0C1-E262B2F9F953}"/>
+    <dgm:cxn modelId="{CD88E303-1AFA-435F-B1A1-8061A431569C}" type="presOf" srcId="{75891BF6-2B04-4533-9FF6-C5A26B06D36E}" destId="{835878BC-DD36-43E2-B916-A1C58D993D8F}" srcOrd="0" destOrd="0" presId="urn:microsoft.com/office/officeart/2005/8/layout/orgChart1"/>
+    <dgm:cxn modelId="{E5590C9D-E9AA-4E91-A5CC-977A476A687D}" type="presOf" srcId="{A57018D7-84ED-488F-BB9E-3D81E4943144}" destId="{B089BFF1-7EAC-4617-871D-2CEA92AB29F4}" srcOrd="1" destOrd="0" presId="urn:microsoft.com/office/officeart/2005/8/layout/orgChart1"/>
+    <dgm:cxn modelId="{2B2DEB15-E8B2-46E5-B351-2CA70D419CFE}" type="presOf" srcId="{ABFBDFAE-74B1-4476-B6DB-C215E08D23B2}" destId="{1AC29E14-915B-4911-AF3F-938CC06FDB8F}" srcOrd="1" destOrd="0" presId="urn:microsoft.com/office/officeart/2005/8/layout/orgChart1"/>
+    <dgm:cxn modelId="{5468F2ED-C85F-4A84-B036-C77B12EED64F}" type="presOf" srcId="{42AB1B98-997E-4DD4-82CB-98CED7A92BF2}" destId="{C3AB7433-9F2E-4A8C-A5F9-A8969A074E88}" srcOrd="0" destOrd="0" presId="urn:microsoft.com/office/officeart/2005/8/layout/orgChart1"/>
+    <dgm:cxn modelId="{14083668-1EB9-49E4-9E95-EF239B2EAF4C}" srcId="{B7A998B6-3CFD-4CE5-ABF6-102C39C44168}" destId="{40BCF024-F5C2-4C0D-BFDB-5643E2836A8D}" srcOrd="2" destOrd="0" parTransId="{6032129E-23D8-4962-94D5-ABBFEBC304CD}" sibTransId="{8B0AEF8F-D6D4-4FEF-97D8-A2A1F63D1E32}"/>
+    <dgm:cxn modelId="{B727D8C6-7919-4E63-BB86-F3B79FC5D66C}" srcId="{3E71C5FB-B753-47D4-9DCC-13828975B0A2}" destId="{DDBCFA16-FF48-4701-9B4A-F21E4666E982}" srcOrd="1" destOrd="0" parTransId="{91B628C4-F28F-4C57-BADA-4C525DD54D79}" sibTransId="{D8D6F392-D5A7-451D-B7B7-33EB3E0338DE}"/>
+    <dgm:cxn modelId="{C87976F7-0DF6-43DD-B0D3-8F52FC7FB608}" srcId="{E7F2B5B6-CF87-43D8-956B-865FA12A9832}" destId="{8DF21F59-4716-4250-BD7E-144F4D63CBC5}" srcOrd="3" destOrd="0" parTransId="{0D775FB3-6EA1-4D27-B7F9-88A660B213AA}" sibTransId="{8975F2F3-D062-4D59-97F9-C087C2321AF1}"/>
+    <dgm:cxn modelId="{2DE4B19C-F12E-4954-9A3A-778C1CB717A9}" srcId="{036F865D-B49C-497C-A28F-FACEB37BE973}" destId="{15EDC76C-57B9-43BE-BF45-2205A01BA0A3}" srcOrd="5" destOrd="0" parTransId="{4D9549AF-AF34-48E0-866B-C063EF037D12}" sibTransId="{180205B7-8E6E-4E2C-91F0-5CFDE9E01D52}"/>
+    <dgm:cxn modelId="{B09D882E-5F5C-4056-85CC-3A4A9F2F1CD5}" srcId="{036F865D-B49C-497C-A28F-FACEB37BE973}" destId="{2E17DAB0-83AA-4E1C-A393-685377E018BA}" srcOrd="9" destOrd="0" parTransId="{B6068B13-10D0-4540-903D-094B6D761789}" sibTransId="{2D678007-1D34-4BB8-A0B1-14B9DA190469}"/>
+    <dgm:cxn modelId="{99BB6038-EEA7-4965-A627-78FEE9857242}" type="presOf" srcId="{5BFC7CF1-7C30-48C9-A388-9B1D96528977}" destId="{2782FA1D-8DAB-47BD-B9E3-D84483375638}" srcOrd="0" destOrd="0" presId="urn:microsoft.com/office/officeart/2005/8/layout/orgChart1"/>
+    <dgm:cxn modelId="{6CCE2140-F19C-4BEE-AA78-4DF048FAFB83}" srcId="{036F865D-B49C-497C-A28F-FACEB37BE973}" destId="{16E257D9-552D-418B-80F5-CF8B2A4A81F5}" srcOrd="4" destOrd="0" parTransId="{4E552C99-E3B0-4D8F-AB3B-2707F7D7FF07}" sibTransId="{EED39783-688B-4907-A0BA-BAC8B3196EBE}"/>
+    <dgm:cxn modelId="{8B3975CF-3F40-4DF3-8BC7-A71BCDE07BBF}" type="presOf" srcId="{E621B393-E081-4074-9CF7-24B8C04658FF}" destId="{25581C89-F6A7-45B1-806B-D9A774C48FF2}" srcOrd="0" destOrd="0" presId="urn:microsoft.com/office/officeart/2005/8/layout/orgChart1"/>
+    <dgm:cxn modelId="{3EBB9851-1692-4370-8E2F-E7DA75B92171}" type="presOf" srcId="{E6512187-A44F-40F0-88C3-E2E4C07824B7}" destId="{C24FF2F0-14AE-4A01-929B-C5D80FE3D200}" srcOrd="0" destOrd="0" presId="urn:microsoft.com/office/officeart/2005/8/layout/orgChart1"/>
+    <dgm:cxn modelId="{C9926210-BC1A-4167-92F5-6B529D067A1D}" type="presOf" srcId="{A94B5336-2754-49B3-9294-B4493062AE02}" destId="{CAEEDEE8-8381-4398-8AD3-77635320FB09}" srcOrd="0" destOrd="0" presId="urn:microsoft.com/office/officeart/2005/8/layout/orgChart1"/>
+    <dgm:cxn modelId="{7722BE7E-D250-4D08-AF7F-FC69364DFF74}" srcId="{CF1E7812-101D-4DF3-A7B5-DAFFB48917D2}" destId="{E45D94D1-C699-49D6-8FB7-1A53EF69E9C4}" srcOrd="1" destOrd="0" parTransId="{A019E9A3-76AF-4373-8831-B9D10BF05C12}" sibTransId="{6EC14FFF-8118-4AB3-9147-6AC0BCC6A6D4}"/>
+    <dgm:cxn modelId="{864DFF00-5AB0-4EA9-AF35-647206E377A9}" type="presOf" srcId="{6F6C34EC-D04B-4D56-86A3-3E939B149C9F}" destId="{AD0BEDBF-F771-40B9-A7A5-DEDE27EC7D0F}" srcOrd="0" destOrd="0" presId="urn:microsoft.com/office/officeart/2005/8/layout/orgChart1"/>
+    <dgm:cxn modelId="{2657E1A9-270A-4D4B-B848-85087DC73442}" type="presOf" srcId="{9F200D04-6C2F-4163-B6FC-6A05CBEF6041}" destId="{1B0AD80D-4C61-4684-B864-346A72C8ACDA}" srcOrd="0" destOrd="0" presId="urn:microsoft.com/office/officeart/2005/8/layout/orgChart1"/>
+    <dgm:cxn modelId="{EE4A8808-659E-43A1-AD9F-9B88833678C0}" srcId="{6F6C34EC-D04B-4D56-86A3-3E939B149C9F}" destId="{A1E21DB3-4238-483C-8C46-4651EF0F3427}" srcOrd="7" destOrd="0" parTransId="{FBB1AB93-1B13-4A16-9237-214B953783E0}" sibTransId="{C0AE9AFC-3771-4460-B8EB-AAB0BD24D8BE}"/>
+    <dgm:cxn modelId="{5DCE22F2-778F-4933-839F-D33149B415D5}" srcId="{036F865D-B49C-497C-A28F-FACEB37BE973}" destId="{85469F26-7E84-4E68-B914-7D140FF6A72E}" srcOrd="7" destOrd="0" parTransId="{01D5BAB2-961F-473A-B3FF-E3EA572DD70A}" sibTransId="{3D0D7D1F-89C8-4436-923E-8DFAB4196D06}"/>
+    <dgm:cxn modelId="{B6A948C2-3B11-43A7-BC59-FD8DBD63AFB9}" type="presOf" srcId="{ED918E41-8FEA-4230-B27E-1B60FEB2B6F5}" destId="{E9F17D80-C6B9-48EA-9762-DA965E907594}" srcOrd="1" destOrd="0" presId="urn:microsoft.com/office/officeart/2005/8/layout/orgChart1"/>
+    <dgm:cxn modelId="{6D0CE5E9-6074-48E7-8BC3-6362A79F8C3C}" type="presOf" srcId="{17146953-BB10-4775-A2C8-6BD3AF1E8307}" destId="{638B92A1-2DBC-4AD6-83A6-ECA96C4C5705}" srcOrd="0" destOrd="0" presId="urn:microsoft.com/office/officeart/2005/8/layout/orgChart1"/>
+    <dgm:cxn modelId="{3089C613-3DA5-4F25-998A-99B79995BB13}" type="presOf" srcId="{B3CE34A7-3737-4E98-BC58-22D32761C765}" destId="{AA015747-1E6A-429B-AD9B-E2148433DBC8}" srcOrd="0" destOrd="0" presId="urn:microsoft.com/office/officeart/2005/8/layout/orgChart1"/>
+    <dgm:cxn modelId="{B4830BA8-8BD2-4856-850E-BFFC96BECE4B}" type="presOf" srcId="{39B8B1D4-80BD-49EE-AD66-399B0CF4CBD7}" destId="{EF0180FF-CD88-4D8A-B562-FA2B7B274629}" srcOrd="0" destOrd="0" presId="urn:microsoft.com/office/officeart/2005/8/layout/orgChart1"/>
+    <dgm:cxn modelId="{F3F1A9E0-E59D-4061-A51F-FA80A34CD07E}" type="presOf" srcId="{8CFCF336-ACA3-4BDF-9255-F0461DEBF18A}" destId="{7DA07A9E-8A16-4116-92F8-8D90D254EDEC}" srcOrd="0" destOrd="0" presId="urn:microsoft.com/office/officeart/2005/8/layout/orgChart1"/>
+    <dgm:cxn modelId="{676D22C9-B0F7-4712-82D1-4759B5B9B709}" srcId="{036F865D-B49C-497C-A28F-FACEB37BE973}" destId="{A0DB2208-0287-4860-A3E2-FE5A64BEC9DF}" srcOrd="8" destOrd="0" parTransId="{2F41C27A-E39C-4022-8C3C-C3D3DD3E646F}" sibTransId="{22C8EFBC-46D0-45B9-BCE3-3E6339D5865F}"/>
+    <dgm:cxn modelId="{AD2BD445-88AA-4C23-A69C-46653F89E522}" srcId="{E7F2B5B6-CF87-43D8-956B-865FA12A9832}" destId="{44C92458-6162-43E3-89A4-2E81084BFC0B}" srcOrd="6" destOrd="0" parTransId="{5A2E9414-479E-446C-A2E4-726DD6DA6FCB}" sibTransId="{E75C25CC-32CD-4B0F-8FD4-DBB4A834B9C1}"/>
+    <dgm:cxn modelId="{3F2AC8E0-E3A7-472E-A644-B11128B81A0E}" srcId="{6F6C34EC-D04B-4D56-86A3-3E939B149C9F}" destId="{B8AD3FDB-62B5-43CC-8C3E-4F5B3AFF587E}" srcOrd="3" destOrd="0" parTransId="{09C0A2EE-E4B2-42C9-8CB6-C39B37F93CA5}" sibTransId="{03A55EDE-8B71-449C-B0D6-8D6FF4B3C448}"/>
+    <dgm:cxn modelId="{1A5780DF-AB6F-4EBA-95AC-99806D79A381}" type="presOf" srcId="{D6455155-8DE5-4F96-86B3-6295D109D78B}" destId="{21C3A946-246C-444D-9867-3EE813888554}" srcOrd="1" destOrd="0" presId="urn:microsoft.com/office/officeart/2005/8/layout/orgChart1"/>
+    <dgm:cxn modelId="{3E063938-1838-4E8A-98D0-EDF093092878}" type="presOf" srcId="{16E257D9-552D-418B-80F5-CF8B2A4A81F5}" destId="{1CF9BD50-EF74-4BA8-B055-045C20474701}" srcOrd="1" destOrd="0" presId="urn:microsoft.com/office/officeart/2005/8/layout/orgChart1"/>
+    <dgm:cxn modelId="{ABB19268-9D42-4BB9-A752-7F8C9178DF41}" srcId="{BDBE938E-0EB9-42C3-A806-B193872D144A}" destId="{036F865D-B49C-497C-A28F-FACEB37BE973}" srcOrd="0" destOrd="0" parTransId="{86437622-ABFF-40FC-948A-2D926A16C9C2}" sibTransId="{9C6B1986-AB9B-477F-863E-A1FF7C47377B}"/>
+    <dgm:cxn modelId="{224B5F98-FA6A-4229-B57A-2FF7CFFDB7FD}" srcId="{E7F2B5B6-CF87-43D8-956B-865FA12A9832}" destId="{D3BB9439-3AF0-42C0-AB8D-88AF1C54095C}" srcOrd="7" destOrd="0" parTransId="{B67B89A4-82EA-44F8-B6C1-3F5C0C4882E2}" sibTransId="{0F7A3DD9-A560-4EBC-90C9-916A2536DDDB}"/>
+    <dgm:cxn modelId="{D0CB6AF6-FB64-4B4E-B4EF-B984A8F64C43}" type="presOf" srcId="{09C0A2EE-E4B2-42C9-8CB6-C39B37F93CA5}" destId="{6B02B729-9109-4F1E-B2E6-AA51BFE67673}" srcOrd="0" destOrd="0" presId="urn:microsoft.com/office/officeart/2005/8/layout/orgChart1"/>
+    <dgm:cxn modelId="{5C00B694-2911-41EB-A23B-6D8E7702B69A}" type="presOf" srcId="{781618CB-6D74-4BCB-AEE2-FAC5CB743DCD}" destId="{F16B8574-CB18-4FF4-BB06-9C99D0181C67}" srcOrd="0" destOrd="0" presId="urn:microsoft.com/office/officeart/2005/8/layout/orgChart1"/>
+    <dgm:cxn modelId="{174D7E1E-B21E-4F22-B32B-E001E756BA57}" type="presOf" srcId="{568786E3-CB59-4DB9-A75B-F3F7C409ACBF}" destId="{0052060F-9BD7-4B5A-8549-A081978AC279}" srcOrd="0" destOrd="0" presId="urn:microsoft.com/office/officeart/2005/8/layout/orgChart1"/>
+    <dgm:cxn modelId="{3D370610-31ED-42AB-BDB6-F91B699F3D0A}" type="presOf" srcId="{6DC63F07-3C40-4586-9546-0B182BD07E9B}" destId="{70EBA4A0-CF67-4F6D-A518-A91840F2605A}" srcOrd="0" destOrd="0" presId="urn:microsoft.com/office/officeart/2005/8/layout/orgChart1"/>
+    <dgm:cxn modelId="{292EF72E-4ED6-42B0-9FDF-7087C335B504}" srcId="{E7F2B5B6-CF87-43D8-956B-865FA12A9832}" destId="{779A4152-A6FD-4812-A864-B13B238109FC}" srcOrd="1" destOrd="0" parTransId="{AB3EB838-C92F-483C-B532-333A2D91C7DA}" sibTransId="{1B84A41F-86C5-4147-BB31-E85A6D7F5088}"/>
+    <dgm:cxn modelId="{C1815C18-1A8A-4B0D-BD5E-196546F23669}" srcId="{E7F2B5B6-CF87-43D8-956B-865FA12A9832}" destId="{17146953-BB10-4775-A2C8-6BD3AF1E8307}" srcOrd="11" destOrd="0" parTransId="{A23490DE-FFAE-4D31-8649-F7A3429DDBC1}" sibTransId="{2AFFCF1D-DE10-4E55-8674-A6827A1EC7CB}"/>
+    <dgm:cxn modelId="{BFBF79A5-9439-4879-8BC4-D43B7B5CF6E7}" type="presOf" srcId="{C9A2CEE2-9518-4767-ABDA-FEC5C5734C63}" destId="{BA75525E-AF2A-4871-BEB5-835CA0C6745F}" srcOrd="0" destOrd="0" presId="urn:microsoft.com/office/officeart/2005/8/layout/orgChart1"/>
+    <dgm:cxn modelId="{EA9FC46B-3441-4F0C-86AA-FEAA77817E4E}" type="presOf" srcId="{4E552C99-E3B0-4D8F-AB3B-2707F7D7FF07}" destId="{9A7518DC-8FB4-492F-BF0A-2F43AD9D70D6}" srcOrd="0" destOrd="0" presId="urn:microsoft.com/office/officeart/2005/8/layout/orgChart1"/>
+    <dgm:cxn modelId="{40DD8CB3-1CBD-4E7F-992C-8A4A96ABCCA1}" type="presOf" srcId="{2B565085-B755-4347-A27D-DEEF24EBDCBB}" destId="{9FBE78A9-19BD-4D5D-B227-2B297272CF3E}" srcOrd="0" destOrd="0" presId="urn:microsoft.com/office/officeart/2005/8/layout/orgChart1"/>
+    <dgm:cxn modelId="{8622A296-F5BA-4F94-92B0-A7CF9367B522}" type="presOf" srcId="{9CAA754C-E6D9-4A46-ABA6-878655BAEF8C}" destId="{7BD448E9-0848-4D01-972D-E115C810CFB9}" srcOrd="1" destOrd="0" presId="urn:microsoft.com/office/officeart/2005/8/layout/orgChart1"/>
+    <dgm:cxn modelId="{9EFF9066-3A22-47B6-8710-1A4BBE254B39}" type="presOf" srcId="{D39555DC-FD40-400A-8291-2B20647F4971}" destId="{972C6FF3-E1BA-4E88-8065-3F56851B72BD}" srcOrd="1" destOrd="0" presId="urn:microsoft.com/office/officeart/2005/8/layout/orgChart1"/>
+    <dgm:cxn modelId="{F0363551-90F0-444F-8A33-DE749D0AC422}" srcId="{DDBCFA16-FF48-4701-9B4A-F21E4666E982}" destId="{6A8B354A-8DFF-4438-9E28-0978BD25CCDE}" srcOrd="1" destOrd="0" parTransId="{8CFCF336-ACA3-4BDF-9255-F0461DEBF18A}" sibTransId="{08856827-D300-4BD1-BB30-89D856D01A85}"/>
+    <dgm:cxn modelId="{307BD23C-4C74-45B6-8A18-51A0CEC35E11}" type="presOf" srcId="{42AB1B98-997E-4DD4-82CB-98CED7A92BF2}" destId="{F4E872C2-934B-4231-91E9-8AC9FC5E6A9C}" srcOrd="1" destOrd="0" presId="urn:microsoft.com/office/officeart/2005/8/layout/orgChart1"/>
+    <dgm:cxn modelId="{3A3CF9F5-A07E-468B-97B7-059EAC3FE270}" type="presOf" srcId="{5E48943E-53EF-42BA-BAE2-FFE959C25D2E}" destId="{B1E9204A-0085-4748-B6E3-B59EDB6B02FF}" srcOrd="0" destOrd="0" presId="urn:microsoft.com/office/officeart/2005/8/layout/orgChart1"/>
+    <dgm:cxn modelId="{A91B6DBE-2E48-4AC5-896A-CC07C14C9B54}" type="presOf" srcId="{E7F2B5B6-CF87-43D8-956B-865FA12A9832}" destId="{7966CEC0-2A6B-4AD4-BE2B-D93BA31C9556}" srcOrd="0" destOrd="0" presId="urn:microsoft.com/office/officeart/2005/8/layout/orgChart1"/>
+    <dgm:cxn modelId="{07FA2EC9-32A7-485C-9304-F079885BF422}" srcId="{6F6C34EC-D04B-4D56-86A3-3E939B149C9F}" destId="{E2983617-B5F4-4C75-81E3-8F79C5CAD3D9}" srcOrd="2" destOrd="0" parTransId="{F59FBA88-6DA3-4931-AF85-1FEF48D0FE76}" sibTransId="{97D65DE7-1255-44DD-A3BC-F838D36DB41A}"/>
+    <dgm:cxn modelId="{EE99DA56-C2BD-4492-9172-2A3A6D341911}" type="presOf" srcId="{5B650B58-E6B4-4F81-9E92-48805D7BAFC8}" destId="{364764C0-1DEE-4CB7-8635-36A8D87C6C6A}" srcOrd="0" destOrd="0" presId="urn:microsoft.com/office/officeart/2005/8/layout/orgChart1"/>
+    <dgm:cxn modelId="{AC3C3DD8-9108-49BF-8467-E36BA5B09B78}" type="presOf" srcId="{0D775FB3-6EA1-4D27-B7F9-88A660B213AA}" destId="{795639F0-130D-4715-81F4-0CC616C64FB3}" srcOrd="0" destOrd="0" presId="urn:microsoft.com/office/officeart/2005/8/layout/orgChart1"/>
+    <dgm:cxn modelId="{CE5938A4-A991-41D6-94BB-D8204CA35A4A}" type="presOf" srcId="{39B8B1D4-80BD-49EE-AD66-399B0CF4CBD7}" destId="{247A70D3-1D91-4611-BEC5-D69C7504AD82}" srcOrd="1" destOrd="0" presId="urn:microsoft.com/office/officeart/2005/8/layout/orgChart1"/>
+    <dgm:cxn modelId="{BAC802A5-F266-425D-911A-C2844802EDB6}" srcId="{036F865D-B49C-497C-A28F-FACEB37BE973}" destId="{BAC8ED56-9041-4B42-94A8-15F81727F6E9}" srcOrd="2" destOrd="0" parTransId="{6823163E-339E-47B3-B957-04897E98412A}" sibTransId="{1C1DA8F8-92DF-42AA-A310-AF68AD0F31B1}"/>
+    <dgm:cxn modelId="{62930BA5-A938-4361-9BEC-9F806292E2F4}" srcId="{A12CA174-2EA1-4254-A2E2-9C94FA356EC7}" destId="{3ADDB50E-C716-4235-8030-97BFF40B2B70}" srcOrd="0" destOrd="0" parTransId="{71207E5B-E26C-41C9-8A41-12011AC99E24}" sibTransId="{6102893D-2211-4EFA-84BB-9067CDD0D224}"/>
+    <dgm:cxn modelId="{F1F86ABC-BA08-4AA1-8880-A4DB418CF17A}" srcId="{E49793DC-11A4-4FE5-B412-BDD04A01C875}" destId="{5E747862-7F4F-48C2-9656-0F2A1029D161}" srcOrd="1" destOrd="0" parTransId="{AF7CD24D-0163-4221-AE52-2FADAF1DBDE1}" sibTransId="{708463A1-F645-4522-B160-944144264BAE}"/>
+    <dgm:cxn modelId="{1C2D76FF-91A9-4C3F-9298-06CBFF9E2E9C}" type="presOf" srcId="{C5370C20-0426-439A-9DC4-138E02297911}" destId="{54A52D23-8C14-4E39-B1AD-F79849C256E1}" srcOrd="0" destOrd="0" presId="urn:microsoft.com/office/officeart/2005/8/layout/orgChart1"/>
+    <dgm:cxn modelId="{CEBC5CDF-116A-4E29-BAD2-334673159C4D}" type="presOf" srcId="{FF731828-F1FB-4C65-AD8B-BA577D11BC61}" destId="{FD57E3D6-B9DE-46A6-A495-8659DDDD82DF}" srcOrd="0" destOrd="0" presId="urn:microsoft.com/office/officeart/2005/8/layout/orgChart1"/>
+    <dgm:cxn modelId="{ABD04C72-7AFF-418A-A515-FBFDDB9EDE53}" srcId="{6F6C34EC-D04B-4D56-86A3-3E939B149C9F}" destId="{29D0BC58-E48F-4187-A5B8-C49CFD41B6F2}" srcOrd="0" destOrd="0" parTransId="{A974D924-41A7-4AEC-8F52-A64CBC1E37F4}" sibTransId="{02CFCA18-D650-48A0-B254-6F1FEA773105}"/>
+    <dgm:cxn modelId="{556A4B41-AC20-43B2-BDDE-9A90ABFFFBFA}" type="presOf" srcId="{514468E7-68B1-4A1C-8A70-3B9D2BD46163}" destId="{F312B54E-4981-428A-8A3C-FD704C6A5BDB}" srcOrd="1" destOrd="0" presId="urn:microsoft.com/office/officeart/2005/8/layout/orgChart1"/>
+    <dgm:cxn modelId="{F277CFDB-E75E-4AF2-B87D-8E9E6A833B06}" type="presOf" srcId="{592EDF8A-A7DA-43DB-849D-96EC567ADCC5}" destId="{B10A94DE-70A4-4D7F-B05A-EFDB63196987}" srcOrd="1" destOrd="0" presId="urn:microsoft.com/office/officeart/2005/8/layout/orgChart1"/>
+    <dgm:cxn modelId="{F79B25E1-4F39-4A76-9081-0B0CDA0E4AA1}" type="presOf" srcId="{C57D86BF-5B9D-41B8-BC5B-A5BCCB7D5E9E}" destId="{FB87FCA5-B933-4131-AC98-F72C05C50BEE}" srcOrd="0" destOrd="0" presId="urn:microsoft.com/office/officeart/2005/8/layout/orgChart1"/>
+    <dgm:cxn modelId="{1A0C66A3-F6C5-4D55-AD0E-60B4EDA04189}" type="presOf" srcId="{6A0697FA-443C-4159-8BAB-54E9CE102235}" destId="{702E32F7-5B65-4989-9D8F-C88083BDAB0F}" srcOrd="1" destOrd="0" presId="urn:microsoft.com/office/officeart/2005/8/layout/orgChart1"/>
+    <dgm:cxn modelId="{2793BE31-9940-4A22-9F84-90A71A8A2060}" srcId="{CF1E7812-101D-4DF3-A7B5-DAFFB48917D2}" destId="{328C9D30-CD38-4F0C-A8AC-D8255B5817AB}" srcOrd="0" destOrd="0" parTransId="{C5370C20-0426-439A-9DC4-138E02297911}" sibTransId="{030F9FD7-A390-4A20-AB50-E4A6D03E43D3}"/>
+    <dgm:cxn modelId="{1EC68511-D718-41BE-A280-B8182ACA509A}" srcId="{A12CA174-2EA1-4254-A2E2-9C94FA356EC7}" destId="{514468E7-68B1-4A1C-8A70-3B9D2BD46163}" srcOrd="1" destOrd="0" parTransId="{5E48943E-53EF-42BA-BAE2-FFE959C25D2E}" sibTransId="{17A0AAB3-21EE-4F4C-A55C-EC39E22D2E6D}"/>
+    <dgm:cxn modelId="{2C6D88D6-6DE1-4B14-9A21-AEE78C1AC6FC}" type="presOf" srcId="{4680C006-E723-4678-9423-DDC71E5793BF}" destId="{89DFFABD-762C-483F-A5BC-D370A23CBB46}" srcOrd="0" destOrd="0" presId="urn:microsoft.com/office/officeart/2005/8/layout/orgChart1"/>
+    <dgm:cxn modelId="{6ABA3F7E-A587-4254-AFAB-FC39000DBC2E}" type="presOf" srcId="{328C9D30-CD38-4F0C-A8AC-D8255B5817AB}" destId="{2F1645D0-CF00-4CAA-AB0A-65F8D3EFC89A}" srcOrd="1" destOrd="0" presId="urn:microsoft.com/office/officeart/2005/8/layout/orgChart1"/>
+    <dgm:cxn modelId="{F80109F4-59A9-4F9F-AB3E-22C532FC83B8}" type="presOf" srcId="{AEB49E7B-A0A9-4BD9-BB5C-0D12F5F7E3E2}" destId="{CB2A619C-1D1D-487E-8064-C9A3290FDFE3}" srcOrd="0" destOrd="0" presId="urn:microsoft.com/office/officeart/2005/8/layout/orgChart1"/>
+    <dgm:cxn modelId="{64F5273E-00A6-4291-8548-23D8B691C7D2}" type="presOf" srcId="{D6455155-8DE5-4F96-86B3-6295D109D78B}" destId="{A85B6B4B-9EEB-413E-B815-40BB9E6F12D8}" srcOrd="0" destOrd="0" presId="urn:microsoft.com/office/officeart/2005/8/layout/orgChart1"/>
+    <dgm:cxn modelId="{A2599104-03D3-481E-91CE-29A867DA1663}" srcId="{036F865D-B49C-497C-A28F-FACEB37BE973}" destId="{9F200D04-6C2F-4163-B6FC-6A05CBEF6041}" srcOrd="12" destOrd="0" parTransId="{4AA34804-2501-4061-B904-8E2F978C5BED}" sibTransId="{472FFA6C-42C4-4C00-BD83-478C3D4848F2}"/>
+    <dgm:cxn modelId="{A2AD1167-DB28-4AF6-AB9E-3DE4C4D76FF1}" srcId="{E7F2B5B6-CF87-43D8-956B-865FA12A9832}" destId="{A94B5336-2754-49B3-9294-B4493062AE02}" srcOrd="9" destOrd="0" parTransId="{925F4CF3-0DE2-4266-BB71-2D5B5E2E47B9}" sibTransId="{D70C8C72-698A-4412-A23F-CDA58464865A}"/>
+    <dgm:cxn modelId="{1196C1DB-E14E-4EE8-BDA2-17E30E871E40}" srcId="{A12CA174-2EA1-4254-A2E2-9C94FA356EC7}" destId="{75891BF6-2B04-4533-9FF6-C5A26B06D36E}" srcOrd="3" destOrd="0" parTransId="{5C2E33FB-B544-4FA0-A971-C25A0BDFB5F3}" sibTransId="{1926CF70-B7F5-4885-94EF-EAE16BC51726}"/>
+    <dgm:cxn modelId="{4D772414-F63F-4CC6-B9ED-81DDEBD5258F}" type="presOf" srcId="{A69C286E-240E-4664-BECA-C71EDEB14C00}" destId="{38C3BAC5-F2B9-47D4-A175-45EC8237EBD2}" srcOrd="0" destOrd="0" presId="urn:microsoft.com/office/officeart/2005/8/layout/orgChart1"/>
+    <dgm:cxn modelId="{5EBB9156-50AC-49E3-B24B-02F32B3D4DFA}" type="presOf" srcId="{85469F26-7E84-4E68-B914-7D140FF6A72E}" destId="{1315C1DC-2433-4DC5-B8E7-CF18EA9C90AE}" srcOrd="0" destOrd="0" presId="urn:microsoft.com/office/officeart/2005/8/layout/orgChart1"/>
+    <dgm:cxn modelId="{AC4FAEC8-7195-4C85-98B8-E92BAD7F9FA9}" type="presOf" srcId="{397E882A-8E4B-419F-A35B-3AFC7D7CD9AD}" destId="{2A9218BD-F401-49D3-A1B0-136260F066B9}" srcOrd="1" destOrd="0" presId="urn:microsoft.com/office/officeart/2005/8/layout/orgChart1"/>
+    <dgm:cxn modelId="{6549E417-719F-46E1-AE28-701E2DE32488}" type="presOf" srcId="{75BEB708-1BA6-4F6B-95E5-ECC20B1CCD2A}" destId="{4C38AA1E-BCE2-4111-AC89-DF26AC8AD852}" srcOrd="1" destOrd="0" presId="urn:microsoft.com/office/officeart/2005/8/layout/orgChart1"/>
+    <dgm:cxn modelId="{D91864AC-CC31-43CA-B0AF-DB93E0CF7E85}" type="presOf" srcId="{6032129E-23D8-4962-94D5-ABBFEBC304CD}" destId="{BDC041CE-CEBC-4572-9657-A4465BD23E89}" srcOrd="0" destOrd="0" presId="urn:microsoft.com/office/officeart/2005/8/layout/orgChart1"/>
+    <dgm:cxn modelId="{41613858-5A44-4722-8E1B-391D41B57108}" type="presOf" srcId="{A12CA174-2EA1-4254-A2E2-9C94FA356EC7}" destId="{C3C23100-17F3-4187-BE7D-21D25FF295E0}" srcOrd="0" destOrd="0" presId="urn:microsoft.com/office/officeart/2005/8/layout/orgChart1"/>
+    <dgm:cxn modelId="{12F9E9BD-3BD7-4985-82F1-DDAE1D57DA02}" type="presOf" srcId="{3E71C5FB-B753-47D4-9DCC-13828975B0A2}" destId="{E65D8129-CB67-4D48-B3AD-1E3237D9F2C0}" srcOrd="0" destOrd="0" presId="urn:microsoft.com/office/officeart/2005/8/layout/orgChart1"/>
+    <dgm:cxn modelId="{AD30474F-2D72-49B2-8E02-ABCB78F0446D}" type="presOf" srcId="{B3292FCB-66B4-4C67-8DD8-20E8071DF9AB}" destId="{EF868A8B-BF61-4BCB-B817-34E0BC73C76A}" srcOrd="1" destOrd="0" presId="urn:microsoft.com/office/officeart/2005/8/layout/orgChart1"/>
+    <dgm:cxn modelId="{BF4538E4-2AAB-416A-90C6-2B7E6110077D}" type="presOf" srcId="{3ADDB50E-C716-4235-8030-97BFF40B2B70}" destId="{0F779412-6B4D-4BDF-9ED2-F970322E63E8}" srcOrd="1" destOrd="0" presId="urn:microsoft.com/office/officeart/2005/8/layout/orgChart1"/>
+    <dgm:cxn modelId="{1E5FBAA5-9686-4AAC-A6A2-1B35E492FBDC}" type="presOf" srcId="{2F41C27A-E39C-4022-8C3C-C3D3DD3E646F}" destId="{93329676-5256-4478-8E0E-AB15A5F830FA}" srcOrd="0" destOrd="0" presId="urn:microsoft.com/office/officeart/2005/8/layout/orgChart1"/>
+    <dgm:cxn modelId="{44770954-F567-4A4A-91BF-5428411F2560}" type="presOf" srcId="{5215C3D3-851F-46CC-A361-F2F3BA144B72}" destId="{908332AD-A799-4F49-9E46-CCB22279C8AA}" srcOrd="1" destOrd="0" presId="urn:microsoft.com/office/officeart/2005/8/layout/orgChart1"/>
+    <dgm:cxn modelId="{B808C209-902A-4361-A12B-FC75D6558CBE}" type="presOf" srcId="{9DD64EB9-AE17-4045-B0EF-7824A151E2CF}" destId="{CAB19EE7-4700-49BA-940F-E88F8913D448}" srcOrd="0" destOrd="0" presId="urn:microsoft.com/office/officeart/2005/8/layout/orgChart1"/>
+    <dgm:cxn modelId="{4C8CB450-8F20-460B-BAA8-1AF67833278A}" type="presOf" srcId="{4D9549AF-AF34-48E0-866B-C063EF037D12}" destId="{8D5E5986-4BD8-4B32-930C-B199657275BC}" srcOrd="0" destOrd="0" presId="urn:microsoft.com/office/officeart/2005/8/layout/orgChart1"/>
+    <dgm:cxn modelId="{C8F33CE6-2965-4E52-9CC6-46B7845A3AF6}" type="presOf" srcId="{2E17DAB0-83AA-4E1C-A393-685377E018BA}" destId="{F4FC308C-2731-4D69-8AD2-7B4ADF450DA1}" srcOrd="0" destOrd="0" presId="urn:microsoft.com/office/officeart/2005/8/layout/orgChart1"/>
+    <dgm:cxn modelId="{469B1D8E-722F-4C40-AD01-6993C10E089F}" type="presOf" srcId="{DBB9354F-0ECF-4676-B28F-D750482C08B6}" destId="{E5CCCE84-3914-467E-925F-CCFC9D91C3A3}" srcOrd="0" destOrd="0" presId="urn:microsoft.com/office/officeart/2005/8/layout/orgChart1"/>
+    <dgm:cxn modelId="{08E6BF39-FBB7-48A7-B6C6-8A432EC6C08E}" type="presOf" srcId="{B3F0FDA9-A0C9-4B81-91EE-E0C205BC5819}" destId="{A84CB377-71ED-44B0-AC46-B25C947B8225}" srcOrd="0" destOrd="0" presId="urn:microsoft.com/office/officeart/2005/8/layout/orgChart1"/>
+    <dgm:cxn modelId="{39BE6D35-B7F4-4782-9347-DA66555836B8}" type="presOf" srcId="{9DDF8871-299D-4994-ACA0-5CEEF284B657}" destId="{E8CEF343-1D14-4EDC-837B-B90AE286C2A9}" srcOrd="0" destOrd="0" presId="urn:microsoft.com/office/officeart/2005/8/layout/orgChart1"/>
+    <dgm:cxn modelId="{57A4CB66-8D74-4120-9701-C3EC84A2A20A}" type="presOf" srcId="{DDB6B235-C9F5-497C-9FBE-4D3337D8A76E}" destId="{71BA5A12-34F1-4AEC-A5E4-86432F8A4267}" srcOrd="0" destOrd="0" presId="urn:microsoft.com/office/officeart/2005/8/layout/orgChart1"/>
+    <dgm:cxn modelId="{E6A6698F-9FFF-49C4-ADCE-DD9C76841FD0}" type="presOf" srcId="{6A8B354A-8DFF-4438-9E28-0978BD25CCDE}" destId="{E03A1774-4ACC-4BB8-931D-A30D75888772}" srcOrd="0" destOrd="0" presId="urn:microsoft.com/office/officeart/2005/8/layout/orgChart1"/>
+    <dgm:cxn modelId="{CF49D40E-E32C-4F9F-A83C-4630421BF295}" type="presOf" srcId="{85469F26-7E84-4E68-B914-7D140FF6A72E}" destId="{A7EC3026-F40B-42F0-B898-FEA35E7347C8}" srcOrd="1" destOrd="0" presId="urn:microsoft.com/office/officeart/2005/8/layout/orgChart1"/>
+    <dgm:cxn modelId="{671C4E54-EF50-4923-812F-21877959A115}" type="presOf" srcId="{4AA34804-2501-4061-B904-8E2F978C5BED}" destId="{689D51BB-D6C4-4E97-BED5-7B642C5CC993}" srcOrd="0" destOrd="0" presId="urn:microsoft.com/office/officeart/2005/8/layout/orgChart1"/>
+    <dgm:cxn modelId="{71A472D4-A3E2-4120-B50B-C37BFB45AAAD}" type="presOf" srcId="{514468E7-68B1-4A1C-8A70-3B9D2BD46163}" destId="{986D6194-414A-4695-BBDB-EF380595A08A}" srcOrd="0" destOrd="0" presId="urn:microsoft.com/office/officeart/2005/8/layout/orgChart1"/>
+    <dgm:cxn modelId="{5D981202-0F1C-49AE-ACD1-C888C44FE5E5}" srcId="{DDBCFA16-FF48-4701-9B4A-F21E4666E982}" destId="{BDBE938E-0EB9-42C3-A806-B193872D144A}" srcOrd="0" destOrd="0" parTransId="{E8891F10-A55D-4E77-AE72-7698EEC95996}" sibTransId="{984B7A84-CAD2-470E-9AD2-85BF90BB96EF}"/>
+    <dgm:cxn modelId="{5858AD5F-E6EB-4F71-97B8-4388679288D3}" type="presOf" srcId="{D39555DC-FD40-400A-8291-2B20647F4971}" destId="{53D4E2DF-D678-4FCB-946C-9E9D8BAB6E98}" srcOrd="0" destOrd="0" presId="urn:microsoft.com/office/officeart/2005/8/layout/orgChart1"/>
+    <dgm:cxn modelId="{FC6FBB5C-D977-4D87-9483-C05A4C680D66}" type="presOf" srcId="{8687A9BC-A114-4542-92D9-DA4890EFFA33}" destId="{A6D2DF91-5EF6-4C6F-9F2D-B194107E06DB}" srcOrd="0" destOrd="0" presId="urn:microsoft.com/office/officeart/2005/8/layout/orgChart1"/>
+    <dgm:cxn modelId="{9258F29B-1141-445E-BA57-D750273E0A10}" type="presOf" srcId="{65B06181-9E4B-4CC0-9813-8C0D896FE328}" destId="{76303C12-7114-4E1F-9200-0FE159C1363E}" srcOrd="0" destOrd="0" presId="urn:microsoft.com/office/officeart/2005/8/layout/orgChart1"/>
+    <dgm:cxn modelId="{635D44EF-4A1F-41E4-AE37-7939977A0FD1}" type="presOf" srcId="{E91EF19E-5F9E-4407-BB36-B70ED62373C5}" destId="{E2A5F104-5B55-4A8F-8CDB-F4EA1FD3DCA9}" srcOrd="0" destOrd="0" presId="urn:microsoft.com/office/officeart/2005/8/layout/orgChart1"/>
+    <dgm:cxn modelId="{A134FEC1-D705-420F-B56A-8A10DC17CF0B}" srcId="{036F865D-B49C-497C-A28F-FACEB37BE973}" destId="{B3292FCB-66B4-4C67-8DD8-20E8071DF9AB}" srcOrd="0" destOrd="0" parTransId="{9DD64EB9-AE17-4045-B0EF-7824A151E2CF}" sibTransId="{1EAAF679-01FE-4694-A0B5-C545C66E5CA5}"/>
+    <dgm:cxn modelId="{51FFC9E6-07AB-4D56-B2EE-456A8C0C537F}" type="presOf" srcId="{7F3829AB-08D4-42EE-A778-D78F829EF8B9}" destId="{51183CC0-BB79-4BFA-BFA7-1C8160ECA015}" srcOrd="0" destOrd="0" presId="urn:microsoft.com/office/officeart/2005/8/layout/orgChart1"/>
+    <dgm:cxn modelId="{1F3C5457-0B84-4BD2-A84E-93B8DA35CD08}" type="presOf" srcId="{E2983617-B5F4-4C75-81E3-8F79C5CAD3D9}" destId="{2261E60B-9700-4EB6-9076-CBC4203A01E8}" srcOrd="1" destOrd="0" presId="urn:microsoft.com/office/officeart/2005/8/layout/orgChart1"/>
+    <dgm:cxn modelId="{E508CF58-BF31-4E8F-94A9-E110DB164543}" type="presOf" srcId="{01D5BAB2-961F-473A-B3FF-E3EA572DD70A}" destId="{5F0A0127-23EC-4E4A-9BD0-57E5038FAA11}" srcOrd="0" destOrd="0" presId="urn:microsoft.com/office/officeart/2005/8/layout/orgChart1"/>
+    <dgm:cxn modelId="{E0CDE9AA-6463-4297-B176-B3FAA6F7B5E4}" type="presOf" srcId="{FBB1AB93-1B13-4A16-9237-214B953783E0}" destId="{7B3231E4-8145-4022-AB76-382F65196510}" srcOrd="0" destOrd="0" presId="urn:microsoft.com/office/officeart/2005/8/layout/orgChart1"/>
+    <dgm:cxn modelId="{EB4BF5B8-CE7D-467E-91EA-161A219D9404}" type="presOf" srcId="{66BBC26C-D840-4A54-86D3-3188AE28C087}" destId="{EBE6DB65-FC35-458B-A538-DD188730D068}" srcOrd="1" destOrd="0" presId="urn:microsoft.com/office/officeart/2005/8/layout/orgChart1"/>
+    <dgm:cxn modelId="{2DEBEDE1-6D5B-4AE6-8C5D-75CA3170090E}" type="presOf" srcId="{6A8B354A-8DFF-4438-9E28-0978BD25CCDE}" destId="{4744F06C-791B-4D4E-803C-CDB7C101F63B}" srcOrd="1" destOrd="0" presId="urn:microsoft.com/office/officeart/2005/8/layout/orgChart1"/>
+    <dgm:cxn modelId="{E7ACFFF9-5557-48C3-A5FB-19CB9EC91843}" srcId="{036F865D-B49C-497C-A28F-FACEB37BE973}" destId="{B3CE34A7-3737-4E98-BC58-22D32761C765}" srcOrd="11" destOrd="0" parTransId="{FF731828-F1FB-4C65-AD8B-BA577D11BC61}" sibTransId="{4322ABB2-08C5-494C-8036-122EA89FED4F}"/>
+    <dgm:cxn modelId="{EA78C06B-D154-4CCD-8F05-B398D185C756}" type="presOf" srcId="{DDB6B235-C9F5-497C-9FBE-4D3337D8A76E}" destId="{674E48BB-2DD8-4CEE-BEAD-29D50BD7A9F6}" srcOrd="1" destOrd="0" presId="urn:microsoft.com/office/officeart/2005/8/layout/orgChart1"/>
+    <dgm:cxn modelId="{93B5DDC1-C627-46E6-8261-CFC9F8AD421D}" type="presOf" srcId="{44C92458-6162-43E3-89A4-2E81084BFC0B}" destId="{BB4BB6AD-6354-48B5-BA4D-B711A8DE7124}" srcOrd="0" destOrd="0" presId="urn:microsoft.com/office/officeart/2005/8/layout/orgChart1"/>
+    <dgm:cxn modelId="{A474DE59-A0FE-4828-9B55-A9B1B7C5EBDD}" type="presOf" srcId="{D73CDCEA-89C2-455C-A3A3-230942560E3B}" destId="{E0A62DDC-CEC9-464E-93F6-E0E6D503299A}" srcOrd="0" destOrd="0" presId="urn:microsoft.com/office/officeart/2005/8/layout/orgChart1"/>
+    <dgm:cxn modelId="{9BD72D68-3E8F-42E9-BC1C-69B8EFCA37E4}" srcId="{E7F2B5B6-CF87-43D8-956B-865FA12A9832}" destId="{E7BBAF79-B5DF-4711-94A2-066B816722C0}" srcOrd="4" destOrd="0" parTransId="{65B06181-9E4B-4CC0-9813-8C0D896FE328}" sibTransId="{3386B16F-AA17-4982-A098-4BC22C435C63}"/>
+    <dgm:cxn modelId="{67B9F703-0318-4F9A-B010-83838524F65A}" type="presOf" srcId="{A0DB2208-0287-4860-A3E2-FE5A64BEC9DF}" destId="{CDB35612-2091-40C2-9966-A02D8958896E}" srcOrd="0" destOrd="0" presId="urn:microsoft.com/office/officeart/2005/8/layout/orgChart1"/>
+    <dgm:cxn modelId="{074F063F-9DE1-4562-AD6D-CA6BC6D0C8AA}" type="presOf" srcId="{F59FBA88-6DA3-4931-AF85-1FEF48D0FE76}" destId="{10EDDF8B-068F-483C-AD6D-CB0E40706FAD}" srcOrd="0" destOrd="0" presId="urn:microsoft.com/office/officeart/2005/8/layout/orgChart1"/>
+    <dgm:cxn modelId="{509C0B5E-56CA-42B8-9147-4F77301DE789}" type="presOf" srcId="{DBB9354F-0ECF-4676-B28F-D750482C08B6}" destId="{957F2000-842F-4D77-8568-02559EB5B9A4}" srcOrd="1" destOrd="0" presId="urn:microsoft.com/office/officeart/2005/8/layout/orgChart1"/>
+    <dgm:cxn modelId="{213FB837-86F0-457B-B1AB-8181FF1DAAF8}" type="presOf" srcId="{E7BBAF79-B5DF-4711-94A2-066B816722C0}" destId="{F3826B60-3081-420F-A9ED-3B3F8889878F}" srcOrd="0" destOrd="0" presId="urn:microsoft.com/office/officeart/2005/8/layout/orgChart1"/>
+    <dgm:cxn modelId="{0FF5E60A-3E73-45ED-9C72-19CE45A86549}" srcId="{6F6C34EC-D04B-4D56-86A3-3E939B149C9F}" destId="{5B650B58-E6B4-4F81-9E92-48805D7BAFC8}" srcOrd="9" destOrd="0" parTransId="{64F0A6F7-78A5-47F9-A720-3BEF75DFDDB5}" sibTransId="{1CC21EB7-F3C7-4E27-B0EE-31FBFF38CD12}"/>
+    <dgm:cxn modelId="{50EC2079-359D-4982-820C-E70FFD718DE1}" type="presOf" srcId="{ED918E41-8FEA-4230-B27E-1B60FEB2B6F5}" destId="{A517B4CA-8131-4AA8-A48D-6EB97CE1CE80}" srcOrd="0" destOrd="0" presId="urn:microsoft.com/office/officeart/2005/8/layout/orgChart1"/>
+    <dgm:cxn modelId="{E71058C7-FFDA-469B-9982-4D9D18F6BF6F}" srcId="{6F6C34EC-D04B-4D56-86A3-3E939B149C9F}" destId="{ED918E41-8FEA-4230-B27E-1B60FEB2B6F5}" srcOrd="1" destOrd="0" parTransId="{6DC63F07-3C40-4586-9546-0B182BD07E9B}" sibTransId="{D5B6E24A-A9D2-4784-82C2-C339150647C9}"/>
+    <dgm:cxn modelId="{F31BEB0F-5636-4838-B318-C67EB6BC8839}" type="presOf" srcId="{A1E21DB3-4238-483C-8C46-4651EF0F3427}" destId="{8CE77380-4885-4E29-AFAE-1967FD9D241B}" srcOrd="0" destOrd="0" presId="urn:microsoft.com/office/officeart/2005/8/layout/orgChart1"/>
+    <dgm:cxn modelId="{7DBEB3B6-4CEA-44E9-908C-1E4D7065E24C}" type="presOf" srcId="{E49793DC-11A4-4FE5-B412-BDD04A01C875}" destId="{AE6F86C0-0850-495B-860D-6800171FD38C}" srcOrd="1" destOrd="0" presId="urn:microsoft.com/office/officeart/2005/8/layout/orgChart1"/>
+    <dgm:cxn modelId="{6A1A2A9A-976F-4DDF-B13D-ACA9604A5F9F}" type="presOf" srcId="{720D1D11-BDEC-4B23-A9CF-84AC59FF8D98}" destId="{98905030-4DAA-49B2-8363-9A215F8558D2}" srcOrd="1" destOrd="0" presId="urn:microsoft.com/office/officeart/2005/8/layout/orgChart1"/>
+    <dgm:cxn modelId="{DA064062-A940-4F9F-ACF5-5A62B5AA5B8E}" srcId="{A12CA174-2EA1-4254-A2E2-9C94FA356EC7}" destId="{2C1582BA-1E36-44E1-AB7E-5464369BDF2C}" srcOrd="6" destOrd="0" parTransId="{AEB49E7B-A0A9-4BD9-BB5C-0D12F5F7E3E2}" sibTransId="{039DAECA-5700-4F55-ACCC-0E0DA261F52E}"/>
+    <dgm:cxn modelId="{2FB11844-3FB6-4FD4-B5D2-506E33382958}" type="presOf" srcId="{3ADDB50E-C716-4235-8030-97BFF40B2B70}" destId="{2E339C4D-888C-4305-9121-22F0079DA5B4}" srcOrd="0" destOrd="0" presId="urn:microsoft.com/office/officeart/2005/8/layout/orgChart1"/>
+    <dgm:cxn modelId="{1630D317-A9E5-4239-9815-8B96B173F857}" srcId="{3E71C5FB-B753-47D4-9DCC-13828975B0A2}" destId="{003393E9-8076-4FF8-A132-BE48278ECCD0}" srcOrd="0" destOrd="0" parTransId="{72366353-31E3-4DC0-A317-448EEFEC819D}" sibTransId="{E71FA8A1-E24F-4509-AEE5-03F2F9FE5478}"/>
+    <dgm:cxn modelId="{B8D2A289-546A-45D7-8020-E7E386F0C39C}" type="presOf" srcId="{BDBE938E-0EB9-42C3-A806-B193872D144A}" destId="{F6212447-96C3-4CCE-A629-00BAD2AFB206}" srcOrd="1" destOrd="0" presId="urn:microsoft.com/office/officeart/2005/8/layout/orgChart1"/>
+    <dgm:cxn modelId="{F07C3BC9-69C3-4F8E-B5D3-E1B5A7AC3561}" type="presOf" srcId="{AB3EB838-C92F-483C-B532-333A2D91C7DA}" destId="{2209F358-A677-4C5A-8A7B-D5A7AC543204}" srcOrd="0" destOrd="0" presId="urn:microsoft.com/office/officeart/2005/8/layout/orgChart1"/>
+    <dgm:cxn modelId="{D47DFED4-0F52-4D8F-8CFB-EA1A31F87DBA}" srcId="{036F865D-B49C-497C-A28F-FACEB37BE973}" destId="{DBB9354F-0ECF-4676-B28F-D750482C08B6}" srcOrd="6" destOrd="0" parTransId="{CAC00B8C-8726-4518-996D-52DDA6373405}" sibTransId="{77E33EAA-77CF-4CB4-A6DD-ECFDB8CC8849}"/>
+    <dgm:cxn modelId="{BB588FC7-1191-4EAD-8500-229118357A8A}" srcId="{6F6C34EC-D04B-4D56-86A3-3E939B149C9F}" destId="{E6512187-A44F-40F0-88C3-E2E4C07824B7}" srcOrd="4" destOrd="0" parTransId="{EBD09873-60D5-456F-BB9E-A83723F7634A}" sibTransId="{A5BA61CA-12F7-42F6-A840-CD68DC9562EB}"/>
+    <dgm:cxn modelId="{4509F461-EC93-4134-B473-F7DC0D78439B}" srcId="{EB43AF72-1C15-4079-BDD3-C856AD333C22}" destId="{3E71C5FB-B753-47D4-9DCC-13828975B0A2}" srcOrd="0" destOrd="0" parTransId="{B035C497-02DD-4EC8-BBF1-A55D9ECC9A7A}" sibTransId="{8EF95157-66A5-4B41-86DC-D84C0EEA029E}"/>
+    <dgm:cxn modelId="{327E82A0-0E44-43A6-A551-1ADE9E702F02}" type="presOf" srcId="{B6068B13-10D0-4540-903D-094B6D761789}" destId="{97C4FE2C-E513-4E22-A211-CF69A433A377}" srcOrd="0" destOrd="0" presId="urn:microsoft.com/office/officeart/2005/8/layout/orgChart1"/>
+    <dgm:cxn modelId="{37841759-302F-4BA8-B995-C288D7995AB9}" srcId="{66BBC26C-D840-4A54-86D3-3188AE28C087}" destId="{E7F2B5B6-CF87-43D8-956B-865FA12A9832}" srcOrd="0" destOrd="0" parTransId="{5505AFFD-EF3C-433E-B042-B7089BA0CA6C}" sibTransId="{64AA5113-02A6-4794-B6DC-5D58E26EAC5B}"/>
+    <dgm:cxn modelId="{35631E9E-984B-4B3F-889E-B0D52BD45C5A}" type="presOf" srcId="{ABFBDFAE-74B1-4476-B6DB-C215E08D23B2}" destId="{99244E41-0E2B-456B-BE89-F9DCFF41E173}" srcOrd="0" destOrd="0" presId="urn:microsoft.com/office/officeart/2005/8/layout/orgChart1"/>
+    <dgm:cxn modelId="{1A7EFD38-136F-4ACA-A9E3-AAB54EEC32B5}" type="presOf" srcId="{2E17DAB0-83AA-4E1C-A393-685377E018BA}" destId="{129EA1D2-012C-4773-B4BD-879CF5BF7186}" srcOrd="1" destOrd="0" presId="urn:microsoft.com/office/officeart/2005/8/layout/orgChart1"/>
+    <dgm:cxn modelId="{989D17A5-4A6F-4FD3-8401-DF59E0C20039}" type="presOf" srcId="{F597CECE-331E-4863-AC83-399EF3C3151A}" destId="{3BF036C4-2647-41D5-A2F7-C9D3C91419F1}" srcOrd="0" destOrd="0" presId="urn:microsoft.com/office/officeart/2005/8/layout/orgChart1"/>
+    <dgm:cxn modelId="{649CA73B-28AF-4F29-9854-719ECE1926CF}" srcId="{A12CA174-2EA1-4254-A2E2-9C94FA356EC7}" destId="{ABFBDFAE-74B1-4476-B6DB-C215E08D23B2}" srcOrd="4" destOrd="0" parTransId="{781618CB-6D74-4BCB-AEE2-FAC5CB743DCD}" sibTransId="{7DE0CE56-147C-41BD-9CF2-D246C41F4CB6}"/>
+    <dgm:cxn modelId="{7A237650-BED6-48A3-BF03-DE98692DEE08}" type="presOf" srcId="{910EC701-6B73-412E-BD9F-A0331CE8B6C6}" destId="{91BDF20E-CD9F-4F77-8347-B48A73AB09DB}" srcOrd="0" destOrd="0" presId="urn:microsoft.com/office/officeart/2005/8/layout/orgChart1"/>
+    <dgm:cxn modelId="{0D7A02C6-D23A-4D0B-B661-6CE62BF4C53F}" type="presOf" srcId="{FF5F6635-D83D-4AA9-9656-9744FCFD8BAD}" destId="{0D91F5C4-8DDD-4346-9B44-9DAB026D3F39}" srcOrd="0" destOrd="0" presId="urn:microsoft.com/office/officeart/2005/8/layout/orgChart1"/>
+    <dgm:cxn modelId="{9F8DDD36-29C4-46B6-A1A7-F000DFF88691}" type="presOf" srcId="{720D1D11-BDEC-4B23-A9CF-84AC59FF8D98}" destId="{347530D3-BC6E-4C36-9AEB-4D6933CAEA9B}" srcOrd="0" destOrd="0" presId="urn:microsoft.com/office/officeart/2005/8/layout/orgChart1"/>
+    <dgm:cxn modelId="{02C19BD8-AF30-449E-982F-FD7374A8598D}" type="presOf" srcId="{E6F355BE-A692-4BCE-AFC3-B464A275299A}" destId="{DDCFD6BD-4662-4CA3-A1E8-95F5C86F8CCB}" srcOrd="0" destOrd="0" presId="urn:microsoft.com/office/officeart/2005/8/layout/orgChart1"/>
+    <dgm:cxn modelId="{B86A54BC-A70C-4BF0-AD08-1C964C0848DD}" type="presOf" srcId="{40BCF024-F5C2-4C0D-BFDB-5643E2836A8D}" destId="{08359004-E42B-434B-9560-3E04E1B6B597}" srcOrd="1" destOrd="0" presId="urn:microsoft.com/office/officeart/2005/8/layout/orgChart1"/>
     <dgm:cxn modelId="{4C9EA82F-A0E8-4D40-9888-26FCF52BA56B}" srcId="{A12CA174-2EA1-4254-A2E2-9C94FA356EC7}" destId="{9CAA754C-E6D9-4A46-ABA6-878655BAEF8C}" srcOrd="5" destOrd="0" parTransId="{2B565085-B755-4347-A27D-DEEF24EBDCBB}" sibTransId="{17E48A7D-1387-410B-BF0F-5481410A225C}"/>
+    <dgm:cxn modelId="{F894F689-98BE-491C-BEBA-5AFF20E70AD7}" type="presOf" srcId="{568786E3-CB59-4DB9-A75B-F3F7C409ACBF}" destId="{B97AC47A-A2B0-4DE8-9D43-2678CB13C875}" srcOrd="1" destOrd="0" presId="urn:microsoft.com/office/officeart/2005/8/layout/orgChart1"/>
     <dgm:cxn modelId="{D8917563-6E48-4E88-B339-7D43634C15E9}" srcId="{036F865D-B49C-497C-A28F-FACEB37BE973}" destId="{D6455155-8DE5-4F96-86B3-6295D109D78B}" srcOrd="1" destOrd="0" parTransId="{FF5F6635-D83D-4AA9-9656-9744FCFD8BAD}" sibTransId="{DC9EAE20-9AF1-4950-AFEA-D4448A91DDB4}"/>
-    <dgm:cxn modelId="{509C0B5E-56CA-42B8-9147-4F77301DE789}" type="presOf" srcId="{DBB9354F-0ECF-4676-B28F-D750482C08B6}" destId="{957F2000-842F-4D77-8568-02559EB5B9A4}" srcOrd="1" destOrd="0" presId="urn:microsoft.com/office/officeart/2005/8/layout/orgChart1"/>
-    <dgm:cxn modelId="{4EE70ABA-0083-4CF0-92A3-570F78E3440A}" type="presOf" srcId="{75BEB708-1BA6-4F6B-95E5-ECC20B1CCD2A}" destId="{52A4F596-44B7-4D8D-8815-678FCAF34F3C}" srcOrd="0" destOrd="0" presId="urn:microsoft.com/office/officeart/2005/8/layout/orgChart1"/>
-    <dgm:cxn modelId="{B6A5B3D3-6692-409A-9E81-4B5F39624051}" srcId="{3E71C5FB-B753-47D4-9DCC-13828975B0A2}" destId="{E49793DC-11A4-4FE5-B412-BDD04A01C875}" srcOrd="2" destOrd="0" parTransId="{E91EF19E-5F9E-4407-BB36-B70ED62373C5}" sibTransId="{CE9F42AB-72D8-42F6-AC1D-8832FAE66018}"/>
-    <dgm:cxn modelId="{7A237650-BED6-48A3-BF03-DE98692DEE08}" type="presOf" srcId="{910EC701-6B73-412E-BD9F-A0331CE8B6C6}" destId="{91BDF20E-CD9F-4F77-8347-B48A73AB09DB}" srcOrd="0" destOrd="0" presId="urn:microsoft.com/office/officeart/2005/8/layout/orgChart1"/>
-    <dgm:cxn modelId="{A91B6DBE-2E48-4AC5-896A-CC07C14C9B54}" type="presOf" srcId="{E7F2B5B6-CF87-43D8-956B-865FA12A9832}" destId="{7966CEC0-2A6B-4AD4-BE2B-D93BA31C9556}" srcOrd="0" destOrd="0" presId="urn:microsoft.com/office/officeart/2005/8/layout/orgChart1"/>
+    <dgm:cxn modelId="{EDA6CA9D-FA78-4BA2-B062-18B89318B305}" type="presOf" srcId="{B7A998B6-3CFD-4CE5-ABF6-102C39C44168}" destId="{FC51E896-9C58-42F2-8E49-D3F56B9E3FD1}" srcOrd="1" destOrd="0" presId="urn:microsoft.com/office/officeart/2005/8/layout/orgChart1"/>
+    <dgm:cxn modelId="{0D294E13-EDC5-4B78-B7E9-680F1CD56FA5}" srcId="{E7F2B5B6-CF87-43D8-956B-865FA12A9832}" destId="{E621B393-E081-4074-9CF7-24B8C04658FF}" srcOrd="8" destOrd="0" parTransId="{16C2C151-7509-45B4-8172-9938019F1FE3}" sibTransId="{7B050B97-4134-4614-957D-E7AE736E13E8}"/>
+    <dgm:cxn modelId="{6E042F73-FC49-4EAA-973B-06A54FDE862E}" type="presOf" srcId="{9F200D04-6C2F-4163-B6FC-6A05CBEF6041}" destId="{97D06851-5DF3-4820-9E66-BE38AC0028E3}" srcOrd="1" destOrd="0" presId="urn:microsoft.com/office/officeart/2005/8/layout/orgChart1"/>
+    <dgm:cxn modelId="{29594227-B839-471F-BC6E-0E6450E5D132}" type="presOf" srcId="{EBD09873-60D5-456F-BB9E-A83723F7634A}" destId="{FB94F875-605E-4FA2-8BCF-41223452A711}" srcOrd="0" destOrd="0" presId="urn:microsoft.com/office/officeart/2005/8/layout/orgChart1"/>
+    <dgm:cxn modelId="{A4DF9CAC-3527-4F4E-B9B2-E4C955B469AC}" type="presOf" srcId="{BAC8ED56-9041-4B42-94A8-15F81727F6E9}" destId="{A722B889-428E-409C-BE66-13B81BF8FCF1}" srcOrd="1" destOrd="0" presId="urn:microsoft.com/office/officeart/2005/8/layout/orgChart1"/>
+    <dgm:cxn modelId="{0F964822-1D6E-427C-BAB2-F9277FA15D0A}" type="presOf" srcId="{15EDC76C-57B9-43BE-BF45-2205A01BA0A3}" destId="{6818241D-C03D-43DD-B027-19A9928C0050}" srcOrd="1" destOrd="0" presId="urn:microsoft.com/office/officeart/2005/8/layout/orgChart1"/>
+    <dgm:cxn modelId="{A5BBD47D-2AF2-4C93-8DBD-7C4A3D105FBF}" type="presOf" srcId="{72366353-31E3-4DC0-A317-448EEFEC819D}" destId="{DBEBDFEB-4637-4998-A96D-854585899A0A}" srcOrd="0" destOrd="0" presId="urn:microsoft.com/office/officeart/2005/8/layout/orgChart1"/>
+    <dgm:cxn modelId="{67535C20-A3EE-435D-9A24-1E180853B042}" type="presOf" srcId="{6F6C34EC-D04B-4D56-86A3-3E939B149C9F}" destId="{4AA5F8D1-45A0-4227-A968-66DB05AB6521}" srcOrd="1" destOrd="0" presId="urn:microsoft.com/office/officeart/2005/8/layout/orgChart1"/>
+    <dgm:cxn modelId="{FD9B5A5F-DA85-498B-85D6-9FE3B54B8C38}" srcId="{036F865D-B49C-497C-A28F-FACEB37BE973}" destId="{A57018D7-84ED-488F-BB9E-3D81E4943144}" srcOrd="3" destOrd="0" parTransId="{D6C569CA-D673-4E36-AF0A-BFDD06BAA18D}" sibTransId="{A961E919-6747-4FB0-9986-7B1892146F73}"/>
     <dgm:cxn modelId="{F2F25923-D76C-41B0-9072-F8A3A744DF32}" srcId="{E7F2B5B6-CF87-43D8-956B-865FA12A9832}" destId="{6A0697FA-443C-4159-8BAB-54E9CE102235}" srcOrd="0" destOrd="0" parTransId="{E0F2B946-63C9-40A9-8DA4-823451445D94}" sibTransId="{AD2F6430-B6B0-40C7-8704-C5652498B36F}"/>
-    <dgm:cxn modelId="{864DFF00-5AB0-4EA9-AF35-647206E377A9}" type="presOf" srcId="{6F6C34EC-D04B-4D56-86A3-3E939B149C9F}" destId="{AD0BEDBF-F771-40B9-A7A5-DEDE27EC7D0F}" srcOrd="0" destOrd="0" presId="urn:microsoft.com/office/officeart/2005/8/layout/orgChart1"/>
-    <dgm:cxn modelId="{1F3C5457-0B84-4BD2-A84E-93B8DA35CD08}" type="presOf" srcId="{E2983617-B5F4-4C75-81E3-8F79C5CAD3D9}" destId="{2261E60B-9700-4EB6-9076-CBC4203A01E8}" srcOrd="1" destOrd="0" presId="urn:microsoft.com/office/officeart/2005/8/layout/orgChart1"/>
-    <dgm:cxn modelId="{469B1D8E-722F-4C40-AD01-6993C10E089F}" type="presOf" srcId="{DBB9354F-0ECF-4676-B28F-D750482C08B6}" destId="{E5CCCE84-3914-467E-925F-CCFC9D91C3A3}" srcOrd="0" destOrd="0" presId="urn:microsoft.com/office/officeart/2005/8/layout/orgChart1"/>
-    <dgm:cxn modelId="{558ED89F-2BE4-4B62-A725-EBC46A4324FB}" type="presOf" srcId="{D457A40A-56B9-4F4F-B5B7-A69DF2E1F522}" destId="{B4D6615C-1F7F-486C-B62C-F78858FBF129}" srcOrd="1" destOrd="0" presId="urn:microsoft.com/office/officeart/2005/8/layout/orgChart1"/>
-    <dgm:cxn modelId="{3F2AC8E0-E3A7-472E-A644-B11128B81A0E}" srcId="{6F6C34EC-D04B-4D56-86A3-3E939B149C9F}" destId="{B8AD3FDB-62B5-43CC-8C3E-4F5B3AFF587E}" srcOrd="3" destOrd="0" parTransId="{09C0A2EE-E4B2-42C9-8CB6-C39B37F93CA5}" sibTransId="{03A55EDE-8B71-449C-B0D6-8D6FF4B3C448}"/>
     <dgm:cxn modelId="{09B64EED-21D2-4B55-BBA0-C4F7A598C128}" type="presOf" srcId="{D3BB9439-3AF0-42C0-AB8D-88AF1C54095C}" destId="{8D6C9E67-C591-46FB-A01A-2FCB2CB5C318}" srcOrd="0" destOrd="0" presId="urn:microsoft.com/office/officeart/2005/8/layout/orgChart1"/>
-    <dgm:cxn modelId="{1A7EFD38-136F-4ACA-A9E3-AAB54EEC32B5}" type="presOf" srcId="{2E17DAB0-83AA-4E1C-A393-685377E018BA}" destId="{129EA1D2-012C-4773-B4BD-879CF5BF7186}" srcOrd="1" destOrd="0" presId="urn:microsoft.com/office/officeart/2005/8/layout/orgChart1"/>
-    <dgm:cxn modelId="{02C19BD8-AF30-449E-982F-FD7374A8598D}" type="presOf" srcId="{E6F355BE-A692-4BCE-AFC3-B464A275299A}" destId="{DDCFD6BD-4662-4CA3-A1E8-95F5C86F8CCB}" srcOrd="0" destOrd="0" presId="urn:microsoft.com/office/officeart/2005/8/layout/orgChart1"/>
-    <dgm:cxn modelId="{2C6D88D6-6DE1-4B14-9A21-AEE78C1AC6FC}" type="presOf" srcId="{4680C006-E723-4678-9423-DDC71E5793BF}" destId="{89DFFABD-762C-483F-A5BC-D370A23CBB46}" srcOrd="0" destOrd="0" presId="urn:microsoft.com/office/officeart/2005/8/layout/orgChart1"/>
-    <dgm:cxn modelId="{40DD8CB3-1CBD-4E7F-992C-8A4A96ABCCA1}" type="presOf" srcId="{2B565085-B755-4347-A27D-DEEF24EBDCBB}" destId="{9FBE78A9-19BD-4D5D-B227-2B297272CF3E}" srcOrd="0" destOrd="0" presId="urn:microsoft.com/office/officeart/2005/8/layout/orgChart1"/>
-    <dgm:cxn modelId="{50EC2079-359D-4982-820C-E70FFD718DE1}" type="presOf" srcId="{ED918E41-8FEA-4230-B27E-1B60FEB2B6F5}" destId="{A517B4CA-8131-4AA8-A48D-6EB97CE1CE80}" srcOrd="0" destOrd="0" presId="urn:microsoft.com/office/officeart/2005/8/layout/orgChart1"/>
-    <dgm:cxn modelId="{4A059223-A254-4666-BCD6-F9939E506005}" type="presOf" srcId="{C4A8471A-4B9E-488E-9113-5F14ED685C1C}" destId="{A4420242-8B48-4351-9761-0D8F5016C3C5}" srcOrd="1" destOrd="0" presId="urn:microsoft.com/office/officeart/2005/8/layout/orgChart1"/>
-    <dgm:cxn modelId="{93B5DDC1-C627-46E6-8261-CFC9F8AD421D}" type="presOf" srcId="{44C92458-6162-43E3-89A4-2E81084BFC0B}" destId="{BB4BB6AD-6354-48B5-BA4D-B711A8DE7124}" srcOrd="0" destOrd="0" presId="urn:microsoft.com/office/officeart/2005/8/layout/orgChart1"/>
-    <dgm:cxn modelId="{9258F29B-1141-445E-BA57-D750273E0A10}" type="presOf" srcId="{65B06181-9E4B-4CC0-9813-8C0D896FE328}" destId="{76303C12-7114-4E1F-9200-0FE159C1363E}" srcOrd="0" destOrd="0" presId="urn:microsoft.com/office/officeart/2005/8/layout/orgChart1"/>
-    <dgm:cxn modelId="{DDA5250E-2FA5-42A4-B1BF-AE45368A0CF9}" type="presOf" srcId="{E621B393-E081-4074-9CF7-24B8C04658FF}" destId="{18CEB86C-5759-44C3-A95F-ADFDFEBCCC81}" srcOrd="1" destOrd="0" presId="urn:microsoft.com/office/officeart/2005/8/layout/orgChart1"/>
-    <dgm:cxn modelId="{F277CFDB-E75E-4AF2-B87D-8E9E6A833B06}" type="presOf" srcId="{592EDF8A-A7DA-43DB-849D-96EC567ADCC5}" destId="{B10A94DE-70A4-4D7F-B05A-EFDB63196987}" srcOrd="1" destOrd="0" presId="urn:microsoft.com/office/officeart/2005/8/layout/orgChart1"/>
-    <dgm:cxn modelId="{027D87CC-1B11-4722-B1E7-58A785BD41E8}" type="presOf" srcId="{5C2E33FB-B544-4FA0-A971-C25A0BDFB5F3}" destId="{6AF5C851-806B-4784-8AA7-A868812F465F}" srcOrd="0" destOrd="0" presId="urn:microsoft.com/office/officeart/2005/8/layout/orgChart1"/>
-    <dgm:cxn modelId="{D456A866-0175-4256-B403-040BE216C01C}" type="presOf" srcId="{B7A998B6-3CFD-4CE5-ABF6-102C39C44168}" destId="{EA1F1C93-8A6B-44B5-8914-66DA45F81B9B}" srcOrd="0" destOrd="0" presId="urn:microsoft.com/office/officeart/2005/8/layout/orgChart1"/>
-    <dgm:cxn modelId="{60AB53E8-3752-4692-8C07-5DFCE99B92FC}" type="presOf" srcId="{B8AD3FDB-62B5-43CC-8C3E-4F5B3AFF587E}" destId="{351EEADF-DDE7-4AB0-9115-D51015F932F4}" srcOrd="1" destOrd="0" presId="urn:microsoft.com/office/officeart/2005/8/layout/orgChart1"/>
-    <dgm:cxn modelId="{145F3EF0-319B-44E3-A797-EBBD60DEF5A8}" type="presOf" srcId="{A1E21DB3-4238-483C-8C46-4651EF0F3427}" destId="{0D6F29F8-F194-44D9-9979-8E77AC533B39}" srcOrd="1" destOrd="0" presId="urn:microsoft.com/office/officeart/2005/8/layout/orgChart1"/>
-    <dgm:cxn modelId="{F53EAFAF-D116-44B3-A251-6DF29017A6AB}" type="presOf" srcId="{E2983617-B5F4-4C75-81E3-8F79C5CAD3D9}" destId="{78B7BEF3-AEFB-4F51-AAD7-74FA8B80F276}" srcOrd="0" destOrd="0" presId="urn:microsoft.com/office/officeart/2005/8/layout/orgChart1"/>
-    <dgm:cxn modelId="{41613858-5A44-4722-8E1B-391D41B57108}" type="presOf" srcId="{A12CA174-2EA1-4254-A2E2-9C94FA356EC7}" destId="{C3C23100-17F3-4187-BE7D-21D25FF295E0}" srcOrd="0" destOrd="0" presId="urn:microsoft.com/office/officeart/2005/8/layout/orgChart1"/>
-    <dgm:cxn modelId="{3EBB9851-1692-4370-8E2F-E7DA75B92171}" type="presOf" srcId="{E6512187-A44F-40F0-88C3-E2E4C07824B7}" destId="{C24FF2F0-14AE-4A01-929B-C5D80FE3D200}" srcOrd="0" destOrd="0" presId="urn:microsoft.com/office/officeart/2005/8/layout/orgChart1"/>
-    <dgm:cxn modelId="{3A90849A-4052-49D9-BA03-0A13E727A0D7}" type="presOf" srcId="{B67B89A4-82EA-44F8-B6C1-3F5C0C4882E2}" destId="{FB462F9E-37A4-4364-B61F-8744B5644546}" srcOrd="0" destOrd="0" presId="urn:microsoft.com/office/officeart/2005/8/layout/orgChart1"/>
-    <dgm:cxn modelId="{7D23F82D-E6C0-4C11-A4EE-403746E6B956}" srcId="{A12CA174-2EA1-4254-A2E2-9C94FA356EC7}" destId="{568786E3-CB59-4DB9-A75B-F3F7C409ACBF}" srcOrd="8" destOrd="0" parTransId="{A69C286E-240E-4664-BECA-C71EDEB14C00}" sibTransId="{4F1AAD17-152A-442D-93C0-619AF0D7D67A}"/>
-    <dgm:cxn modelId="{F37A2133-0B39-4E96-AE09-E03BE3CFB6E2}" type="presOf" srcId="{44C92458-6162-43E3-89A4-2E81084BFC0B}" destId="{A356A744-9CF5-4DA5-BFC0-EC31A34218D5}" srcOrd="1" destOrd="0" presId="urn:microsoft.com/office/officeart/2005/8/layout/orgChart1"/>
-    <dgm:cxn modelId="{CD88E303-1AFA-435F-B1A1-8061A431569C}" type="presOf" srcId="{75891BF6-2B04-4533-9FF6-C5A26B06D36E}" destId="{835878BC-DD36-43E2-B916-A1C58D993D8F}" srcOrd="0" destOrd="0" presId="urn:microsoft.com/office/officeart/2005/8/layout/orgChart1"/>
-    <dgm:cxn modelId="{CE5938A4-A991-41D6-94BB-D8204CA35A4A}" type="presOf" srcId="{39B8B1D4-80BD-49EE-AD66-399B0CF4CBD7}" destId="{247A70D3-1D91-4611-BEC5-D69C7504AD82}" srcOrd="1" destOrd="0" presId="urn:microsoft.com/office/officeart/2005/8/layout/orgChart1"/>
-    <dgm:cxn modelId="{D75B7830-AF58-4626-B77C-C70D4D29BD76}" srcId="{036F865D-B49C-497C-A28F-FACEB37BE973}" destId="{D457A40A-56B9-4F4F-B5B7-A69DF2E1F522}" srcOrd="10" destOrd="0" parTransId="{8687A9BC-A114-4542-92D9-DA4890EFFA33}" sibTransId="{9B79AD43-735E-4ACD-BCB3-B2E2FB662828}"/>
-    <dgm:cxn modelId="{B0A89856-81F0-4C9B-8785-F7A18A0DDC7A}" type="presOf" srcId="{29D0BC58-E48F-4187-A5B8-C49CFD41B6F2}" destId="{13E5D0CD-F90D-44BD-A3DB-34B6C1A2DFC6}" srcOrd="1" destOrd="0" presId="urn:microsoft.com/office/officeart/2005/8/layout/orgChart1"/>
-    <dgm:cxn modelId="{4D772414-F63F-4CC6-B9ED-81DDEBD5258F}" type="presOf" srcId="{A69C286E-240E-4664-BECA-C71EDEB14C00}" destId="{38C3BAC5-F2B9-47D4-A175-45EC8237EBD2}" srcOrd="0" destOrd="0" presId="urn:microsoft.com/office/officeart/2005/8/layout/orgChart1"/>
-    <dgm:cxn modelId="{DACB5F75-E6B0-4B7F-B889-0893DBE4864B}" type="presOf" srcId="{779A4152-A6FD-4812-A864-B13B238109FC}" destId="{B0AEACD3-5BE0-482F-A624-72DDEF621B53}" srcOrd="1" destOrd="0" presId="urn:microsoft.com/office/officeart/2005/8/layout/orgChart1"/>
-    <dgm:cxn modelId="{C9926210-BC1A-4167-92F5-6B529D067A1D}" type="presOf" srcId="{A94B5336-2754-49B3-9294-B4493062AE02}" destId="{CAEEDEE8-8381-4398-8AD3-77635320FB09}" srcOrd="0" destOrd="0" presId="urn:microsoft.com/office/officeart/2005/8/layout/orgChart1"/>
-    <dgm:cxn modelId="{6B43E898-3813-4F91-AAF9-8F7248A74EAC}" type="presOf" srcId="{5215C3D3-851F-46CC-A361-F2F3BA144B72}" destId="{4DDB96BE-474E-4630-931B-3AD80045574F}" srcOrd="0" destOrd="0" presId="urn:microsoft.com/office/officeart/2005/8/layout/orgChart1"/>
-    <dgm:cxn modelId="{D520E359-8585-4508-82EC-072E406E511D}" type="presOf" srcId="{E6F355BE-A692-4BCE-AFC3-B464A275299A}" destId="{BC545642-E1CD-46FB-9E0E-A426D974CE03}" srcOrd="1" destOrd="0" presId="urn:microsoft.com/office/officeart/2005/8/layout/orgChart1"/>
-    <dgm:cxn modelId="{E7B7964F-55B5-4E25-A54C-F31964FE317F}" srcId="{E49793DC-11A4-4FE5-B412-BDD04A01C875}" destId="{66BBC26C-D840-4A54-86D3-3188AE28C087}" srcOrd="0" destOrd="0" parTransId="{5BFC7CF1-7C30-48C9-A388-9B1D96528977}" sibTransId="{93F916F0-4522-47F0-B0C1-E262B2F9F953}"/>
+    <dgm:cxn modelId="{DC198975-2A81-464A-A43A-EA2ED8214018}" type="presOf" srcId="{CF1E7812-101D-4DF3-A7B5-DAFFB48917D2}" destId="{A72721EE-9B92-4279-94F3-F4F5E0ABA357}" srcOrd="0" destOrd="0" presId="urn:microsoft.com/office/officeart/2005/8/layout/orgChart1"/>
     <dgm:cxn modelId="{27928BC9-B30C-4990-86C6-0AFCEBB9350D}" type="presOf" srcId="{64F0A6F7-78A5-47F9-A720-3BEF75DFDDB5}" destId="{FB4FFB1B-EB28-4B83-9F08-B333D2CC8967}" srcOrd="0" destOrd="0" presId="urn:microsoft.com/office/officeart/2005/8/layout/orgChart1"/>
-    <dgm:cxn modelId="{BB588FC7-1191-4EAD-8500-229118357A8A}" srcId="{6F6C34EC-D04B-4D56-86A3-3E939B149C9F}" destId="{E6512187-A44F-40F0-88C3-E2E4C07824B7}" srcOrd="4" destOrd="0" parTransId="{EBD09873-60D5-456F-BB9E-A83723F7634A}" sibTransId="{A5BA61CA-12F7-42F6-A840-CD68DC9562EB}"/>
-    <dgm:cxn modelId="{DA064062-A940-4F9F-ACF5-5A62B5AA5B8E}" srcId="{A12CA174-2EA1-4254-A2E2-9C94FA356EC7}" destId="{2C1582BA-1E36-44E1-AB7E-5464369BDF2C}" srcOrd="6" destOrd="0" parTransId="{AEB49E7B-A0A9-4BD9-BB5C-0D12F5F7E3E2}" sibTransId="{039DAECA-5700-4F55-ACCC-0E0DA261F52E}"/>
-    <dgm:cxn modelId="{E84B1A76-5B9F-44D6-AA7C-EA50B20D83CC}" type="presOf" srcId="{1E47E0C3-F305-40E4-9317-CDB2B113F3FC}" destId="{19C1B8F6-53CC-4F21-8506-CCE80C245A6D}" srcOrd="0" destOrd="0" presId="urn:microsoft.com/office/officeart/2005/8/layout/orgChart1"/>
-    <dgm:cxn modelId="{AC4FAEC8-7195-4C85-98B8-E92BAD7F9FA9}" type="presOf" srcId="{397E882A-8E4B-419F-A35B-3AFC7D7CD9AD}" destId="{2A9218BD-F401-49D3-A1B0-136260F066B9}" srcOrd="1" destOrd="0" presId="urn:microsoft.com/office/officeart/2005/8/layout/orgChart1"/>
-    <dgm:cxn modelId="{9EFF9066-3A22-47B6-8710-1A4BBE254B39}" type="presOf" srcId="{D39555DC-FD40-400A-8291-2B20647F4971}" destId="{972C6FF3-E1BA-4E88-8065-3F56851B72BD}" srcOrd="1" destOrd="0" presId="urn:microsoft.com/office/officeart/2005/8/layout/orgChart1"/>
-    <dgm:cxn modelId="{8E66EB93-7D70-4165-97DC-999CD69A3069}" srcId="{6F6C34EC-D04B-4D56-86A3-3E939B149C9F}" destId="{397E882A-8E4B-419F-A35B-3AFC7D7CD9AD}" srcOrd="8" destOrd="0" parTransId="{7F3829AB-08D4-42EE-A778-D78F829EF8B9}" sibTransId="{ECC246A9-4F4D-4422-89B9-04D751FD176C}"/>
-    <dgm:cxn modelId="{B88BE953-D3FF-426C-80DA-3AE8B365A31A}" type="presOf" srcId="{DDBCFA16-FF48-4701-9B4A-F21E4666E982}" destId="{B4FC44E5-DB4F-49BB-A2F7-08D9A7617FA3}" srcOrd="1" destOrd="0" presId="urn:microsoft.com/office/officeart/2005/8/layout/orgChart1"/>
-    <dgm:cxn modelId="{F3F1A9E0-E59D-4061-A51F-FA80A34CD07E}" type="presOf" srcId="{8CFCF336-ACA3-4BDF-9255-F0461DEBF18A}" destId="{7DA07A9E-8A16-4116-92F8-8D90D254EDEC}" srcOrd="0" destOrd="0" presId="urn:microsoft.com/office/officeart/2005/8/layout/orgChart1"/>
-    <dgm:cxn modelId="{042AC9A2-234D-458C-ACB5-2C982B2FE9E2}" type="presOf" srcId="{E0F2B946-63C9-40A9-8DA4-823451445D94}" destId="{7AEA745E-64A3-40EE-B7B1-8567B0CD52D7}" srcOrd="0" destOrd="0" presId="urn:microsoft.com/office/officeart/2005/8/layout/orgChart1"/>
-    <dgm:cxn modelId="{5858AD5F-E6EB-4F71-97B8-4388679288D3}" type="presOf" srcId="{D39555DC-FD40-400A-8291-2B20647F4971}" destId="{53D4E2DF-D678-4FCB-946C-9E9D8BAB6E98}" srcOrd="0" destOrd="0" presId="urn:microsoft.com/office/officeart/2005/8/layout/orgChart1"/>
-    <dgm:cxn modelId="{1A5780DF-AB6F-4EBA-95AC-99806D79A381}" type="presOf" srcId="{D6455155-8DE5-4F96-86B3-6295D109D78B}" destId="{21C3A946-246C-444D-9867-3EE813888554}" srcOrd="1" destOrd="0" presId="urn:microsoft.com/office/officeart/2005/8/layout/orgChart1"/>
-    <dgm:cxn modelId="{5D981202-0F1C-49AE-ACD1-C888C44FE5E5}" srcId="{DDBCFA16-FF48-4701-9B4A-F21E4666E982}" destId="{BDBE938E-0EB9-42C3-A806-B193872D144A}" srcOrd="0" destOrd="0" parTransId="{E8891F10-A55D-4E77-AE72-7698EEC95996}" sibTransId="{984B7A84-CAD2-470E-9AD2-85BF90BB96EF}"/>
-    <dgm:cxn modelId="{12F9E9BD-3BD7-4985-82F1-DDAE1D57DA02}" type="presOf" srcId="{3E71C5FB-B753-47D4-9DCC-13828975B0A2}" destId="{E65D8129-CB67-4D48-B3AD-1E3237D9F2C0}" srcOrd="0" destOrd="0" presId="urn:microsoft.com/office/officeart/2005/8/layout/orgChart1"/>
-    <dgm:cxn modelId="{0AFB4EC0-730E-47A3-94A0-0B1D7A8CCC71}" type="presOf" srcId="{DFFEFCBB-A209-4917-9681-660DFA13E64F}" destId="{24FB80E3-61BC-43CE-96CD-B9DABA3064B0}" srcOrd="0" destOrd="0" presId="urn:microsoft.com/office/officeart/2005/8/layout/orgChart1"/>
-    <dgm:cxn modelId="{28D45EB9-55B6-4C6C-A355-6C1E5449EBB5}" type="presOf" srcId="{BDBE938E-0EB9-42C3-A806-B193872D144A}" destId="{6F7708FE-B68C-411C-8A8D-5EFBF18B3C58}" srcOrd="0" destOrd="0" presId="urn:microsoft.com/office/officeart/2005/8/layout/orgChart1"/>
-    <dgm:cxn modelId="{72CC7D68-4EBF-471F-9904-2964D73ACC7C}" type="presOf" srcId="{5E747862-7F4F-48C2-9656-0F2A1029D161}" destId="{34881B9C-2B1C-4E9F-835C-076DDE017804}" srcOrd="1" destOrd="0" presId="urn:microsoft.com/office/officeart/2005/8/layout/orgChart1"/>
-    <dgm:cxn modelId="{3E063938-1838-4E8A-98D0-EDF093092878}" type="presOf" srcId="{16E257D9-552D-418B-80F5-CF8B2A4A81F5}" destId="{1CF9BD50-EF74-4BA8-B055-045C20474701}" srcOrd="1" destOrd="0" presId="urn:microsoft.com/office/officeart/2005/8/layout/orgChart1"/>
-    <dgm:cxn modelId="{A474DE59-A0FE-4828-9B55-A9B1B7C5EBDD}" type="presOf" srcId="{D73CDCEA-89C2-455C-A3A3-230942560E3B}" destId="{E0A62DDC-CEC9-464E-93F6-E0E6D503299A}" srcOrd="0" destOrd="0" presId="urn:microsoft.com/office/officeart/2005/8/layout/orgChart1"/>
-    <dgm:cxn modelId="{0F1C9223-4414-442B-8F33-868870849819}" type="presOf" srcId="{17146953-BB10-4775-A2C8-6BD3AF1E8307}" destId="{AC9CBE74-87D6-4955-99AE-3669B439E49D}" srcOrd="1" destOrd="0" presId="urn:microsoft.com/office/officeart/2005/8/layout/orgChart1"/>
-    <dgm:cxn modelId="{71A472D4-A3E2-4120-B50B-C37BFB45AAAD}" type="presOf" srcId="{514468E7-68B1-4A1C-8A70-3B9D2BD46163}" destId="{986D6194-414A-4695-BBDB-EF380595A08A}" srcOrd="0" destOrd="0" presId="urn:microsoft.com/office/officeart/2005/8/layout/orgChart1"/>
-    <dgm:cxn modelId="{D0CB6AF6-FB64-4B4E-B4EF-B984A8F64C43}" type="presOf" srcId="{09C0A2EE-E4B2-42C9-8CB6-C39B37F93CA5}" destId="{6B02B729-9109-4F1E-B2E6-AA51BFE67673}" srcOrd="0" destOrd="0" presId="urn:microsoft.com/office/officeart/2005/8/layout/orgChart1"/>
-    <dgm:cxn modelId="{4509F461-EC93-4134-B473-F7DC0D78439B}" srcId="{EB43AF72-1C15-4079-BDD3-C856AD333C22}" destId="{3E71C5FB-B753-47D4-9DCC-13828975B0A2}" srcOrd="0" destOrd="0" parTransId="{B035C497-02DD-4EC8-BBF1-A55D9ECC9A7A}" sibTransId="{8EF95157-66A5-4B41-86DC-D84C0EEA029E}"/>
-    <dgm:cxn modelId="{3015DE49-BB22-42D7-AFC6-91AEF3F2EF46}" srcId="{E7F2B5B6-CF87-43D8-956B-865FA12A9832}" destId="{42AB1B98-997E-4DD4-82CB-98CED7A92BF2}" srcOrd="2" destOrd="0" parTransId="{C57D86BF-5B9D-41B8-BC5B-A5BCCB7D5E9E}" sibTransId="{7F738E0C-CD0C-48CE-AB82-F455923C619D}"/>
-    <dgm:cxn modelId="{07DF2F04-AA98-418F-B615-4F17660A76C5}" type="presOf" srcId="{16C2C151-7509-45B4-8172-9938019F1FE3}" destId="{1CF41F55-E010-46A3-95D4-006A58F0FD0B}" srcOrd="0" destOrd="0" presId="urn:microsoft.com/office/officeart/2005/8/layout/orgChart1"/>
-    <dgm:cxn modelId="{304A997F-55DA-4D80-9628-C733375D91EB}" type="presOf" srcId="{9CAA754C-E6D9-4A46-ABA6-878655BAEF8C}" destId="{A37DF5B7-4916-4A3B-8A3D-2D2F05D43D81}" srcOrd="0" destOrd="0" presId="urn:microsoft.com/office/officeart/2005/8/layout/orgChart1"/>
-    <dgm:cxn modelId="{989D17A5-4A6F-4FD3-8401-DF59E0C20039}" type="presOf" srcId="{F597CECE-331E-4863-AC83-399EF3C3151A}" destId="{3BF036C4-2647-41D5-A2F7-C9D3C91419F1}" srcOrd="0" destOrd="0" presId="urn:microsoft.com/office/officeart/2005/8/layout/orgChart1"/>
-    <dgm:cxn modelId="{E71058C7-FFDA-469B-9982-4D9D18F6BF6F}" srcId="{6F6C34EC-D04B-4D56-86A3-3E939B149C9F}" destId="{ED918E41-8FEA-4230-B27E-1B60FEB2B6F5}" srcOrd="1" destOrd="0" parTransId="{6DC63F07-3C40-4586-9546-0B182BD07E9B}" sibTransId="{D5B6E24A-A9D2-4784-82C2-C339150647C9}"/>
-    <dgm:cxn modelId="{FC6FBB5C-D977-4D87-9483-C05A4C680D66}" type="presOf" srcId="{8687A9BC-A114-4542-92D9-DA4890EFFA33}" destId="{A6D2DF91-5EF6-4C6F-9F2D-B194107E06DB}" srcOrd="0" destOrd="0" presId="urn:microsoft.com/office/officeart/2005/8/layout/orgChart1"/>
-    <dgm:cxn modelId="{3F23CB67-4790-4A7C-8CE8-32E3639E25F8}" type="presOf" srcId="{8DF21F59-4716-4250-BD7E-144F4D63CBC5}" destId="{392A2800-04D4-4BCA-A79F-9A9EA3200717}" srcOrd="0" destOrd="0" presId="urn:microsoft.com/office/officeart/2005/8/layout/orgChart1"/>
-    <dgm:cxn modelId="{F31BEB0F-5636-4838-B318-C67EB6BC8839}" type="presOf" srcId="{A1E21DB3-4238-483C-8C46-4651EF0F3427}" destId="{8CE77380-4885-4E29-AFAE-1967FD9D241B}" srcOrd="0" destOrd="0" presId="urn:microsoft.com/office/officeart/2005/8/layout/orgChart1"/>
-    <dgm:cxn modelId="{F28C6A58-D0A6-408A-8D8F-9079EA53D1CE}" type="presOf" srcId="{75891BF6-2B04-4533-9FF6-C5A26B06D36E}" destId="{6D043A8B-9884-400A-B87B-506B3B902105}" srcOrd="1" destOrd="0" presId="urn:microsoft.com/office/officeart/2005/8/layout/orgChart1"/>
-    <dgm:cxn modelId="{649CA73B-28AF-4F29-9854-719ECE1926CF}" srcId="{A12CA174-2EA1-4254-A2E2-9C94FA356EC7}" destId="{ABFBDFAE-74B1-4476-B6DB-C215E08D23B2}" srcOrd="4" destOrd="0" parTransId="{781618CB-6D74-4BCB-AEE2-FAC5CB743DCD}" sibTransId="{7DE0CE56-147C-41BD-9CF2-D246C41F4CB6}"/>
-    <dgm:cxn modelId="{5A4FDFD1-FB27-4894-9AB2-5EED1C66FE93}" srcId="{E7F2B5B6-CF87-43D8-956B-865FA12A9832}" destId="{C4A8471A-4B9E-488E-9113-5F14ED685C1C}" srcOrd="10" destOrd="0" parTransId="{D73CDCEA-89C2-455C-A3A3-230942560E3B}" sibTransId="{F51F554D-842C-4702-B230-A2683A344025}"/>
-    <dgm:cxn modelId="{074F063F-9DE1-4562-AD6D-CA6BC6D0C8AA}" type="presOf" srcId="{F59FBA88-6DA3-4931-AF85-1FEF48D0FE76}" destId="{10EDDF8B-068F-483C-AD6D-CB0E40706FAD}" srcOrd="0" destOrd="0" presId="urn:microsoft.com/office/officeart/2005/8/layout/orgChart1"/>
-    <dgm:cxn modelId="{9F8DDD36-29C4-46B6-A1A7-F000DFF88691}" type="presOf" srcId="{720D1D11-BDEC-4B23-A9CF-84AC59FF8D98}" destId="{347530D3-BC6E-4C36-9AEB-4D6933CAEA9B}" srcOrd="0" destOrd="0" presId="urn:microsoft.com/office/officeart/2005/8/layout/orgChart1"/>
+    <dgm:cxn modelId="{31BB14F0-ED0D-431C-A5D8-CB4F6091C508}" srcId="{A12CA174-2EA1-4254-A2E2-9C94FA356EC7}" destId="{75BEB708-1BA6-4F6B-95E5-ECC20B1CCD2A}" srcOrd="2" destOrd="0" parTransId="{EE92D677-A1A3-4926-B565-7677FD45C04C}" sibTransId="{B04EE4AD-993A-4B0E-B535-BE76DE166198}"/>
     <dgm:cxn modelId="{F3778DB1-E970-4CCD-924D-72B6624EC242}" type="presOf" srcId="{2C1582BA-1E36-44E1-AB7E-5464369BDF2C}" destId="{63411E3F-B838-4829-8052-20C6D20E8EF6}" srcOrd="0" destOrd="0" presId="urn:microsoft.com/office/officeart/2005/8/layout/orgChart1"/>
-    <dgm:cxn modelId="{51FFC9E6-07AB-4D56-B2EE-456A8C0C537F}" type="presOf" srcId="{7F3829AB-08D4-42EE-A778-D78F829EF8B9}" destId="{51183CC0-BB79-4BFA-BFA7-1C8160ECA015}" srcOrd="0" destOrd="0" presId="urn:microsoft.com/office/officeart/2005/8/layout/orgChart1"/>
-    <dgm:cxn modelId="{02769CF7-5CFE-4187-B32A-7B88BC5D685F}" srcId="{A12CA174-2EA1-4254-A2E2-9C94FA356EC7}" destId="{E6F355BE-A692-4BCE-AFC3-B464A275299A}" srcOrd="7" destOrd="0" parTransId="{1B566B84-3B0B-436F-8189-6AC1F2BB3FC5}" sibTransId="{7936D18A-1163-4F1F-AA07-584F2502FB36}"/>
-    <dgm:cxn modelId="{DE86024A-09DC-45A8-9471-0B7B5E896AA2}" type="presOf" srcId="{779A4152-A6FD-4812-A864-B13B238109FC}" destId="{28E62C6E-0011-4AA1-9F7E-0CBB6AA68AD2}" srcOrd="0" destOrd="0" presId="urn:microsoft.com/office/officeart/2005/8/layout/orgChart1"/>
-    <dgm:cxn modelId="{A2599104-03D3-481E-91CE-29A867DA1663}" srcId="{036F865D-B49C-497C-A28F-FACEB37BE973}" destId="{9F200D04-6C2F-4163-B6FC-6A05CBEF6041}" srcOrd="12" destOrd="0" parTransId="{4AA34804-2501-4061-B904-8E2F978C5BED}" sibTransId="{472FFA6C-42C4-4C00-BD83-478C3D4848F2}"/>
-    <dgm:cxn modelId="{6A1A2A9A-976F-4DDF-B13D-ACA9604A5F9F}" type="presOf" srcId="{720D1D11-BDEC-4B23-A9CF-84AC59FF8D98}" destId="{98905030-4DAA-49B2-8363-9A215F8558D2}" srcOrd="1" destOrd="0" presId="urn:microsoft.com/office/officeart/2005/8/layout/orgChart1"/>
-    <dgm:cxn modelId="{D42B547A-3BA8-40F1-96E4-8EB7F5FFFB6E}" type="presOf" srcId="{003393E9-8076-4FF8-A132-BE48278ECCD0}" destId="{27B2EFD6-65D1-4FBD-AB6B-CE2AFFCD618A}" srcOrd="1" destOrd="0" presId="urn:microsoft.com/office/officeart/2005/8/layout/orgChart1"/>
-    <dgm:cxn modelId="{0F964822-1D6E-427C-BAB2-F9277FA15D0A}" type="presOf" srcId="{15EDC76C-57B9-43BE-BF45-2205A01BA0A3}" destId="{6818241D-C03D-43DD-B027-19A9928C0050}" srcOrd="1" destOrd="0" presId="urn:microsoft.com/office/officeart/2005/8/layout/orgChart1"/>
-    <dgm:cxn modelId="{AD30474F-2D72-49B2-8E02-ABCB78F0446D}" type="presOf" srcId="{B3292FCB-66B4-4C67-8DD8-20E8071DF9AB}" destId="{EF868A8B-BF61-4BCB-B817-34E0BC73C76A}" srcOrd="1" destOrd="0" presId="urn:microsoft.com/office/officeart/2005/8/layout/orgChart1"/>
-    <dgm:cxn modelId="{62930BA5-A938-4361-9BEC-9F806292E2F4}" srcId="{A12CA174-2EA1-4254-A2E2-9C94FA356EC7}" destId="{3ADDB50E-C716-4235-8030-97BFF40B2B70}" srcOrd="0" destOrd="0" parTransId="{71207E5B-E26C-41C9-8A41-12011AC99E24}" sibTransId="{6102893D-2211-4EFA-84BB-9067CDD0D224}"/>
-    <dgm:cxn modelId="{F80109F4-59A9-4F9F-AB3E-22C532FC83B8}" type="presOf" srcId="{AEB49E7B-A0A9-4BD9-BB5C-0D12F5F7E3E2}" destId="{CB2A619C-1D1D-487E-8064-C9A3290FDFE3}" srcOrd="0" destOrd="0" presId="urn:microsoft.com/office/officeart/2005/8/layout/orgChart1"/>
-    <dgm:cxn modelId="{6549E417-719F-46E1-AE28-701E2DE32488}" type="presOf" srcId="{75BEB708-1BA6-4F6B-95E5-ECC20B1CCD2A}" destId="{4C38AA1E-BCE2-4111-AC89-DF26AC8AD852}" srcOrd="1" destOrd="0" presId="urn:microsoft.com/office/officeart/2005/8/layout/orgChart1"/>
-    <dgm:cxn modelId="{6CCE2140-F19C-4BEE-AA78-4DF048FAFB83}" srcId="{036F865D-B49C-497C-A28F-FACEB37BE973}" destId="{16E257D9-552D-418B-80F5-CF8B2A4A81F5}" srcOrd="4" destOrd="0" parTransId="{4E552C99-E3B0-4D8F-AB3B-2707F7D7FF07}" sibTransId="{EED39783-688B-4907-A0BA-BAC8B3196EBE}"/>
-    <dgm:cxn modelId="{B4830BA8-8BD2-4856-850E-BFFC96BECE4B}" type="presOf" srcId="{39B8B1D4-80BD-49EE-AD66-399B0CF4CBD7}" destId="{EF0180FF-CD88-4D8A-B562-FA2B7B274629}" srcOrd="0" destOrd="0" presId="urn:microsoft.com/office/officeart/2005/8/layout/orgChart1"/>
-    <dgm:cxn modelId="{474998B0-B91D-4B6E-BEF8-9E9EF3674121}" type="presOf" srcId="{EB43AF72-1C15-4079-BDD3-C856AD333C22}" destId="{6383E483-01F1-40CC-83D5-F4DB42FCEE17}" srcOrd="0" destOrd="0" presId="urn:microsoft.com/office/officeart/2005/8/layout/orgChart1"/>
-    <dgm:cxn modelId="{1196C1DB-E14E-4EE8-BDA2-17E30E871E40}" srcId="{A12CA174-2EA1-4254-A2E2-9C94FA356EC7}" destId="{75891BF6-2B04-4533-9FF6-C5A26B06D36E}" srcOrd="3" destOrd="0" parTransId="{5C2E33FB-B544-4FA0-A971-C25A0BDFB5F3}" sibTransId="{1926CF70-B7F5-4885-94EF-EAE16BC51726}"/>
-    <dgm:cxn modelId="{8EFB885D-98B9-48A4-A970-BC00345B3AA8}" type="presOf" srcId="{CAC00B8C-8726-4518-996D-52DDA6373405}" destId="{0A6EE857-2D80-420A-94A3-783CFC3A9FC3}" srcOrd="0" destOrd="0" presId="urn:microsoft.com/office/officeart/2005/8/layout/orgChart1"/>
-    <dgm:cxn modelId="{07FA2EC9-32A7-485C-9304-F079885BF422}" srcId="{6F6C34EC-D04B-4D56-86A3-3E939B149C9F}" destId="{E2983617-B5F4-4C75-81E3-8F79C5CAD3D9}" srcOrd="2" destOrd="0" parTransId="{F59FBA88-6DA3-4931-AF85-1FEF48D0FE76}" sibTransId="{97D65DE7-1255-44DD-A3BC-F838D36DB41A}"/>
-    <dgm:cxn modelId="{56382EE8-D5E6-446C-89A7-EBA00361F2CB}" type="presOf" srcId="{3E71C5FB-B753-47D4-9DCC-13828975B0A2}" destId="{F45BD869-2D88-4C0A-82C8-8E7C77BA288B}" srcOrd="1" destOrd="0" presId="urn:microsoft.com/office/officeart/2005/8/layout/orgChart1"/>
-    <dgm:cxn modelId="{5468F2ED-C85F-4A84-B036-C77B12EED64F}" type="presOf" srcId="{42AB1B98-997E-4DD4-82CB-98CED7A92BF2}" destId="{C3AB7433-9F2E-4A8C-A5F9-A8969A074E88}" srcOrd="0" destOrd="0" presId="urn:microsoft.com/office/officeart/2005/8/layout/orgChart1"/>
-    <dgm:cxn modelId="{1C2D76FF-91A9-4C3F-9298-06CBFF9E2E9C}" type="presOf" srcId="{C5370C20-0426-439A-9DC4-138E02297911}" destId="{54A52D23-8C14-4E39-B1AD-F79849C256E1}" srcOrd="0" destOrd="0" presId="urn:microsoft.com/office/officeart/2005/8/layout/orgChart1"/>
-    <dgm:cxn modelId="{1AA828A6-0447-4CDA-86B7-FE30B4BFB217}" type="presOf" srcId="{397E882A-8E4B-419F-A35B-3AFC7D7CD9AD}" destId="{D00CDF34-6BD6-4A5E-827E-6DAA92405E58}" srcOrd="0" destOrd="0" presId="urn:microsoft.com/office/officeart/2005/8/layout/orgChart1"/>
-    <dgm:cxn modelId="{CEBC5CDF-116A-4E29-BAD2-334673159C4D}" type="presOf" srcId="{FF731828-F1FB-4C65-AD8B-BA577D11BC61}" destId="{FD57E3D6-B9DE-46A6-A495-8659DDDD82DF}" srcOrd="0" destOrd="0" presId="urn:microsoft.com/office/officeart/2005/8/layout/orgChart1"/>
-    <dgm:cxn modelId="{EE99DA56-C2BD-4492-9172-2A3A6D341911}" type="presOf" srcId="{5B650B58-E6B4-4F81-9E92-48805D7BAFC8}" destId="{364764C0-1DEE-4CB7-8635-36A8D87C6C6A}" srcOrd="0" destOrd="0" presId="urn:microsoft.com/office/officeart/2005/8/layout/orgChart1"/>
-    <dgm:cxn modelId="{676D22C9-B0F7-4712-82D1-4759B5B9B709}" srcId="{036F865D-B49C-497C-A28F-FACEB37BE973}" destId="{A0DB2208-0287-4860-A3E2-FE5A64BEC9DF}" srcOrd="8" destOrd="0" parTransId="{2F41C27A-E39C-4022-8C3C-C3D3DD3E646F}" sibTransId="{22C8EFBC-46D0-45B9-BCE3-3E6339D5865F}"/>
-    <dgm:cxn modelId="{0D367CC6-53B0-4C61-84C6-DD9B05B84865}" type="presOf" srcId="{B8AD3FDB-62B5-43CC-8C3E-4F5B3AFF587E}" destId="{B4E3BBEA-AFED-4425-8442-4F10DBF7FC80}" srcOrd="0" destOrd="0" presId="urn:microsoft.com/office/officeart/2005/8/layout/orgChart1"/>
-    <dgm:cxn modelId="{44770954-F567-4A4A-91BF-5428411F2560}" type="presOf" srcId="{5215C3D3-851F-46CC-A361-F2F3BA144B72}" destId="{908332AD-A799-4F49-9E46-CCB22279C8AA}" srcOrd="1" destOrd="0" presId="urn:microsoft.com/office/officeart/2005/8/layout/orgChart1"/>
-    <dgm:cxn modelId="{BFBF79A5-9439-4879-8BC4-D43B7B5CF6E7}" type="presOf" srcId="{C9A2CEE2-9518-4767-ABDA-FEC5C5734C63}" destId="{BA75525E-AF2A-4871-BEB5-835CA0C6745F}" srcOrd="0" destOrd="0" presId="urn:microsoft.com/office/officeart/2005/8/layout/orgChart1"/>
-    <dgm:cxn modelId="{29594227-B839-471F-BC6E-0E6450E5D132}" type="presOf" srcId="{EBD09873-60D5-456F-BB9E-A83723F7634A}" destId="{FB94F875-605E-4FA2-8BCF-41223452A711}" srcOrd="0" destOrd="0" presId="urn:microsoft.com/office/officeart/2005/8/layout/orgChart1"/>
-    <dgm:cxn modelId="{66BD077D-3193-487B-AC26-805A9C7F8F71}" type="presOf" srcId="{A974D924-41A7-4AEC-8F52-A64CBC1E37F4}" destId="{B37A9B3D-E534-4D0C-8A94-8B37F01BBF99}" srcOrd="0" destOrd="0" presId="urn:microsoft.com/office/officeart/2005/8/layout/orgChart1"/>
-    <dgm:cxn modelId="{53586120-A1EF-4DD4-9374-D7EF900324DF}" type="presOf" srcId="{E6512187-A44F-40F0-88C3-E2E4C07824B7}" destId="{32B82704-7FA4-42CD-86C6-FF0DB3D1300D}" srcOrd="1" destOrd="0" presId="urn:microsoft.com/office/officeart/2005/8/layout/orgChart1"/>
-    <dgm:cxn modelId="{0D294E13-EDC5-4B78-B7E9-680F1CD56FA5}" srcId="{E7F2B5B6-CF87-43D8-956B-865FA12A9832}" destId="{E621B393-E081-4074-9CF7-24B8C04658FF}" srcOrd="8" destOrd="0" parTransId="{16C2C151-7509-45B4-8172-9938019F1FE3}" sibTransId="{7B050B97-4134-4614-957D-E7AE736E13E8}"/>
-    <dgm:cxn modelId="{556A4B41-AC20-43B2-BDDE-9A90ABFFFBFA}" type="presOf" srcId="{514468E7-68B1-4A1C-8A70-3B9D2BD46163}" destId="{F312B54E-4981-428A-8A3C-FD704C6A5BDB}" srcOrd="1" destOrd="0" presId="urn:microsoft.com/office/officeart/2005/8/layout/orgChart1"/>
-    <dgm:cxn modelId="{6F80C7E6-532F-48BC-8EF0-B735714C922D}" type="presOf" srcId="{5505AFFD-EF3C-433E-B042-B7089BA0CA6C}" destId="{72776E21-64F2-46DC-BBCB-8EF5423FEC94}" srcOrd="0" destOrd="0" presId="urn:microsoft.com/office/officeart/2005/8/layout/orgChart1"/>
-    <dgm:cxn modelId="{B09D882E-5F5C-4056-85CC-3A4A9F2F1CD5}" srcId="{036F865D-B49C-497C-A28F-FACEB37BE973}" destId="{2E17DAB0-83AA-4E1C-A393-685377E018BA}" srcOrd="9" destOrd="0" parTransId="{B6068B13-10D0-4540-903D-094B6D761789}" sibTransId="{2D678007-1D34-4BB8-A0B1-14B9DA190469}"/>
-    <dgm:cxn modelId="{1E5FBAA5-9686-4AAC-A6A2-1B35E492FBDC}" type="presOf" srcId="{2F41C27A-E39C-4022-8C3C-C3D3DD3E646F}" destId="{93329676-5256-4478-8E0E-AB15A5F830FA}" srcOrd="0" destOrd="0" presId="urn:microsoft.com/office/officeart/2005/8/layout/orgChart1"/>
-    <dgm:cxn modelId="{E6A6698F-9FFF-49C4-ADCE-DD9C76841FD0}" type="presOf" srcId="{6A8B354A-8DFF-4438-9E28-0978BD25CCDE}" destId="{E03A1774-4ACC-4BB8-931D-A30D75888772}" srcOrd="0" destOrd="0" presId="urn:microsoft.com/office/officeart/2005/8/layout/orgChart1"/>
-    <dgm:cxn modelId="{DC6A451E-D1D7-4C31-A61C-7C8452589938}" type="presOf" srcId="{C4A8471A-4B9E-488E-9113-5F14ED685C1C}" destId="{23A2510C-DF51-440E-9643-FAC1D69D4554}" srcOrd="0" destOrd="0" presId="urn:microsoft.com/office/officeart/2005/8/layout/orgChart1"/>
-    <dgm:cxn modelId="{224B5F98-FA6A-4229-B57A-2FF7CFFDB7FD}" srcId="{E7F2B5B6-CF87-43D8-956B-865FA12A9832}" destId="{D3BB9439-3AF0-42C0-AB8D-88AF1C54095C}" srcOrd="7" destOrd="0" parTransId="{B67B89A4-82EA-44F8-B6C1-3F5C0C4882E2}" sibTransId="{0F7A3DD9-A560-4EBC-90C9-916A2536DDDB}"/>
-    <dgm:cxn modelId="{AD2BD445-88AA-4C23-A69C-46653F89E522}" srcId="{E7F2B5B6-CF87-43D8-956B-865FA12A9832}" destId="{44C92458-6162-43E3-89A4-2E81084BFC0B}" srcOrd="6" destOrd="0" parTransId="{5A2E9414-479E-446C-A2E4-726DD6DA6FCB}" sibTransId="{E75C25CC-32CD-4B0F-8FD4-DBB4A834B9C1}"/>
-    <dgm:cxn modelId="{975ADECA-0D6D-4101-ACC5-036D1BC4D3C3}" type="presOf" srcId="{036F865D-B49C-497C-A28F-FACEB37BE973}" destId="{49A0AAB5-AEB3-4301-86B1-9947C47B5021}" srcOrd="1" destOrd="0" presId="urn:microsoft.com/office/officeart/2005/8/layout/orgChart1"/>
-    <dgm:cxn modelId="{88775CDD-8F49-4274-ACAE-1093BFBAF2CE}" type="presOf" srcId="{A57018D7-84ED-488F-BB9E-3D81E4943144}" destId="{470ED9D4-9131-4301-BA5E-FA66C0F09D24}" srcOrd="0" destOrd="0" presId="urn:microsoft.com/office/officeart/2005/8/layout/orgChart1"/>
+    <dgm:cxn modelId="{7395C684-73DB-4DDD-9A43-8B937A28E30D}" srcId="{CF1E7812-101D-4DF3-A7B5-DAFFB48917D2}" destId="{720D1D11-BDEC-4B23-A9CF-84AC59FF8D98}" srcOrd="2" destOrd="0" parTransId="{F597CECE-331E-4863-AC83-399EF3C3151A}" sibTransId="{16AF6387-63F5-4669-AAD0-BADF2F213C0C}"/>
+    <dgm:cxn modelId="{77E8CA7D-9C1C-43D5-9DCB-19F920769F85}" srcId="{B7A998B6-3CFD-4CE5-ABF6-102C39C44168}" destId="{592EDF8A-A7DA-43DB-849D-96EC567ADCC5}" srcOrd="1" destOrd="0" parTransId="{4680C006-E723-4678-9423-DDC71E5793BF}" sibTransId="{11C670BC-1B62-4D3E-B5BB-DB03224CADE8}"/>
+    <dgm:cxn modelId="{A93C13A8-329C-40E0-A1E8-6F67D99BE54F}" srcId="{B7A998B6-3CFD-4CE5-ABF6-102C39C44168}" destId="{DDB6B235-C9F5-497C-9FBE-4D3337D8A76E}" srcOrd="0" destOrd="0" parTransId="{1E47E0C3-F305-40E4-9317-CDB2B113F3FC}" sibTransId="{3088286D-D4FC-44B9-B451-80FE889722A5}"/>
     <dgm:cxn modelId="{3F57EB92-4045-429D-89DA-1F4EEAA0AEEF}" type="presOf" srcId="{6823163E-339E-47B3-B957-04897E98412A}" destId="{551BEAEC-A45D-45E8-907B-06154DBD5170}" srcOrd="0" destOrd="0" presId="urn:microsoft.com/office/officeart/2005/8/layout/orgChart1"/>
-    <dgm:cxn modelId="{D91864AC-CC31-43CA-B0AF-DB93E0CF7E85}" type="presOf" srcId="{6032129E-23D8-4962-94D5-ABBFEBC304CD}" destId="{BDC041CE-CEBC-4572-9657-A4465BD23E89}" srcOrd="0" destOrd="0" presId="urn:microsoft.com/office/officeart/2005/8/layout/orgChart1"/>
-    <dgm:cxn modelId="{726E5D66-7D55-456B-ADEE-A74EF35B513D}" type="presOf" srcId="{DDBCFA16-FF48-4701-9B4A-F21E4666E982}" destId="{DE2187BC-0901-4F55-A5FA-4A6D618599FD}" srcOrd="0" destOrd="0" presId="urn:microsoft.com/office/officeart/2005/8/layout/orgChart1"/>
-    <dgm:cxn modelId="{64F5273E-00A6-4291-8548-23D8B691C7D2}" type="presOf" srcId="{D6455155-8DE5-4F96-86B3-6295D109D78B}" destId="{A85B6B4B-9EEB-413E-B815-40BB9E6F12D8}" srcOrd="0" destOrd="0" presId="urn:microsoft.com/office/officeart/2005/8/layout/orgChart1"/>
-    <dgm:cxn modelId="{837270FC-768F-4196-A4FF-F475D5574D73}" type="presOf" srcId="{08F7D90B-DD5F-47B6-918B-EC4EAA8ACAD1}" destId="{40B3E233-13F6-44C4-848F-703203FF2154}" srcOrd="0" destOrd="0" presId="urn:microsoft.com/office/officeart/2005/8/layout/orgChart1"/>
-    <dgm:cxn modelId="{4C7BA36F-8B2F-4A48-B89C-E4DE33AE0047}" type="presOf" srcId="{A0DB2208-0287-4860-A3E2-FE5A64BEC9DF}" destId="{D0FCADBF-CE78-4AEB-B579-353D551E8E5C}" srcOrd="1" destOrd="0" presId="urn:microsoft.com/office/officeart/2005/8/layout/orgChart1"/>
-    <dgm:cxn modelId="{14083668-1EB9-49E4-9E95-EF239B2EAF4C}" srcId="{B7A998B6-3CFD-4CE5-ABF6-102C39C44168}" destId="{40BCF024-F5C2-4C0D-BFDB-5643E2836A8D}" srcOrd="2" destOrd="0" parTransId="{6032129E-23D8-4962-94D5-ABBFEBC304CD}" sibTransId="{8B0AEF8F-D6D4-4FEF-97D8-A2A1F63D1E32}"/>
-    <dgm:cxn modelId="{A2AD1167-DB28-4AF6-AB9E-3DE4C4D76FF1}" srcId="{E7F2B5B6-CF87-43D8-956B-865FA12A9832}" destId="{A94B5336-2754-49B3-9294-B4493062AE02}" srcOrd="9" destOrd="0" parTransId="{925F4CF3-0DE2-4266-BB71-2D5B5E2E47B9}" sibTransId="{D70C8C72-698A-4412-A23F-CDA58464865A}"/>
-    <dgm:cxn modelId="{7DBEB3B6-4CEA-44E9-908C-1E4D7065E24C}" type="presOf" srcId="{E49793DC-11A4-4FE5-B412-BDD04A01C875}" destId="{AE6F86C0-0850-495B-860D-6800171FD38C}" srcOrd="1" destOrd="0" presId="urn:microsoft.com/office/officeart/2005/8/layout/orgChart1"/>
-    <dgm:cxn modelId="{191CBCCD-F3FE-4209-B2CD-B3D736C1F2BB}" type="presOf" srcId="{E45D94D1-C699-49D6-8FB7-1A53EF69E9C4}" destId="{0D4D1DB7-317F-4514-9C9A-833274238A92}" srcOrd="0" destOrd="0" presId="urn:microsoft.com/office/officeart/2005/8/layout/orgChart1"/>
-    <dgm:cxn modelId="{3D370610-31ED-42AB-BDB6-F91B699F3D0A}" type="presOf" srcId="{6DC63F07-3C40-4586-9546-0B182BD07E9B}" destId="{70EBA4A0-CF67-4F6D-A518-A91840F2605A}" srcOrd="0" destOrd="0" presId="urn:microsoft.com/office/officeart/2005/8/layout/orgChart1"/>
-    <dgm:cxn modelId="{8622A296-F5BA-4F94-92B0-A7CF9367B522}" type="presOf" srcId="{9CAA754C-E6D9-4A46-ABA6-878655BAEF8C}" destId="{7BD448E9-0848-4D01-972D-E115C810CFB9}" srcOrd="1" destOrd="0" presId="urn:microsoft.com/office/officeart/2005/8/layout/orgChart1"/>
-    <dgm:cxn modelId="{2B2DEB15-E8B2-46E5-B351-2CA70D419CFE}" type="presOf" srcId="{ABFBDFAE-74B1-4476-B6DB-C215E08D23B2}" destId="{1AC29E14-915B-4911-AF3F-938CC06FDB8F}" srcOrd="1" destOrd="0" presId="urn:microsoft.com/office/officeart/2005/8/layout/orgChart1"/>
-    <dgm:cxn modelId="{44462340-6698-445B-928D-DCDEE737FE2F}" type="presOf" srcId="{A23490DE-FFAE-4D31-8649-F7A3429DDBC1}" destId="{584F23C7-48B9-4FDA-A0C1-E191680C78A4}" srcOrd="0" destOrd="0" presId="urn:microsoft.com/office/officeart/2005/8/layout/orgChart1"/>
-    <dgm:cxn modelId="{E5590C9D-E9AA-4E91-A5CC-977A476A687D}" type="presOf" srcId="{A57018D7-84ED-488F-BB9E-3D81E4943144}" destId="{B089BFF1-7EAC-4617-871D-2CEA92AB29F4}" srcOrd="1" destOrd="0" presId="urn:microsoft.com/office/officeart/2005/8/layout/orgChart1"/>
-    <dgm:cxn modelId="{21AE4FDB-488D-4971-9AAD-6FFBE44784EE}" type="presOf" srcId="{15EDC76C-57B9-43BE-BF45-2205A01BA0A3}" destId="{9E8DB942-C0D1-4FDE-98A8-0335DB18EC80}" srcOrd="0" destOrd="0" presId="urn:microsoft.com/office/officeart/2005/8/layout/orgChart1"/>
-    <dgm:cxn modelId="{B6A948C2-3B11-43A7-BC59-FD8DBD63AFB9}" type="presOf" srcId="{ED918E41-8FEA-4230-B27E-1B60FEB2B6F5}" destId="{E9F17D80-C6B9-48EA-9762-DA965E907594}" srcOrd="1" destOrd="0" presId="urn:microsoft.com/office/officeart/2005/8/layout/orgChart1"/>
-    <dgm:cxn modelId="{6ABA3F7E-A587-4254-AFAB-FC39000DBC2E}" type="presOf" srcId="{328C9D30-CD38-4F0C-A8AC-D8255B5817AB}" destId="{2F1645D0-CF00-4CAA-AB0A-65F8D3EFC89A}" srcOrd="1" destOrd="0" presId="urn:microsoft.com/office/officeart/2005/8/layout/orgChart1"/>
-    <dgm:cxn modelId="{5EBB9156-50AC-49E3-B24B-02F32B3D4DFA}" type="presOf" srcId="{85469F26-7E84-4E68-B914-7D140FF6A72E}" destId="{1315C1DC-2433-4DC5-B8E7-CF18EA9C90AE}" srcOrd="0" destOrd="0" presId="urn:microsoft.com/office/officeart/2005/8/layout/orgChart1"/>
-    <dgm:cxn modelId="{AC3C3DD8-9108-49BF-8467-E36BA5B09B78}" type="presOf" srcId="{0D775FB3-6EA1-4D27-B7F9-88A660B213AA}" destId="{795639F0-130D-4715-81F4-0CC616C64FB3}" srcOrd="0" destOrd="0" presId="urn:microsoft.com/office/officeart/2005/8/layout/orgChart1"/>
-    <dgm:cxn modelId="{49C40D50-AD88-464D-B351-64BA63E063A5}" type="presOf" srcId="{6A0697FA-443C-4159-8BAB-54E9CE102235}" destId="{CA498863-A530-456E-A0E2-3F60EEB96735}" srcOrd="0" destOrd="0" presId="urn:microsoft.com/office/officeart/2005/8/layout/orgChart1"/>
-    <dgm:cxn modelId="{A4DF9CAC-3527-4F4E-B9B2-E4C955B469AC}" type="presOf" srcId="{BAC8ED56-9041-4B42-94A8-15F81727F6E9}" destId="{A722B889-428E-409C-BE66-13B81BF8FCF1}" srcOrd="1" destOrd="0" presId="urn:microsoft.com/office/officeart/2005/8/layout/orgChart1"/>
-    <dgm:cxn modelId="{2793BE31-9940-4A22-9F84-90A71A8A2060}" srcId="{CF1E7812-101D-4DF3-A7B5-DAFFB48917D2}" destId="{328C9D30-CD38-4F0C-A8AC-D8255B5817AB}" srcOrd="0" destOrd="0" parTransId="{C5370C20-0426-439A-9DC4-138E02297911}" sibTransId="{030F9FD7-A390-4A20-AB50-E4A6D03E43D3}"/>
-    <dgm:cxn modelId="{013AF8A4-8F06-4569-9011-273BC84756C5}" type="presOf" srcId="{8DF21F59-4716-4250-BD7E-144F4D63CBC5}" destId="{322C77DB-BD76-4E86-9D6F-41EA80D6E816}" srcOrd="1" destOrd="0" presId="urn:microsoft.com/office/officeart/2005/8/layout/orgChart1"/>
-    <dgm:cxn modelId="{C5CCB62F-1A70-49D6-B32C-1D8955DA0298}" type="presOf" srcId="{B3CE34A7-3737-4E98-BC58-22D32761C765}" destId="{EF476796-8A6B-44D6-B3F8-F4A6F90AA3D7}" srcOrd="1" destOrd="0" presId="urn:microsoft.com/office/officeart/2005/8/layout/orgChart1"/>
-    <dgm:cxn modelId="{B727D8C6-7919-4E63-BB86-F3B79FC5D66C}" srcId="{3E71C5FB-B753-47D4-9DCC-13828975B0A2}" destId="{DDBCFA16-FF48-4701-9B4A-F21E4666E982}" srcOrd="1" destOrd="0" parTransId="{91B628C4-F28F-4C57-BADA-4C525DD54D79}" sibTransId="{D8D6F392-D5A7-451D-B7B7-33EB3E0338DE}"/>
-    <dgm:cxn modelId="{E7ACFFF9-5557-48C3-A5FB-19CB9EC91843}" srcId="{036F865D-B49C-497C-A28F-FACEB37BE973}" destId="{B3CE34A7-3737-4E98-BC58-22D32761C765}" srcOrd="11" destOrd="0" parTransId="{FF731828-F1FB-4C65-AD8B-BA577D11BC61}" sibTransId="{4322ABB2-08C5-494C-8036-122EA89FED4F}"/>
-    <dgm:cxn modelId="{ABD04C72-7AFF-418A-A515-FBFDDB9EDE53}" srcId="{6F6C34EC-D04B-4D56-86A3-3E939B149C9F}" destId="{29D0BC58-E48F-4187-A5B8-C49CFD41B6F2}" srcOrd="0" destOrd="0" parTransId="{A974D924-41A7-4AEC-8F52-A64CBC1E37F4}" sibTransId="{02CFCA18-D650-48A0-B254-6F1FEA773105}"/>
-    <dgm:cxn modelId="{E508CF58-BF31-4E8F-94A9-E110DB164543}" type="presOf" srcId="{01D5BAB2-961F-473A-B3FF-E3EA572DD70A}" destId="{5F0A0127-23EC-4E4A-9BD0-57E5038FAA11}" srcOrd="0" destOrd="0" presId="urn:microsoft.com/office/officeart/2005/8/layout/orgChart1"/>
-    <dgm:cxn modelId="{F1F86ABC-BA08-4AA1-8880-A4DB418CF17A}" srcId="{E49793DC-11A4-4FE5-B412-BDD04A01C875}" destId="{5E747862-7F4F-48C2-9656-0F2A1029D161}" srcOrd="1" destOrd="0" parTransId="{AF7CD24D-0163-4221-AE52-2FADAF1DBDE1}" sibTransId="{708463A1-F645-4522-B160-944144264BAE}"/>
-    <dgm:cxn modelId="{562A1128-3384-45EA-B677-3D0D23735DA7}" srcId="{6F6C34EC-D04B-4D56-86A3-3E939B149C9F}" destId="{39B8B1D4-80BD-49EE-AD66-399B0CF4CBD7}" srcOrd="5" destOrd="0" parTransId="{B3F0FDA9-A0C9-4B81-91EE-E0C205BC5819}" sibTransId="{55B4F9A6-FA0E-4B1F-902E-20C9C9C1041C}"/>
-    <dgm:cxn modelId="{7722BE7E-D250-4D08-AF7F-FC69364DFF74}" srcId="{CF1E7812-101D-4DF3-A7B5-DAFFB48917D2}" destId="{E45D94D1-C699-49D6-8FB7-1A53EF69E9C4}" srcOrd="1" destOrd="0" parTransId="{A019E9A3-76AF-4373-8831-B9D10BF05C12}" sibTransId="{6EC14FFF-8118-4AB3-9147-6AC0BCC6A6D4}"/>
-    <dgm:cxn modelId="{7395C684-73DB-4DDD-9A43-8B937A28E30D}" srcId="{CF1E7812-101D-4DF3-A7B5-DAFFB48917D2}" destId="{720D1D11-BDEC-4B23-A9CF-84AC59FF8D98}" srcOrd="2" destOrd="0" parTransId="{F597CECE-331E-4863-AC83-399EF3C3151A}" sibTransId="{16AF6387-63F5-4669-AAD0-BADF2F213C0C}"/>
-    <dgm:cxn modelId="{C0F4AD72-DBB5-419A-ACA4-0D400A6A1150}" srcId="{6F6C34EC-D04B-4D56-86A3-3E939B149C9F}" destId="{5215C3D3-851F-46CC-A361-F2F3BA144B72}" srcOrd="6" destOrd="0" parTransId="{9DDF8871-299D-4994-ACA0-5CEEF284B657}" sibTransId="{CCA1F8BA-A81E-41A9-AEB1-77E4DDF786D6}"/>
-    <dgm:cxn modelId="{3A24B3C9-2C57-4AC0-B91E-E3F318F95A8E}" type="presOf" srcId="{E45D94D1-C699-49D6-8FB7-1A53EF69E9C4}" destId="{8FBFB680-793F-40C1-A7F9-0B639C4AA83E}" srcOrd="1" destOrd="0" presId="urn:microsoft.com/office/officeart/2005/8/layout/orgChart1"/>
-    <dgm:cxn modelId="{FD9B5A5F-DA85-498B-85D6-9FE3B54B8C38}" srcId="{036F865D-B49C-497C-A28F-FACEB37BE973}" destId="{A57018D7-84ED-488F-BB9E-3D81E4943144}" srcOrd="3" destOrd="0" parTransId="{D6C569CA-D673-4E36-AF0A-BFDD06BAA18D}" sibTransId="{A961E919-6747-4FB0-9986-7B1892146F73}"/>
-    <dgm:cxn modelId="{17E0B75D-882F-4AA2-A747-17185FD990FB}" type="presOf" srcId="{328C9D30-CD38-4F0C-A8AC-D8255B5817AB}" destId="{045A1F4E-D65D-4CED-95B7-21B2AF8EA204}" srcOrd="0" destOrd="0" presId="urn:microsoft.com/office/officeart/2005/8/layout/orgChart1"/>
-    <dgm:cxn modelId="{08E6BF39-FBB7-48A7-B6C6-8A432EC6C08E}" type="presOf" srcId="{B3F0FDA9-A0C9-4B81-91EE-E0C205BC5819}" destId="{A84CB377-71ED-44B0-AC46-B25C947B8225}" srcOrd="0" destOrd="0" presId="urn:microsoft.com/office/officeart/2005/8/layout/orgChart1"/>
-    <dgm:cxn modelId="{A93C13A8-329C-40E0-A1E8-6F67D99BE54F}" srcId="{B7A998B6-3CFD-4CE5-ABF6-102C39C44168}" destId="{DDB6B235-C9F5-497C-9FBE-4D3337D8A76E}" srcOrd="0" destOrd="0" parTransId="{1E47E0C3-F305-40E4-9317-CDB2B113F3FC}" sibTransId="{3088286D-D4FC-44B9-B451-80FE889722A5}"/>
-    <dgm:cxn modelId="{3A3CF9F5-A07E-468B-97B7-059EAC3FE270}" type="presOf" srcId="{5E48943E-53EF-42BA-BAE2-FFE959C25D2E}" destId="{B1E9204A-0085-4748-B6E3-B59EDB6B02FF}" srcOrd="0" destOrd="0" presId="urn:microsoft.com/office/officeart/2005/8/layout/orgChart1"/>
-    <dgm:cxn modelId="{ECA60D84-24CE-45B6-B5F8-73210AFC0188}" type="presOf" srcId="{B3292FCB-66B4-4C67-8DD8-20E8071DF9AB}" destId="{F025432D-3088-4546-B34D-818E97FC84F1}" srcOrd="0" destOrd="0" presId="urn:microsoft.com/office/officeart/2005/8/layout/orgChart1"/>
-    <dgm:cxn modelId="{B60799F3-AE50-4F8D-8946-A0731C435863}" type="presOf" srcId="{91B628C4-F28F-4C57-BADA-4C525DD54D79}" destId="{9E6F4F81-FA8E-492E-990E-13AE95215917}" srcOrd="0" destOrd="0" presId="urn:microsoft.com/office/officeart/2005/8/layout/orgChart1"/>
-    <dgm:cxn modelId="{3EDA0763-1682-4F7D-B847-1F61F8F13F1D}" type="presOf" srcId="{A12CA174-2EA1-4254-A2E2-9C94FA356EC7}" destId="{0449E693-20E3-4F69-B022-9F745386C802}" srcOrd="1" destOrd="0" presId="urn:microsoft.com/office/officeart/2005/8/layout/orgChart1"/>
-    <dgm:cxn modelId="{7D0A50C8-0F85-4031-ABDD-4D28BB46AC13}" type="presOf" srcId="{16E257D9-552D-418B-80F5-CF8B2A4A81F5}" destId="{77BE4884-B660-4A1A-B5BE-7F76FF5C81A0}" srcOrd="0" destOrd="0" presId="urn:microsoft.com/office/officeart/2005/8/layout/orgChart1"/>
-    <dgm:cxn modelId="{281F4B4D-8C24-487A-8C1F-0AC3AACEC44C}" type="presOf" srcId="{E8891F10-A55D-4E77-AE72-7698EEC95996}" destId="{BBAB4768-746B-46A7-9B98-C12929FC7D70}" srcOrd="0" destOrd="0" presId="urn:microsoft.com/office/officeart/2005/8/layout/orgChart1"/>
-    <dgm:cxn modelId="{A134FEC1-D705-420F-B56A-8A10DC17CF0B}" srcId="{036F865D-B49C-497C-A28F-FACEB37BE973}" destId="{B3292FCB-66B4-4C67-8DD8-20E8071DF9AB}" srcOrd="0" destOrd="0" parTransId="{9DD64EB9-AE17-4045-B0EF-7824A151E2CF}" sibTransId="{1EAAF679-01FE-4694-A0B5-C545C66E5CA5}"/>
-    <dgm:cxn modelId="{39BE6D35-B7F4-4782-9347-DA66555836B8}" type="presOf" srcId="{9DDF8871-299D-4994-ACA0-5CEEF284B657}" destId="{E8CEF343-1D14-4EDC-837B-B90AE286C2A9}" srcOrd="0" destOrd="0" presId="urn:microsoft.com/office/officeart/2005/8/layout/orgChart1"/>
-    <dgm:cxn modelId="{6D0CE5E9-6074-48E7-8BC3-6362A79F8C3C}" type="presOf" srcId="{17146953-BB10-4775-A2C8-6BD3AF1E8307}" destId="{638B92A1-2DBC-4AD6-83A6-ECA96C4C5705}" srcOrd="0" destOrd="0" presId="urn:microsoft.com/office/officeart/2005/8/layout/orgChart1"/>
-    <dgm:cxn modelId="{1A0C66A3-F6C5-4D55-AD0E-60B4EDA04189}" type="presOf" srcId="{6A0697FA-443C-4159-8BAB-54E9CE102235}" destId="{702E32F7-5B65-4989-9D8F-C88083BDAB0F}" srcOrd="1" destOrd="0" presId="urn:microsoft.com/office/officeart/2005/8/layout/orgChart1"/>
-    <dgm:cxn modelId="{B808C209-902A-4361-A12B-FC75D6558CBE}" type="presOf" srcId="{9DD64EB9-AE17-4045-B0EF-7824A151E2CF}" destId="{CAB19EE7-4700-49BA-940F-E88F8913D448}" srcOrd="0" destOrd="0" presId="urn:microsoft.com/office/officeart/2005/8/layout/orgChart1"/>
-    <dgm:cxn modelId="{174D7E1E-B21E-4F22-B32B-E001E756BA57}" type="presOf" srcId="{568786E3-CB59-4DB9-A75B-F3F7C409ACBF}" destId="{0052060F-9BD7-4B5A-8549-A081978AC279}" srcOrd="0" destOrd="0" presId="urn:microsoft.com/office/officeart/2005/8/layout/orgChart1"/>
-    <dgm:cxn modelId="{307BD23C-4C74-45B6-8A18-51A0CEC35E11}" type="presOf" srcId="{42AB1B98-997E-4DD4-82CB-98CED7A92BF2}" destId="{F4E872C2-934B-4231-91E9-8AC9FC5E6A9C}" srcOrd="1" destOrd="0" presId="urn:microsoft.com/office/officeart/2005/8/layout/orgChart1"/>
-    <dgm:cxn modelId="{B8D2A289-546A-45D7-8020-E7E386F0C39C}" type="presOf" srcId="{BDBE938E-0EB9-42C3-A806-B193872D144A}" destId="{F6212447-96C3-4CCE-A629-00BAD2AFB206}" srcOrd="1" destOrd="0" presId="urn:microsoft.com/office/officeart/2005/8/layout/orgChart1"/>
-    <dgm:cxn modelId="{77E8CA7D-9C1C-43D5-9DCB-19F920769F85}" srcId="{B7A998B6-3CFD-4CE5-ABF6-102C39C44168}" destId="{592EDF8A-A7DA-43DB-849D-96EC567ADCC5}" srcOrd="1" destOrd="0" parTransId="{4680C006-E723-4678-9423-DDC71E5793BF}" sibTransId="{11C670BC-1B62-4D3E-B5BB-DB03224CADE8}"/>
-    <dgm:cxn modelId="{EA78C06B-D154-4CCD-8F05-B398D185C756}" type="presOf" srcId="{DDB6B235-C9F5-497C-9FBE-4D3337D8A76E}" destId="{674E48BB-2DD8-4CEE-BEAD-29D50BD7A9F6}" srcOrd="1" destOrd="0" presId="urn:microsoft.com/office/officeart/2005/8/layout/orgChart1"/>
-    <dgm:cxn modelId="{C1815C18-1A8A-4B0D-BD5E-196546F23669}" srcId="{E7F2B5B6-CF87-43D8-956B-865FA12A9832}" destId="{17146953-BB10-4775-A2C8-6BD3AF1E8307}" srcOrd="11" destOrd="0" parTransId="{A23490DE-FFAE-4D31-8649-F7A3429DDBC1}" sibTransId="{2AFFCF1D-DE10-4E55-8674-A6827A1EC7CB}"/>
-    <dgm:cxn modelId="{6E042F73-FC49-4EAA-973B-06A54FDE862E}" type="presOf" srcId="{9F200D04-6C2F-4163-B6FC-6A05CBEF6041}" destId="{97D06851-5DF3-4820-9E66-BE38AC0028E3}" srcOrd="1" destOrd="0" presId="urn:microsoft.com/office/officeart/2005/8/layout/orgChart1"/>
-    <dgm:cxn modelId="{F0363551-90F0-444F-8A33-DE749D0AC422}" srcId="{DDBCFA16-FF48-4701-9B4A-F21E4666E982}" destId="{6A8B354A-8DFF-4438-9E28-0978BD25CCDE}" srcOrd="1" destOrd="0" parTransId="{8CFCF336-ACA3-4BDF-9255-F0461DEBF18A}" sibTransId="{08856827-D300-4BD1-BB30-89D856D01A85}"/>
-    <dgm:cxn modelId="{C87976F7-0DF6-43DD-B0D3-8F52FC7FB608}" srcId="{E7F2B5B6-CF87-43D8-956B-865FA12A9832}" destId="{8DF21F59-4716-4250-BD7E-144F4D63CBC5}" srcOrd="3" destOrd="0" parTransId="{0D775FB3-6EA1-4D27-B7F9-88A660B213AA}" sibTransId="{8975F2F3-D062-4D59-97F9-C087C2321AF1}"/>
-    <dgm:cxn modelId="{8B3975CF-3F40-4DF3-8BC7-A71BCDE07BBF}" type="presOf" srcId="{E621B393-E081-4074-9CF7-24B8C04658FF}" destId="{25581C89-F6A7-45B1-806B-D9A774C48FF2}" srcOrd="0" destOrd="0" presId="urn:microsoft.com/office/officeart/2005/8/layout/orgChart1"/>
-    <dgm:cxn modelId="{327E82A0-0E44-43A6-A551-1ADE9E702F02}" type="presOf" srcId="{B6068B13-10D0-4540-903D-094B6D761789}" destId="{97C4FE2C-E513-4E22-A211-CF69A433A377}" srcOrd="0" destOrd="0" presId="urn:microsoft.com/office/officeart/2005/8/layout/orgChart1"/>
-    <dgm:cxn modelId="{F287EBCE-28E0-4219-B406-FAA9C8EF6035}" srcId="{6A8B354A-8DFF-4438-9E28-0978BD25CCDE}" destId="{6F6C34EC-D04B-4D56-86A3-3E939B149C9F}" srcOrd="0" destOrd="0" parTransId="{C9A2CEE2-9518-4767-ABDA-FEC5C5734C63}" sibTransId="{E8CAF981-1249-410C-A6B4-310045525768}"/>
-    <dgm:cxn modelId="{213FB837-86F0-457B-B1AB-8181FF1DAAF8}" type="presOf" srcId="{E7BBAF79-B5DF-4711-94A2-066B816722C0}" destId="{F3826B60-3081-420F-A9ED-3B3F8889878F}" srcOrd="0" destOrd="0" presId="urn:microsoft.com/office/officeart/2005/8/layout/orgChart1"/>
-    <dgm:cxn modelId="{577C96D5-619A-40D6-B396-9E7104E3F2B7}" type="presOf" srcId="{1B566B84-3B0B-436F-8189-6AC1F2BB3FC5}" destId="{BF15F1B2-693B-494A-A908-10490D824F01}" srcOrd="0" destOrd="0" presId="urn:microsoft.com/office/officeart/2005/8/layout/orgChart1"/>
-    <dgm:cxn modelId="{0D7A02C6-D23A-4D0B-B661-6CE62BF4C53F}" type="presOf" srcId="{FF5F6635-D83D-4AA9-9656-9744FCFD8BAD}" destId="{0D91F5C4-8DDD-4346-9B44-9DAB026D3F39}" srcOrd="0" destOrd="0" presId="urn:microsoft.com/office/officeart/2005/8/layout/orgChart1"/>
-    <dgm:cxn modelId="{C7708B5D-E01A-4756-9638-0A2037CF94EF}" type="presOf" srcId="{E49793DC-11A4-4FE5-B412-BDD04A01C875}" destId="{E9231F57-B2A8-4B60-B3EB-7B14DA39C96F}" srcOrd="0" destOrd="0" presId="urn:microsoft.com/office/officeart/2005/8/layout/orgChart1"/>
-    <dgm:cxn modelId="{BE44060E-2F3A-41A2-9D6E-9634974900C1}" type="presOf" srcId="{5B650B58-E6B4-4F81-9E92-48805D7BAFC8}" destId="{E78E2A90-FCCD-4F5A-9160-05A457794C0D}" srcOrd="1" destOrd="0" presId="urn:microsoft.com/office/officeart/2005/8/layout/orgChart1"/>
-    <dgm:cxn modelId="{0FF5E60A-3E73-45ED-9C72-19CE45A86549}" srcId="{6F6C34EC-D04B-4D56-86A3-3E939B149C9F}" destId="{5B650B58-E6B4-4F81-9E92-48805D7BAFC8}" srcOrd="9" destOrd="0" parTransId="{64F0A6F7-78A5-47F9-A720-3BEF75DFDDB5}" sibTransId="{1CC21EB7-F3C7-4E27-B0EE-31FBFF38CD12}"/>
-    <dgm:cxn modelId="{A5BBD47D-2AF2-4C93-8DBD-7C4A3D105FBF}" type="presOf" srcId="{72366353-31E3-4DC0-A317-448EEFEC819D}" destId="{DBEBDFEB-4637-4998-A96D-854585899A0A}" srcOrd="0" destOrd="0" presId="urn:microsoft.com/office/officeart/2005/8/layout/orgChart1"/>
-    <dgm:cxn modelId="{292EF72E-4ED6-42B0-9FDF-7087C335B504}" srcId="{E7F2B5B6-CF87-43D8-956B-865FA12A9832}" destId="{779A4152-A6FD-4812-A864-B13B238109FC}" srcOrd="1" destOrd="0" parTransId="{AB3EB838-C92F-483C-B532-333A2D91C7DA}" sibTransId="{1B84A41F-86C5-4147-BB31-E85A6D7F5088}"/>
-    <dgm:cxn modelId="{F07C3BC9-69C3-4F8E-B5D3-E1B5A7AC3561}" type="presOf" srcId="{AB3EB838-C92F-483C-B532-333A2D91C7DA}" destId="{2209F358-A677-4C5A-8A7B-D5A7AC543204}" srcOrd="0" destOrd="0" presId="urn:microsoft.com/office/officeart/2005/8/layout/orgChart1"/>
-    <dgm:cxn modelId="{1EC68511-D718-41BE-A280-B8182ACA509A}" srcId="{A12CA174-2EA1-4254-A2E2-9C94FA356EC7}" destId="{514468E7-68B1-4A1C-8A70-3B9D2BD46163}" srcOrd="1" destOrd="0" parTransId="{5E48943E-53EF-42BA-BAE2-FFE959C25D2E}" sibTransId="{17A0AAB3-21EE-4F4C-A55C-EC39E22D2E6D}"/>
-    <dgm:cxn modelId="{E0CDE9AA-6463-4297-B176-B3FAA6F7B5E4}" type="presOf" srcId="{FBB1AB93-1B13-4A16-9237-214B953783E0}" destId="{7B3231E4-8145-4022-AB76-382F65196510}" srcOrd="0" destOrd="0" presId="urn:microsoft.com/office/officeart/2005/8/layout/orgChart1"/>
-    <dgm:cxn modelId="{AA7380E7-B510-40BC-B1E0-2B4C6EA73ABC}" type="presOf" srcId="{40BCF024-F5C2-4C0D-BFDB-5643E2836A8D}" destId="{57A54197-CE82-4B07-82C2-7E58390A6116}" srcOrd="0" destOrd="0" presId="urn:microsoft.com/office/officeart/2005/8/layout/orgChart1"/>
-    <dgm:cxn modelId="{57A4CB66-8D74-4120-9701-C3EC84A2A20A}" type="presOf" srcId="{DDB6B235-C9F5-497C-9FBE-4D3337D8A76E}" destId="{71BA5A12-34F1-4AEC-A5E4-86432F8A4267}" srcOrd="0" destOrd="0" presId="urn:microsoft.com/office/officeart/2005/8/layout/orgChart1"/>
-    <dgm:cxn modelId="{75488167-4E9C-4B25-8944-A5FCF312A457}" type="presOf" srcId="{F74A4FB1-16A2-4B5E-A92A-76664DA97325}" destId="{87971659-7FAE-464E-A241-B1901404F4DF}" srcOrd="0" destOrd="0" presId="urn:microsoft.com/office/officeart/2005/8/layout/orgChart1"/>
-    <dgm:cxn modelId="{2DEBEDE1-6D5B-4AE6-8C5D-75CA3170090E}" type="presOf" srcId="{6A8B354A-8DFF-4438-9E28-0978BD25CCDE}" destId="{4744F06C-791B-4D4E-803C-CDB7C101F63B}" srcOrd="1" destOrd="0" presId="urn:microsoft.com/office/officeart/2005/8/layout/orgChart1"/>
-    <dgm:cxn modelId="{BF4538E4-2AAB-416A-90C6-2B7E6110077D}" type="presOf" srcId="{3ADDB50E-C716-4235-8030-97BFF40B2B70}" destId="{0F779412-6B4D-4BDF-9ED2-F970322E63E8}" srcOrd="1" destOrd="0" presId="urn:microsoft.com/office/officeart/2005/8/layout/orgChart1"/>
-    <dgm:cxn modelId="{D47DFED4-0F52-4D8F-8CFB-EA1A31F87DBA}" srcId="{036F865D-B49C-497C-A28F-FACEB37BE973}" destId="{DBB9354F-0ECF-4676-B28F-D750482C08B6}" srcOrd="6" destOrd="0" parTransId="{CAC00B8C-8726-4518-996D-52DDA6373405}" sibTransId="{77E33EAA-77CF-4CB4-A6DD-ECFDB8CC8849}"/>
-    <dgm:cxn modelId="{67FC6038-411D-4B59-AE1D-6AAC1685DF74}" type="presOf" srcId="{036F865D-B49C-497C-A28F-FACEB37BE973}" destId="{A5F04406-A1EA-4D8E-BAAA-8483711364C6}" srcOrd="0" destOrd="0" presId="urn:microsoft.com/office/officeart/2005/8/layout/orgChart1"/>
-    <dgm:cxn modelId="{2DE4B19C-F12E-4954-9A3A-778C1CB717A9}" srcId="{036F865D-B49C-497C-A28F-FACEB37BE973}" destId="{15EDC76C-57B9-43BE-BF45-2205A01BA0A3}" srcOrd="5" destOrd="0" parTransId="{4D9549AF-AF34-48E0-866B-C063EF037D12}" sibTransId="{180205B7-8E6E-4E2C-91F0-5CFDE9E01D52}"/>
-    <dgm:cxn modelId="{35631E9E-984B-4B3F-889E-B0D52BD45C5A}" type="presOf" srcId="{ABFBDFAE-74B1-4476-B6DB-C215E08D23B2}" destId="{99244E41-0E2B-456B-BE89-F9DCFF41E173}" srcOrd="0" destOrd="0" presId="urn:microsoft.com/office/officeart/2005/8/layout/orgChart1"/>
-    <dgm:cxn modelId="{4C8CB450-8F20-460B-BAA8-1AF67833278A}" type="presOf" srcId="{4D9549AF-AF34-48E0-866B-C063EF037D12}" destId="{8D5E5986-4BD8-4B32-930C-B199657275BC}" srcOrd="0" destOrd="0" presId="urn:microsoft.com/office/officeart/2005/8/layout/orgChart1"/>
-    <dgm:cxn modelId="{E07D3F72-1B48-4629-A095-50EF894A6391}" type="presOf" srcId="{71207E5B-E26C-41C9-8A41-12011AC99E24}" destId="{55224759-248D-4C35-9D3B-1E85F56EB2FE}" srcOrd="0" destOrd="0" presId="urn:microsoft.com/office/officeart/2005/8/layout/orgChart1"/>
-    <dgm:cxn modelId="{2FB11844-3FB6-4FD4-B5D2-506E33382958}" type="presOf" srcId="{3ADDB50E-C716-4235-8030-97BFF40B2B70}" destId="{2E339C4D-888C-4305-9121-22F0079DA5B4}" srcOrd="0" destOrd="0" presId="urn:microsoft.com/office/officeart/2005/8/layout/orgChart1"/>
-    <dgm:cxn modelId="{4A489CD4-F3A6-4F6D-B63A-5B6465AD9C66}" type="presOf" srcId="{86437622-ABFF-40FC-948A-2D926A16C9C2}" destId="{7A5859E3-5729-4797-8D5C-D5FED73D0B2E}" srcOrd="0" destOrd="0" presId="urn:microsoft.com/office/officeart/2005/8/layout/orgChart1"/>
-    <dgm:cxn modelId="{2657E1A9-270A-4D4B-B848-85087DC73442}" type="presOf" srcId="{9F200D04-6C2F-4163-B6FC-6A05CBEF6041}" destId="{1B0AD80D-4C61-4684-B864-346A72C8ACDA}" srcOrd="0" destOrd="0" presId="urn:microsoft.com/office/officeart/2005/8/layout/orgChart1"/>
-    <dgm:cxn modelId="{62ED085F-42C7-4582-850F-1E8D0BB9A19D}" type="presOf" srcId="{5A2E9414-479E-446C-A2E4-726DD6DA6FCB}" destId="{1B6E9FE2-4A42-45ED-9630-331A61CD1A61}" srcOrd="0" destOrd="0" presId="urn:microsoft.com/office/officeart/2005/8/layout/orgChart1"/>
-    <dgm:cxn modelId="{5F07D8A8-4E89-42A6-811B-32CA55B3909B}" type="presOf" srcId="{BAC8ED56-9041-4B42-94A8-15F81727F6E9}" destId="{C7C00CDA-C5A1-4937-ADD6-4F115E89BE65}" srcOrd="0" destOrd="0" presId="urn:microsoft.com/office/officeart/2005/8/layout/orgChart1"/>
-    <dgm:cxn modelId="{EDA6CA9D-FA78-4BA2-B062-18B89318B305}" type="presOf" srcId="{B7A998B6-3CFD-4CE5-ABF6-102C39C44168}" destId="{FC51E896-9C58-42F2-8E49-D3F56B9E3FD1}" srcOrd="1" destOrd="0" presId="urn:microsoft.com/office/officeart/2005/8/layout/orgChart1"/>
-    <dgm:cxn modelId="{77BD5103-F40A-4440-BF15-EFE3DBCC5037}" type="presOf" srcId="{66BBC26C-D840-4A54-86D3-3188AE28C087}" destId="{0943457C-9117-4233-A82E-3FB56BA0FD75}" srcOrd="0" destOrd="0" presId="urn:microsoft.com/office/officeart/2005/8/layout/orgChart1"/>
-    <dgm:cxn modelId="{CA2B7D54-5CC3-4325-8493-97D560CC8B9D}" type="presOf" srcId="{5E747862-7F4F-48C2-9656-0F2A1029D161}" destId="{3F97FD23-B1D6-4209-B638-322A19C06965}" srcOrd="0" destOrd="0" presId="urn:microsoft.com/office/officeart/2005/8/layout/orgChart1"/>
-    <dgm:cxn modelId="{635D44EF-4A1F-41E4-AE37-7939977A0FD1}" type="presOf" srcId="{E91EF19E-5F9E-4407-BB36-B70ED62373C5}" destId="{E2A5F104-5B55-4A8F-8CDB-F4EA1FD3DCA9}" srcOrd="0" destOrd="0" presId="urn:microsoft.com/office/officeart/2005/8/layout/orgChart1"/>
-    <dgm:cxn modelId="{CF49D40E-E32C-4F9F-A83C-4630421BF295}" type="presOf" srcId="{85469F26-7E84-4E68-B914-7D140FF6A72E}" destId="{A7EC3026-F40B-42F0-B898-FEA35E7347C8}" srcOrd="1" destOrd="0" presId="urn:microsoft.com/office/officeart/2005/8/layout/orgChart1"/>
-    <dgm:cxn modelId="{67535C20-A3EE-435D-9A24-1E180853B042}" type="presOf" srcId="{6F6C34EC-D04B-4D56-86A3-3E939B149C9F}" destId="{4AA5F8D1-45A0-4227-A968-66DB05AB6521}" srcOrd="1" destOrd="0" presId="urn:microsoft.com/office/officeart/2005/8/layout/orgChart1"/>
-    <dgm:cxn modelId="{0E22C312-262B-423E-84AD-7363CDD69F9F}" type="presOf" srcId="{2C1582BA-1E36-44E1-AB7E-5464369BDF2C}" destId="{8F795C33-B06C-4B2C-9D53-F1B409C1F63D}" srcOrd="1" destOrd="0" presId="urn:microsoft.com/office/officeart/2005/8/layout/orgChart1"/>
-    <dgm:cxn modelId="{D8BB02FA-5E30-4C22-83B6-2B9884C3AE58}" type="presOf" srcId="{925F4CF3-0DE2-4266-BB71-2D5B5E2E47B9}" destId="{88DD66CC-7DFF-4CBD-A83C-B81F872712CA}" srcOrd="0" destOrd="0" presId="urn:microsoft.com/office/officeart/2005/8/layout/orgChart1"/>
-    <dgm:cxn modelId="{1E1F0953-8F57-4C3D-9524-459871339491}" srcId="{5E747862-7F4F-48C2-9656-0F2A1029D161}" destId="{A12CA174-2EA1-4254-A2E2-9C94FA356EC7}" srcOrd="0" destOrd="0" parTransId="{910EC701-6B73-412E-BD9F-A0331CE8B6C6}" sibTransId="{663B9793-92E7-438C-A55C-2ECFF22F9F7B}"/>
-    <dgm:cxn modelId="{671C4E54-EF50-4923-812F-21877959A115}" type="presOf" srcId="{4AA34804-2501-4061-B904-8E2F978C5BED}" destId="{689D51BB-D6C4-4E97-BED5-7B642C5CC993}" srcOrd="0" destOrd="0" presId="urn:microsoft.com/office/officeart/2005/8/layout/orgChart1"/>
-    <dgm:cxn modelId="{EA9FC46B-3441-4F0C-86AA-FEAA77817E4E}" type="presOf" srcId="{4E552C99-E3B0-4D8F-AB3B-2707F7D7FF07}" destId="{9A7518DC-8FB4-492F-BF0A-2F43AD9D70D6}" srcOrd="0" destOrd="0" presId="urn:microsoft.com/office/officeart/2005/8/layout/orgChart1"/>
-    <dgm:cxn modelId="{9BD72D68-3E8F-42E9-BC1C-69B8EFCA37E4}" srcId="{E7F2B5B6-CF87-43D8-956B-865FA12A9832}" destId="{E7BBAF79-B5DF-4711-94A2-066B816722C0}" srcOrd="4" destOrd="0" parTransId="{65B06181-9E4B-4CC0-9813-8C0D896FE328}" sibTransId="{3386B16F-AA17-4982-A098-4BC22C435C63}"/>
-    <dgm:cxn modelId="{1630D317-A9E5-4239-9815-8B96B173F857}" srcId="{3E71C5FB-B753-47D4-9DCC-13828975B0A2}" destId="{003393E9-8076-4FF8-A132-BE48278ECCD0}" srcOrd="0" destOrd="0" parTransId="{72366353-31E3-4DC0-A317-448EEFEC819D}" sibTransId="{E71FA8A1-E24F-4509-AEE5-03F2F9FE5478}"/>
-    <dgm:cxn modelId="{99BB6038-EEA7-4965-A627-78FEE9857242}" type="presOf" srcId="{5BFC7CF1-7C30-48C9-A388-9B1D96528977}" destId="{2782FA1D-8DAB-47BD-B9E3-D84483375638}" srcOrd="0" destOrd="0" presId="urn:microsoft.com/office/officeart/2005/8/layout/orgChart1"/>
-    <dgm:cxn modelId="{EB920824-E4AE-4DA2-A467-4BCA98BD6C5C}" type="presOf" srcId="{E7BBAF79-B5DF-4711-94A2-066B816722C0}" destId="{C5669012-804D-4CE6-AEB0-2408B2E26C8B}" srcOrd="1" destOrd="0" presId="urn:microsoft.com/office/officeart/2005/8/layout/orgChart1"/>
-    <dgm:cxn modelId="{F894F689-98BE-491C-BEBA-5AFF20E70AD7}" type="presOf" srcId="{568786E3-CB59-4DB9-A75B-F3F7C409ACBF}" destId="{B97AC47A-A2B0-4DE8-9D43-2678CB13C875}" srcOrd="1" destOrd="0" presId="urn:microsoft.com/office/officeart/2005/8/layout/orgChart1"/>
-    <dgm:cxn modelId="{B54217EB-8A52-42A8-A605-0EE3636F70A2}" srcId="{E7F2B5B6-CF87-43D8-956B-865FA12A9832}" destId="{D39555DC-FD40-400A-8291-2B20647F4971}" srcOrd="5" destOrd="0" parTransId="{08F7D90B-DD5F-47B6-918B-EC4EAA8ACAD1}" sibTransId="{C8568792-6B40-4972-A482-C0AC52C997BA}"/>
-    <dgm:cxn modelId="{D8F8E9AC-0FC8-4D1C-9BB0-03527B64F00F}" type="presOf" srcId="{CF1E7812-101D-4DF3-A7B5-DAFFB48917D2}" destId="{D4FD6694-D327-44FF-B728-6A169BA638D4}" srcOrd="1" destOrd="0" presId="urn:microsoft.com/office/officeart/2005/8/layout/orgChart1"/>
-    <dgm:cxn modelId="{04905492-E17A-4369-9593-EBDFA102E7F9}" type="presOf" srcId="{D457A40A-56B9-4F4F-B5B7-A69DF2E1F522}" destId="{04644049-780B-4B76-AC98-F1618B2945C4}" srcOrd="0" destOrd="0" presId="urn:microsoft.com/office/officeart/2005/8/layout/orgChart1"/>
-    <dgm:cxn modelId="{67B9F703-0318-4F9A-B010-83838524F65A}" type="presOf" srcId="{A0DB2208-0287-4860-A3E2-FE5A64BEC9DF}" destId="{CDB35612-2091-40C2-9966-A02D8958896E}" srcOrd="0" destOrd="0" presId="urn:microsoft.com/office/officeart/2005/8/layout/orgChart1"/>
-    <dgm:cxn modelId="{EE4A8808-659E-43A1-AD9F-9B88833678C0}" srcId="{6F6C34EC-D04B-4D56-86A3-3E939B149C9F}" destId="{A1E21DB3-4238-483C-8C46-4651EF0F3427}" srcOrd="7" destOrd="0" parTransId="{FBB1AB93-1B13-4A16-9237-214B953783E0}" sibTransId="{C0AE9AFC-3771-4460-B8EB-AAB0BD24D8BE}"/>
-    <dgm:cxn modelId="{DC198975-2A81-464A-A43A-EA2ED8214018}" type="presOf" srcId="{CF1E7812-101D-4DF3-A7B5-DAFFB48917D2}" destId="{A72721EE-9B92-4279-94F3-F4F5E0ABA357}" srcOrd="0" destOrd="0" presId="urn:microsoft.com/office/officeart/2005/8/layout/orgChart1"/>
-    <dgm:cxn modelId="{5C00B694-2911-41EB-A23B-6D8E7702B69A}" type="presOf" srcId="{781618CB-6D74-4BCB-AEE2-FAC5CB743DCD}" destId="{F16B8574-CB18-4FF4-BB06-9C99D0181C67}" srcOrd="0" destOrd="0" presId="urn:microsoft.com/office/officeart/2005/8/layout/orgChart1"/>
-    <dgm:cxn modelId="{C8F33CE6-2965-4E52-9CC6-46B7845A3AF6}" type="presOf" srcId="{2E17DAB0-83AA-4E1C-A393-685377E018BA}" destId="{F4FC308C-2731-4D69-8AD2-7B4ADF450DA1}" srcOrd="0" destOrd="0" presId="urn:microsoft.com/office/officeart/2005/8/layout/orgChart1"/>
-    <dgm:cxn modelId="{37841759-302F-4BA8-B995-C288D7995AB9}" srcId="{66BBC26C-D840-4A54-86D3-3188AE28C087}" destId="{E7F2B5B6-CF87-43D8-956B-865FA12A9832}" srcOrd="0" destOrd="0" parTransId="{5505AFFD-EF3C-433E-B042-B7089BA0CA6C}" sibTransId="{64AA5113-02A6-4794-B6DC-5D58E26EAC5B}"/>
-    <dgm:cxn modelId="{E778841C-1D3E-4987-96F8-4DFC4CF910A2}" type="presOf" srcId="{29D0BC58-E48F-4187-A5B8-C49CFD41B6F2}" destId="{EDC7E00A-1797-4E09-8012-9CCC654F37F6}" srcOrd="0" destOrd="0" presId="urn:microsoft.com/office/officeart/2005/8/layout/orgChart1"/>
-    <dgm:cxn modelId="{B86A54BC-A70C-4BF0-AD08-1C964C0848DD}" type="presOf" srcId="{40BCF024-F5C2-4C0D-BFDB-5643E2836A8D}" destId="{08359004-E42B-434B-9560-3E04E1B6B597}" srcOrd="1" destOrd="0" presId="urn:microsoft.com/office/officeart/2005/8/layout/orgChart1"/>
-    <dgm:cxn modelId="{31BB14F0-ED0D-431C-A5D8-CB4F6091C508}" srcId="{A12CA174-2EA1-4254-A2E2-9C94FA356EC7}" destId="{75BEB708-1BA6-4F6B-95E5-ECC20B1CCD2A}" srcOrd="2" destOrd="0" parTransId="{EE92D677-A1A3-4926-B565-7677FD45C04C}" sibTransId="{B04EE4AD-993A-4B0E-B535-BE76DE166198}"/>
-    <dgm:cxn modelId="{AC827D59-11C2-4236-9F78-D70B1A43D225}" type="presOf" srcId="{592EDF8A-A7DA-43DB-849D-96EC567ADCC5}" destId="{8B8CB4FA-2E41-4565-A96D-9831294F274F}" srcOrd="0" destOrd="0" presId="urn:microsoft.com/office/officeart/2005/8/layout/orgChart1"/>
-    <dgm:cxn modelId="{79865CAF-3A2D-46BF-AA2F-6B540D2302AD}" type="presOf" srcId="{D6C569CA-D673-4E36-AF0A-BFDD06BAA18D}" destId="{FCF382F4-BF9F-405B-8C6D-097A8D248F86}" srcOrd="0" destOrd="0" presId="urn:microsoft.com/office/officeart/2005/8/layout/orgChart1"/>
-    <dgm:cxn modelId="{BAC802A5-F266-425D-911A-C2844802EDB6}" srcId="{036F865D-B49C-497C-A28F-FACEB37BE973}" destId="{BAC8ED56-9041-4B42-94A8-15F81727F6E9}" srcOrd="2" destOrd="0" parTransId="{6823163E-339E-47B3-B957-04897E98412A}" sibTransId="{1C1DA8F8-92DF-42AA-A310-AF68AD0F31B1}"/>
-    <dgm:cxn modelId="{723BDA4F-10FC-4EC4-843A-ED8923338FB1}" srcId="{6A8B354A-8DFF-4438-9E28-0978BD25CCDE}" destId="{B7A998B6-3CFD-4CE5-ABF6-102C39C44168}" srcOrd="1" destOrd="0" parTransId="{F74A4FB1-16A2-4B5E-A92A-76664DA97325}" sibTransId="{519321E6-724E-4B56-B75B-9A78667F62A4}"/>
-    <dgm:cxn modelId="{5E311167-4183-429F-A356-95665FCC7EB1}" type="presOf" srcId="{003393E9-8076-4FF8-A132-BE48278ECCD0}" destId="{E95FA72E-FE12-4EE4-B5BA-A9310B1B1683}" srcOrd="0" destOrd="0" presId="urn:microsoft.com/office/officeart/2005/8/layout/orgChart1"/>
     <dgm:cxn modelId="{1F0AEAD4-5E21-4517-BC4E-85233463D854}" type="presOf" srcId="{EE92D677-A1A3-4926-B565-7677FD45C04C}" destId="{5CA29928-8AC9-4BE1-B2C9-31DD0985EB03}" srcOrd="0" destOrd="0" presId="urn:microsoft.com/office/officeart/2005/8/layout/orgChart1"/>
     <dgm:cxn modelId="{4C549505-2499-4945-B330-DAF5E8FCE0D1}" type="presOf" srcId="{A94B5336-2754-49B3-9294-B4493062AE02}" destId="{3DAE863F-2CF9-47A8-A8B2-280A6F6DAEB2}" srcOrd="1" destOrd="0" presId="urn:microsoft.com/office/officeart/2005/8/layout/orgChart1"/>
-    <dgm:cxn modelId="{3089C613-3DA5-4F25-998A-99B79995BB13}" type="presOf" srcId="{B3CE34A7-3737-4E98-BC58-22D32761C765}" destId="{AA015747-1E6A-429B-AD9B-E2148433DBC8}" srcOrd="0" destOrd="0" presId="urn:microsoft.com/office/officeart/2005/8/layout/orgChart1"/>
-    <dgm:cxn modelId="{0CFAC53B-E824-4D2E-B15C-F7D2C8653FB7}" type="presOf" srcId="{D3BB9439-3AF0-42C0-AB8D-88AF1C54095C}" destId="{987392C5-141E-48C7-9DEA-A405C13A54B3}" srcOrd="1" destOrd="0" presId="urn:microsoft.com/office/officeart/2005/8/layout/orgChart1"/>
-    <dgm:cxn modelId="{9E273358-C5B7-4997-9729-292D8B5AA5E3}" type="presOf" srcId="{AF7CD24D-0163-4221-AE52-2FADAF1DBDE1}" destId="{60DA8595-BF29-408E-83D9-AB98DA77357C}" srcOrd="0" destOrd="0" presId="urn:microsoft.com/office/officeart/2005/8/layout/orgChart1"/>
-    <dgm:cxn modelId="{04B28D99-A4A7-48B7-91E1-9083811546BF}" type="presOf" srcId="{A019E9A3-76AF-4373-8831-B9D10BF05C12}" destId="{1B23ED6E-AED4-4C1E-BB67-6E14FF32B199}" srcOrd="0" destOrd="0" presId="urn:microsoft.com/office/officeart/2005/8/layout/orgChart1"/>
-    <dgm:cxn modelId="{EB4BF5B8-CE7D-467E-91EA-161A219D9404}" type="presOf" srcId="{66BBC26C-D840-4A54-86D3-3188AE28C087}" destId="{EBE6DB65-FC35-458B-A538-DD188730D068}" srcOrd="1" destOrd="0" presId="urn:microsoft.com/office/officeart/2005/8/layout/orgChart1"/>
-    <dgm:cxn modelId="{ABB19268-9D42-4BB9-A752-7F8C9178DF41}" srcId="{BDBE938E-0EB9-42C3-A806-B193872D144A}" destId="{036F865D-B49C-497C-A28F-FACEB37BE973}" srcOrd="0" destOrd="0" parTransId="{86437622-ABFF-40FC-948A-2D926A16C9C2}" sibTransId="{9C6B1986-AB9B-477F-863E-A1FF7C47377B}"/>
-    <dgm:cxn modelId="{5DCE22F2-778F-4933-839F-D33149B415D5}" srcId="{036F865D-B49C-497C-A28F-FACEB37BE973}" destId="{85469F26-7E84-4E68-B914-7D140FF6A72E}" srcOrd="7" destOrd="0" parTransId="{01D5BAB2-961F-473A-B3FF-E3EA572DD70A}" sibTransId="{3D0D7D1F-89C8-4436-923E-8DFAB4196D06}"/>
-    <dgm:cxn modelId="{FDB5D20E-AE3A-4AAC-8063-BB90919809D3}" srcId="{66BBC26C-D840-4A54-86D3-3188AE28C087}" destId="{CF1E7812-101D-4DF3-A7B5-DAFFB48917D2}" srcOrd="1" destOrd="0" parTransId="{DFFEFCBB-A209-4917-9681-660DFA13E64F}" sibTransId="{E8EB3A16-FD54-4ADD-B18A-4C74095D1B5C}"/>
+    <dgm:cxn modelId="{577C96D5-619A-40D6-B396-9E7104E3F2B7}" type="presOf" srcId="{1B566B84-3B0B-436F-8189-6AC1F2BB3FC5}" destId="{BF15F1B2-693B-494A-A908-10490D824F01}" srcOrd="0" destOrd="0" presId="urn:microsoft.com/office/officeart/2005/8/layout/orgChart1"/>
+    <dgm:cxn modelId="{D520E359-8585-4508-82EC-072E406E511D}" type="presOf" srcId="{E6F355BE-A692-4BCE-AFC3-B464A275299A}" destId="{BC545642-E1CD-46FB-9E0E-A426D974CE03}" srcOrd="1" destOrd="0" presId="urn:microsoft.com/office/officeart/2005/8/layout/orgChart1"/>
+    <dgm:cxn modelId="{281F4B4D-8C24-487A-8C1F-0AC3AACEC44C}" type="presOf" srcId="{E8891F10-A55D-4E77-AE72-7698EEC95996}" destId="{BBAB4768-746B-46A7-9B98-C12929FC7D70}" srcOrd="0" destOrd="0" presId="urn:microsoft.com/office/officeart/2005/8/layout/orgChart1"/>
+    <dgm:cxn modelId="{1E1F0953-8F57-4C3D-9524-459871339491}" srcId="{5E747862-7F4F-48C2-9656-0F2A1029D161}" destId="{A12CA174-2EA1-4254-A2E2-9C94FA356EC7}" srcOrd="0" destOrd="0" parTransId="{910EC701-6B73-412E-BD9F-A0331CE8B6C6}" sibTransId="{663B9793-92E7-438C-A55C-2ECFF22F9F7B}"/>
     <dgm:cxn modelId="{06267808-4BAB-4D12-B24D-0ED5BE63DD77}" type="presOf" srcId="{E7F2B5B6-CF87-43D8-956B-865FA12A9832}" destId="{31F21690-4CFF-47BE-B911-7F1862704C1D}" srcOrd="1" destOrd="0" presId="urn:microsoft.com/office/officeart/2005/8/layout/orgChart1"/>
-    <dgm:cxn modelId="{F79B25E1-4F39-4A76-9081-0B0CDA0E4AA1}" type="presOf" srcId="{C57D86BF-5B9D-41B8-BC5B-A5BCCB7D5E9E}" destId="{FB87FCA5-B933-4131-AC98-F72C05C50BEE}" srcOrd="0" destOrd="0" presId="urn:microsoft.com/office/officeart/2005/8/layout/orgChart1"/>
+    <dgm:cxn modelId="{75488167-4E9C-4B25-8944-A5FCF312A457}" type="presOf" srcId="{F74A4FB1-16A2-4B5E-A92A-76664DA97325}" destId="{87971659-7FAE-464E-A241-B1901404F4DF}" srcOrd="0" destOrd="0" presId="urn:microsoft.com/office/officeart/2005/8/layout/orgChart1"/>
+    <dgm:cxn modelId="{3A90849A-4052-49D9-BA03-0A13E727A0D7}" type="presOf" srcId="{B67B89A4-82EA-44F8-B6C1-3F5C0C4882E2}" destId="{FB462F9E-37A4-4364-B61F-8744B5644546}" srcOrd="0" destOrd="0" presId="urn:microsoft.com/office/officeart/2005/8/layout/orgChart1"/>
+    <dgm:cxn modelId="{F37A2133-0B39-4E96-AE09-E03BE3CFB6E2}" type="presOf" srcId="{44C92458-6162-43E3-89A4-2E81084BFC0B}" destId="{A356A744-9CF5-4DA5-BFC0-EC31A34218D5}" srcOrd="1" destOrd="0" presId="urn:microsoft.com/office/officeart/2005/8/layout/orgChart1"/>
+    <dgm:cxn modelId="{49C40D50-AD88-464D-B351-64BA63E063A5}" type="presOf" srcId="{6A0697FA-443C-4159-8BAB-54E9CE102235}" destId="{CA498863-A530-456E-A0E2-3F60EEB96735}" srcOrd="0" destOrd="0" presId="urn:microsoft.com/office/officeart/2005/8/layout/orgChart1"/>
     <dgm:cxn modelId="{2AA94E79-7206-4C27-89DC-8DCB70EA05B0}" type="presParOf" srcId="{6383E483-01F1-40CC-83D5-F4DB42FCEE17}" destId="{4742793B-C77D-4EA9-B156-95B29A9EA7C4}" srcOrd="0" destOrd="0" presId="urn:microsoft.com/office/officeart/2005/8/layout/orgChart1"/>
     <dgm:cxn modelId="{D9ECADCF-A9D8-4462-BD76-056E85FA31F7}" type="presParOf" srcId="{4742793B-C77D-4EA9-B156-95B29A9EA7C4}" destId="{BBA0B057-D935-4389-97FC-484EFDA0D670}" srcOrd="0" destOrd="0" presId="urn:microsoft.com/office/officeart/2005/8/layout/orgChart1"/>
     <dgm:cxn modelId="{ED2F4578-F231-41A9-8DF7-97E644296493}" type="presParOf" srcId="{BBA0B057-D935-4389-97FC-484EFDA0D670}" destId="{E65D8129-CB67-4D48-B3AD-1E3237D9F2C0}" srcOrd="0" destOrd="0" presId="urn:microsoft.com/office/officeart/2005/8/layout/orgChart1"/>
@@ -13317,7 +13317,7 @@
           <a:avLst/>
         </a:prstGeom>
         <a:solidFill>
-          <a:srgbClr val="92D050"/>
+          <a:srgbClr val="7C7C7C"/>
         </a:solidFill>
         <a:ln>
           <a:noFill/>
@@ -16091,7 +16091,7 @@
           <a:avLst/>
         </a:prstGeom>
         <a:solidFill>
-          <a:srgbClr val="92D050"/>
+          <a:srgbClr val="7C7C7C"/>
         </a:solidFill>
         <a:ln>
           <a:noFill/>
@@ -19185,7 +19185,7 @@
           <a:p>
             <a:fld id="{8B5AD901-9B50-4E98-B287-D466502551AE}" type="datetimeFigureOut">
               <a:rPr lang="pt-BR" smtClean="0"/>
-              <a:t>19/01/2018</a:t>
+              <a:t>23/01/2018</a:t>
             </a:fld>
             <a:endParaRPr lang="pt-BR"/>
           </a:p>
@@ -19355,7 +19355,7 @@
           <a:p>
             <a:fld id="{8B5AD901-9B50-4E98-B287-D466502551AE}" type="datetimeFigureOut">
               <a:rPr lang="pt-BR" smtClean="0"/>
-              <a:t>19/01/2018</a:t>
+              <a:t>23/01/2018</a:t>
             </a:fld>
             <a:endParaRPr lang="pt-BR"/>
           </a:p>
@@ -19535,7 +19535,7 @@
           <a:p>
             <a:fld id="{8B5AD901-9B50-4E98-B287-D466502551AE}" type="datetimeFigureOut">
               <a:rPr lang="pt-BR" smtClean="0"/>
-              <a:t>19/01/2018</a:t>
+              <a:t>23/01/2018</a:t>
             </a:fld>
             <a:endParaRPr lang="pt-BR"/>
           </a:p>
@@ -19705,7 +19705,7 @@
           <a:p>
             <a:fld id="{8B5AD901-9B50-4E98-B287-D466502551AE}" type="datetimeFigureOut">
               <a:rPr lang="pt-BR" smtClean="0"/>
-              <a:t>19/01/2018</a:t>
+              <a:t>23/01/2018</a:t>
             </a:fld>
             <a:endParaRPr lang="pt-BR"/>
           </a:p>
@@ -19949,7 +19949,7 @@
           <a:p>
             <a:fld id="{8B5AD901-9B50-4E98-B287-D466502551AE}" type="datetimeFigureOut">
               <a:rPr lang="pt-BR" smtClean="0"/>
-              <a:t>19/01/2018</a:t>
+              <a:t>23/01/2018</a:t>
             </a:fld>
             <a:endParaRPr lang="pt-BR"/>
           </a:p>
@@ -20181,7 +20181,7 @@
           <a:p>
             <a:fld id="{8B5AD901-9B50-4E98-B287-D466502551AE}" type="datetimeFigureOut">
               <a:rPr lang="pt-BR" smtClean="0"/>
-              <a:t>19/01/2018</a:t>
+              <a:t>23/01/2018</a:t>
             </a:fld>
             <a:endParaRPr lang="pt-BR"/>
           </a:p>
@@ -20548,7 +20548,7 @@
           <a:p>
             <a:fld id="{8B5AD901-9B50-4E98-B287-D466502551AE}" type="datetimeFigureOut">
               <a:rPr lang="pt-BR" smtClean="0"/>
-              <a:t>19/01/2018</a:t>
+              <a:t>23/01/2018</a:t>
             </a:fld>
             <a:endParaRPr lang="pt-BR"/>
           </a:p>
@@ -20666,7 +20666,7 @@
           <a:p>
             <a:fld id="{8B5AD901-9B50-4E98-B287-D466502551AE}" type="datetimeFigureOut">
               <a:rPr lang="pt-BR" smtClean="0"/>
-              <a:t>19/01/2018</a:t>
+              <a:t>23/01/2018</a:t>
             </a:fld>
             <a:endParaRPr lang="pt-BR"/>
           </a:p>
@@ -20761,7 +20761,7 @@
           <a:p>
             <a:fld id="{8B5AD901-9B50-4E98-B287-D466502551AE}" type="datetimeFigureOut">
               <a:rPr lang="pt-BR" smtClean="0"/>
-              <a:t>19/01/2018</a:t>
+              <a:t>23/01/2018</a:t>
             </a:fld>
             <a:endParaRPr lang="pt-BR"/>
           </a:p>
@@ -21038,7 +21038,7 @@
           <a:p>
             <a:fld id="{8B5AD901-9B50-4E98-B287-D466502551AE}" type="datetimeFigureOut">
               <a:rPr lang="pt-BR" smtClean="0"/>
-              <a:t>19/01/2018</a:t>
+              <a:t>23/01/2018</a:t>
             </a:fld>
             <a:endParaRPr lang="pt-BR"/>
           </a:p>
@@ -21295,7 +21295,7 @@
           <a:p>
             <a:fld id="{8B5AD901-9B50-4E98-B287-D466502551AE}" type="datetimeFigureOut">
               <a:rPr lang="pt-BR" smtClean="0"/>
-              <a:t>19/01/2018</a:t>
+              <a:t>23/01/2018</a:t>
             </a:fld>
             <a:endParaRPr lang="pt-BR"/>
           </a:p>
@@ -21508,7 +21508,7 @@
           <a:p>
             <a:fld id="{8B5AD901-9B50-4E98-B287-D466502551AE}" type="datetimeFigureOut">
               <a:rPr lang="pt-BR" smtClean="0"/>
-              <a:t>19/01/2018</a:t>
+              <a:t>23/01/2018</a:t>
             </a:fld>
             <a:endParaRPr lang="pt-BR"/>
           </a:p>
@@ -21920,7 +21920,7 @@
           <p:nvPr>
             <p:extLst>
               <p:ext uri="{D42A27DB-BD31-4B8C-83A1-F6EECF244321}">
-                <p14:modId xmlns:p14="http://schemas.microsoft.com/office/powerpoint/2010/main" val="376650309"/>
+                <p14:modId xmlns:p14="http://schemas.microsoft.com/office/powerpoint/2010/main" val="86465067"/>
               </p:ext>
             </p:extLst>
           </p:nvPr>

</xml_diff>